<commit_message>
modified:   Documents/presentation doc/Final Presentation/final-presentation.pptx
</commit_message>
<xml_diff>
--- a/Documents/presentation doc/Final Presentation/final-presentation.pptx
+++ b/Documents/presentation doc/Final Presentation/final-presentation.pptx
@@ -5,7 +5,7 @@
     <p:sldMasterId id="2147483648" r:id="rId1"/>
   </p:sldMasterIdLst>
   <p:notesMasterIdLst>
-    <p:notesMasterId r:id="rId16"/>
+    <p:notesMasterId r:id="rId17"/>
   </p:notesMasterIdLst>
   <p:sldIdLst>
     <p:sldId id="319" r:id="rId2"/>
@@ -22,6 +22,7 @@
     <p:sldId id="316" r:id="rId13"/>
     <p:sldId id="310" r:id="rId14"/>
     <p:sldId id="317" r:id="rId15"/>
+    <p:sldId id="322" r:id="rId16"/>
   </p:sldIdLst>
   <p:sldSz cx="9144000" cy="6858000" type="screen4x3"/>
   <p:notesSz cx="6797675" cy="9874250"/>
@@ -166,10 +167,10 @@
           <c:layoutTarget val="inner"/>
           <c:xMode val="edge"/>
           <c:yMode val="edge"/>
-          <c:x val="0.13756541418769677"/>
-          <c:y val="0.31142121774829395"/>
+          <c:x val="0.13756541418769683"/>
+          <c:y val="0.31142121774829401"/>
           <c:w val="0.82290353753797463"/>
-          <c:h val="0.56776310568666721"/>
+          <c:h val="0.5677631056866671"/>
         </c:manualLayout>
       </c:layout>
       <c:barChart>
@@ -264,25 +265,25 @@
           <c:showVal val="1"/>
         </c:dLbls>
         <c:gapWidth val="75"/>
-        <c:axId val="61972864"/>
-        <c:axId val="61974400"/>
+        <c:axId val="57328000"/>
+        <c:axId val="57329536"/>
       </c:barChart>
       <c:catAx>
-        <c:axId val="61972864"/>
+        <c:axId val="57328000"/>
         <c:scaling>
           <c:orientation val="minMax"/>
         </c:scaling>
         <c:axPos val="b"/>
         <c:majorTickMark val="none"/>
         <c:tickLblPos val="nextTo"/>
-        <c:crossAx val="61974400"/>
+        <c:crossAx val="57329536"/>
         <c:crosses val="autoZero"/>
         <c:auto val="1"/>
         <c:lblAlgn val="ctr"/>
         <c:lblOffset val="100"/>
       </c:catAx>
       <c:valAx>
-        <c:axId val="61974400"/>
+        <c:axId val="57329536"/>
         <c:scaling>
           <c:orientation val="minMax"/>
           <c:min val="0"/>
@@ -291,7 +292,7 @@
         <c:numFmt formatCode="General" sourceLinked="1"/>
         <c:majorTickMark val="none"/>
         <c:tickLblPos val="nextTo"/>
-        <c:crossAx val="61972864"/>
+        <c:crossAx val="57328000"/>
         <c:crosses val="autoZero"/>
         <c:crossBetween val="between"/>
         <c:majorUnit val="20"/>
@@ -303,10 +304,10 @@
         <c:manualLayout>
           <c:xMode val="edge"/>
           <c:yMode val="edge"/>
-          <c:x val="0.18942124246731351"/>
-          <c:y val="3.0763248527941555E-2"/>
-          <c:w val="0.68117168015814833"/>
-          <c:h val="0.22344660117130025"/>
+          <c:x val="0.18942124246731357"/>
+          <c:y val="3.0763248527941565E-2"/>
+          <c:w val="0.68117168015814855"/>
+          <c:h val="0.22344660117130033"/>
         </c:manualLayout>
       </c:layout>
     </c:legend>
@@ -408,24 +409,24 @@
           </c:val>
         </c:ser>
         <c:marker val="1"/>
-        <c:axId val="68895872"/>
-        <c:axId val="68897408"/>
+        <c:axId val="60490880"/>
+        <c:axId val="60492416"/>
       </c:lineChart>
       <c:catAx>
-        <c:axId val="68895872"/>
+        <c:axId val="60490880"/>
         <c:scaling>
           <c:orientation val="minMax"/>
         </c:scaling>
         <c:axPos val="b"/>
         <c:tickLblPos val="nextTo"/>
-        <c:crossAx val="68897408"/>
+        <c:crossAx val="60492416"/>
         <c:crosses val="autoZero"/>
         <c:auto val="1"/>
         <c:lblAlgn val="ctr"/>
         <c:lblOffset val="100"/>
       </c:catAx>
       <c:valAx>
-        <c:axId val="68897408"/>
+        <c:axId val="60492416"/>
         <c:scaling>
           <c:orientation val="minMax"/>
           <c:max val="2000"/>
@@ -434,7 +435,7 @@
         <c:majorGridlines/>
         <c:numFmt formatCode="General" sourceLinked="1"/>
         <c:tickLblPos val="nextTo"/>
-        <c:crossAx val="68895872"/>
+        <c:crossAx val="60490880"/>
         <c:crosses val="autoZero"/>
         <c:crossBetween val="between"/>
         <c:majorUnit val="500"/>
@@ -507,14 +508,14 @@
           <a:effectLst/>
           <a:extLst>
             <a:ext uri="{909E8E84-426E-40DD-AFC4-6F175D3DCCD1}">
-              <a14:hiddenFill xmlns="" xmlns:a14="http://schemas.microsoft.com/office/drawing/2010/main">
+              <a14:hiddenFill xmlns:a14="http://schemas.microsoft.com/office/drawing/2010/main" xmlns="">
                 <a:solidFill>
                   <a:schemeClr val="accent1"/>
                 </a:solidFill>
               </a14:hiddenFill>
             </a:ext>
             <a:ext uri="{91240B29-F687-4F45-9708-019B960494DF}">
-              <a14:hiddenLine xmlns="" xmlns:a14="http://schemas.microsoft.com/office/drawing/2010/main" w="9525">
+              <a14:hiddenLine xmlns:a14="http://schemas.microsoft.com/office/drawing/2010/main" xmlns="" w="9525">
                 <a:solidFill>
                   <a:schemeClr val="tx1"/>
                 </a:solidFill>
@@ -524,7 +525,7 @@
               </a14:hiddenLine>
             </a:ext>
             <a:ext uri="{AF507438-7753-43E0-B8FC-AC1667EBCBE1}">
-              <a14:hiddenEffects xmlns="" xmlns:a14="http://schemas.microsoft.com/office/drawing/2010/main">
+              <a14:hiddenEffects xmlns:a14="http://schemas.microsoft.com/office/drawing/2010/main" xmlns="">
                 <a:effectLst>
                   <a:outerShdw dist="35921" dir="2700000" algn="ctr" rotWithShape="0">
                     <a:schemeClr val="bg2"/>
@@ -577,14 +578,14 @@
           <a:effectLst/>
           <a:extLst>
             <a:ext uri="{909E8E84-426E-40DD-AFC4-6F175D3DCCD1}">
-              <a14:hiddenFill xmlns="" xmlns:a14="http://schemas.microsoft.com/office/drawing/2010/main">
+              <a14:hiddenFill xmlns:a14="http://schemas.microsoft.com/office/drawing/2010/main" xmlns="">
                 <a:solidFill>
                   <a:schemeClr val="accent1"/>
                 </a:solidFill>
               </a14:hiddenFill>
             </a:ext>
             <a:ext uri="{91240B29-F687-4F45-9708-019B960494DF}">
-              <a14:hiddenLine xmlns="" xmlns:a14="http://schemas.microsoft.com/office/drawing/2010/main" w="9525">
+              <a14:hiddenLine xmlns:a14="http://schemas.microsoft.com/office/drawing/2010/main" xmlns="" w="9525">
                 <a:solidFill>
                   <a:schemeClr val="tx1"/>
                 </a:solidFill>
@@ -594,7 +595,7 @@
               </a14:hiddenLine>
             </a:ext>
             <a:ext uri="{AF507438-7753-43E0-B8FC-AC1667EBCBE1}">
-              <a14:hiddenEffects xmlns="" xmlns:a14="http://schemas.microsoft.com/office/drawing/2010/main">
+              <a14:hiddenEffects xmlns:a14="http://schemas.microsoft.com/office/drawing/2010/main" xmlns="">
                 <a:effectLst>
                   <a:outerShdw dist="35921" dir="2700000" algn="ctr" rotWithShape="0">
                     <a:schemeClr val="bg2"/>
@@ -652,7 +653,7 @@
           <a:effectLst/>
           <a:extLst>
             <a:ext uri="{AF507438-7753-43E0-B8FC-AC1667EBCBE1}">
-              <a14:hiddenEffects xmlns="" xmlns:a14="http://schemas.microsoft.com/office/drawing/2010/main">
+              <a14:hiddenEffects xmlns:a14="http://schemas.microsoft.com/office/drawing/2010/main" xmlns="">
                 <a:effectLst>
                   <a:outerShdw dist="35921" dir="2700000" algn="ctr" rotWithShape="0">
                     <a:srgbClr val="808080"/>
@@ -661,7 +662,7 @@
               </a14:hiddenEffects>
             </a:ext>
             <a:ext uri="{53640926-AAD7-44D8-BBD7-CCE9431645EC}">
-              <a14:shadowObscured xmlns="" xmlns:a14="http://schemas.microsoft.com/office/drawing/2010/main" val="1"/>
+              <a14:shadowObscured xmlns:a14="http://schemas.microsoft.com/office/drawing/2010/main" xmlns="" val="1"/>
             </a:ext>
           </a:extLst>
         </p:spPr>
@@ -691,14 +692,14 @@
           <a:effectLst/>
           <a:extLst>
             <a:ext uri="{909E8E84-426E-40DD-AFC4-6F175D3DCCD1}">
-              <a14:hiddenFill xmlns="" xmlns:a14="http://schemas.microsoft.com/office/drawing/2010/main">
+              <a14:hiddenFill xmlns:a14="http://schemas.microsoft.com/office/drawing/2010/main" xmlns="">
                 <a:solidFill>
                   <a:schemeClr val="accent1"/>
                 </a:solidFill>
               </a14:hiddenFill>
             </a:ext>
             <a:ext uri="{91240B29-F687-4F45-9708-019B960494DF}">
-              <a14:hiddenLine xmlns="" xmlns:a14="http://schemas.microsoft.com/office/drawing/2010/main" w="9525">
+              <a14:hiddenLine xmlns:a14="http://schemas.microsoft.com/office/drawing/2010/main" xmlns="" w="9525">
                 <a:solidFill>
                   <a:schemeClr val="tx1"/>
                 </a:solidFill>
@@ -708,7 +709,7 @@
               </a14:hiddenLine>
             </a:ext>
             <a:ext uri="{AF507438-7753-43E0-B8FC-AC1667EBCBE1}">
-              <a14:hiddenEffects xmlns="" xmlns:a14="http://schemas.microsoft.com/office/drawing/2010/main">
+              <a14:hiddenEffects xmlns:a14="http://schemas.microsoft.com/office/drawing/2010/main" xmlns="">
                 <a:effectLst>
                   <a:outerShdw dist="35921" dir="2700000" algn="ctr" rotWithShape="0">
                     <a:schemeClr val="bg2"/>
@@ -787,14 +788,14 @@
           <a:effectLst/>
           <a:extLst>
             <a:ext uri="{909E8E84-426E-40DD-AFC4-6F175D3DCCD1}">
-              <a14:hiddenFill xmlns="" xmlns:a14="http://schemas.microsoft.com/office/drawing/2010/main">
+              <a14:hiddenFill xmlns:a14="http://schemas.microsoft.com/office/drawing/2010/main" xmlns="">
                 <a:solidFill>
                   <a:schemeClr val="accent1"/>
                 </a:solidFill>
               </a14:hiddenFill>
             </a:ext>
             <a:ext uri="{91240B29-F687-4F45-9708-019B960494DF}">
-              <a14:hiddenLine xmlns="" xmlns:a14="http://schemas.microsoft.com/office/drawing/2010/main" w="9525">
+              <a14:hiddenLine xmlns:a14="http://schemas.microsoft.com/office/drawing/2010/main" xmlns="" w="9525">
                 <a:solidFill>
                   <a:schemeClr val="tx1"/>
                 </a:solidFill>
@@ -804,7 +805,7 @@
               </a14:hiddenLine>
             </a:ext>
             <a:ext uri="{AF507438-7753-43E0-B8FC-AC1667EBCBE1}">
-              <a14:hiddenEffects xmlns="" xmlns:a14="http://schemas.microsoft.com/office/drawing/2010/main">
+              <a14:hiddenEffects xmlns:a14="http://schemas.microsoft.com/office/drawing/2010/main" xmlns="">
                 <a:effectLst>
                   <a:outerShdw dist="35921" dir="2700000" algn="ctr" rotWithShape="0">
                     <a:schemeClr val="bg2"/>
@@ -857,14 +858,14 @@
           <a:effectLst/>
           <a:extLst>
             <a:ext uri="{909E8E84-426E-40DD-AFC4-6F175D3DCCD1}">
-              <a14:hiddenFill xmlns="" xmlns:a14="http://schemas.microsoft.com/office/drawing/2010/main">
+              <a14:hiddenFill xmlns:a14="http://schemas.microsoft.com/office/drawing/2010/main" xmlns="">
                 <a:solidFill>
                   <a:schemeClr val="accent1"/>
                 </a:solidFill>
               </a14:hiddenFill>
             </a:ext>
             <a:ext uri="{91240B29-F687-4F45-9708-019B960494DF}">
-              <a14:hiddenLine xmlns="" xmlns:a14="http://schemas.microsoft.com/office/drawing/2010/main" w="9525">
+              <a14:hiddenLine xmlns:a14="http://schemas.microsoft.com/office/drawing/2010/main" xmlns="" w="9525">
                 <a:solidFill>
                   <a:schemeClr val="tx1"/>
                 </a:solidFill>
@@ -874,7 +875,7 @@
               </a14:hiddenLine>
             </a:ext>
             <a:ext uri="{AF507438-7753-43E0-B8FC-AC1667EBCBE1}">
-              <a14:hiddenEffects xmlns="" xmlns:a14="http://schemas.microsoft.com/office/drawing/2010/main">
+              <a14:hiddenEffects xmlns:a14="http://schemas.microsoft.com/office/drawing/2010/main" xmlns="">
                 <a:effectLst>
                   <a:outerShdw dist="35921" dir="2700000" algn="ctr" rotWithShape="0">
                     <a:schemeClr val="bg2"/>
@@ -910,7 +911,7 @@
     </p:spTree>
     <p:extLst>
       <p:ext uri="{BB962C8B-B14F-4D97-AF65-F5344CB8AC3E}">
-        <p14:creationId xmlns="" xmlns:p14="http://schemas.microsoft.com/office/powerpoint/2010/main" val="3354467039"/>
+        <p14:creationId xmlns:p14="http://schemas.microsoft.com/office/powerpoint/2010/main" xmlns="" val="3354467039"/>
       </p:ext>
     </p:extLst>
   </p:cSld>
@@ -1277,7 +1278,18 @@
                 <a:ea typeface="+mn-ea"/>
                 <a:cs typeface="+mn-cs"/>
               </a:rPr>
-              <a:t> 어플리케이션들과 카메라와 </a:t>
+              <a:t> 어플리케이션들과 카메라와 센서 같은</a:t>
+            </a:r>
+            <a:r>
+              <a:rPr lang="ko-KR" altLang="en-US" sz="1200" kern="1200" dirty="0" smtClean="0">
+                <a:solidFill>
+                  <a:schemeClr val="tx1"/>
+                </a:solidFill>
+                <a:latin typeface="Arial" charset="0"/>
+                <a:ea typeface="+mn-ea"/>
+                <a:cs typeface="+mn-cs"/>
+              </a:rPr>
+              <a:t> 기능들</a:t>
             </a:r>
             <a:r>
               <a:rPr lang="ko-KR" altLang="ko-KR" sz="1200" kern="1200" dirty="0" smtClean="0">
@@ -1288,28 +1300,6 @@
                 <a:ea typeface="+mn-ea"/>
                 <a:cs typeface="+mn-cs"/>
               </a:rPr>
-              <a:t>센서 같은</a:t>
-            </a:r>
-            <a:r>
-              <a:rPr lang="ko-KR" altLang="en-US" sz="1200" kern="1200" dirty="0" smtClean="0">
-                <a:solidFill>
-                  <a:schemeClr val="tx1"/>
-                </a:solidFill>
-                <a:latin typeface="Arial" charset="0"/>
-                <a:ea typeface="+mn-ea"/>
-                <a:cs typeface="+mn-cs"/>
-              </a:rPr>
-              <a:t> 기능들</a:t>
-            </a:r>
-            <a:r>
-              <a:rPr lang="ko-KR" altLang="ko-KR" sz="1200" kern="1200" dirty="0" smtClean="0">
-                <a:solidFill>
-                  <a:schemeClr val="tx1"/>
-                </a:solidFill>
-                <a:latin typeface="Arial" charset="0"/>
-                <a:ea typeface="+mn-ea"/>
-                <a:cs typeface="+mn-cs"/>
-              </a:rPr>
               <a:t>을</a:t>
             </a:r>
             <a:r>
@@ -1321,18 +1311,7 @@
                 <a:ea typeface="+mn-ea"/>
                 <a:cs typeface="+mn-cs"/>
               </a:rPr>
-              <a:t> </a:t>
-            </a:r>
-            <a:r>
-              <a:rPr lang="en-US" altLang="ko-KR" sz="1200" kern="1200" dirty="0" smtClean="0">
-                <a:solidFill>
-                  <a:schemeClr val="tx1"/>
-                </a:solidFill>
-                <a:latin typeface="Arial" charset="0"/>
-                <a:ea typeface="+mn-ea"/>
-                <a:cs typeface="+mn-cs"/>
-              </a:rPr>
-              <a:t>USB</a:t>
+              <a:t> USB</a:t>
             </a:r>
             <a:r>
               <a:rPr lang="ko-KR" altLang="ko-KR" sz="1200" kern="1200" dirty="0" smtClean="0">
@@ -1716,29 +1695,7 @@
                 <a:ea typeface="+mn-ea"/>
                 <a:cs typeface="+mn-cs"/>
               </a:rPr>
-              <a:t>이 </a:t>
-            </a:r>
-            <a:r>
-              <a:rPr lang="ko-KR" altLang="en-US" sz="1200" kern="1200" dirty="0" smtClean="0">
-                <a:solidFill>
-                  <a:schemeClr val="tx1"/>
-                </a:solidFill>
-                <a:latin typeface="Arial" charset="0"/>
-                <a:ea typeface="+mn-ea"/>
-                <a:cs typeface="+mn-cs"/>
-              </a:rPr>
-              <a:t>외에도 스마트폰의 수 많은 다른 </a:t>
-            </a:r>
-            <a:r>
-              <a:rPr lang="ko-KR" altLang="en-US" sz="1200" kern="1200" dirty="0" smtClean="0">
-                <a:solidFill>
-                  <a:schemeClr val="tx1"/>
-                </a:solidFill>
-                <a:latin typeface="Arial" charset="0"/>
-                <a:ea typeface="+mn-ea"/>
-                <a:cs typeface="+mn-cs"/>
-              </a:rPr>
-              <a:t>기능들도 </a:t>
+              <a:t>이 외에도 스마트폰의 수 많은 다른 기능들도 </a:t>
             </a:r>
             <a:r>
               <a:rPr lang="en-US" altLang="ko-KR" sz="1200" kern="1200" dirty="0" smtClean="0">
@@ -2045,18 +2002,7 @@
                 <a:ea typeface="+mn-ea"/>
                 <a:cs typeface="+mn-cs"/>
               </a:rPr>
-              <a:t>어플리케이션을 </a:t>
-            </a:r>
-            <a:r>
-              <a:rPr lang="ko-KR" altLang="en-US" sz="1200" kern="1200" dirty="0" smtClean="0">
-                <a:solidFill>
-                  <a:schemeClr val="tx1"/>
-                </a:solidFill>
-                <a:latin typeface="Arial" charset="0"/>
-                <a:ea typeface="+mn-ea"/>
-                <a:cs typeface="+mn-cs"/>
-              </a:rPr>
-              <a:t>구현 했습니다</a:t>
+              <a:t>어플리케이션을 구현 했습니다</a:t>
             </a:r>
             <a:r>
               <a:rPr lang="en-US" altLang="ko-KR" sz="1200" kern="1200" dirty="0" smtClean="0">
@@ -2672,7 +2618,18 @@
                 <a:ea typeface="+mn-ea"/>
                 <a:cs typeface="+mn-cs"/>
               </a:rPr>
-              <a:t>에서 메시지를 전송하면 스마트폰에서 </a:t>
+              <a:t>에서 메시지를 전송하면 스마트폰에서 기본으로 설정된 키보드가 아닌 따로 구현한 소프트웨어 키보드로 입력한 것으로 인식합니다</a:t>
+            </a:r>
+            <a:r>
+              <a:rPr lang="en-US" altLang="ko-KR" sz="1200" kern="1200" dirty="0" smtClean="0">
+                <a:solidFill>
+                  <a:schemeClr val="tx1"/>
+                </a:solidFill>
+                <a:latin typeface="Arial" charset="0"/>
+                <a:ea typeface="+mn-ea"/>
+                <a:cs typeface="+mn-cs"/>
+              </a:rPr>
+              <a:t>. </a:t>
             </a:r>
             <a:r>
               <a:rPr lang="ko-KR" altLang="en-US" sz="1200" kern="1200" dirty="0" smtClean="0">
@@ -2683,7 +2640,18 @@
                 <a:ea typeface="+mn-ea"/>
                 <a:cs typeface="+mn-cs"/>
               </a:rPr>
-              <a:t>기본으로 설정된 </a:t>
+              <a:t>스마트폰 화면은 </a:t>
+            </a:r>
+            <a:r>
+              <a:rPr lang="ko-KR" altLang="en-US" sz="1200" kern="1200" dirty="0" err="1" smtClean="0">
+                <a:solidFill>
+                  <a:schemeClr val="tx1"/>
+                </a:solidFill>
+                <a:latin typeface="Arial" charset="0"/>
+                <a:ea typeface="+mn-ea"/>
+                <a:cs typeface="+mn-cs"/>
+              </a:rPr>
+              <a:t>캡쳐</a:t>
             </a:r>
             <a:r>
               <a:rPr lang="ko-KR" altLang="en-US" sz="1200" kern="1200" dirty="0" smtClean="0">
@@ -2694,7 +2662,7 @@
                 <a:ea typeface="+mn-ea"/>
                 <a:cs typeface="+mn-cs"/>
               </a:rPr>
-              <a:t>키보드가 아닌 따로 구현한 소프트웨어 키보드로 입력한 것으로 인식합니다</a:t>
+              <a:t> 해서 </a:t>
             </a:r>
             <a:r>
               <a:rPr lang="en-US" altLang="ko-KR" sz="1200" kern="1200" dirty="0" smtClean="0">
@@ -2705,7 +2673,7 @@
                 <a:ea typeface="+mn-ea"/>
                 <a:cs typeface="+mn-cs"/>
               </a:rPr>
-              <a:t>. </a:t>
+              <a:t>PC</a:t>
             </a:r>
             <a:r>
               <a:rPr lang="ko-KR" altLang="en-US" sz="1200" kern="1200" dirty="0" smtClean="0">
@@ -2716,62 +2684,7 @@
                 <a:ea typeface="+mn-ea"/>
                 <a:cs typeface="+mn-cs"/>
               </a:rPr>
-              <a:t>스마트폰 화면은 </a:t>
-            </a:r>
-            <a:r>
-              <a:rPr lang="ko-KR" altLang="en-US" sz="1200" kern="1200" dirty="0" err="1" smtClean="0">
-                <a:solidFill>
-                  <a:schemeClr val="tx1"/>
-                </a:solidFill>
-                <a:latin typeface="Arial" charset="0"/>
-                <a:ea typeface="+mn-ea"/>
-                <a:cs typeface="+mn-cs"/>
-              </a:rPr>
-              <a:t>캡쳐</a:t>
-            </a:r>
-            <a:r>
-              <a:rPr lang="ko-KR" altLang="en-US" sz="1200" kern="1200" dirty="0" smtClean="0">
-                <a:solidFill>
-                  <a:schemeClr val="tx1"/>
-                </a:solidFill>
-                <a:latin typeface="Arial" charset="0"/>
-                <a:ea typeface="+mn-ea"/>
-                <a:cs typeface="+mn-cs"/>
-              </a:rPr>
-              <a:t> 해서 </a:t>
-            </a:r>
-            <a:r>
-              <a:rPr lang="en-US" altLang="ko-KR" sz="1200" kern="1200" dirty="0" smtClean="0">
-                <a:solidFill>
-                  <a:schemeClr val="tx1"/>
-                </a:solidFill>
-                <a:latin typeface="Arial" charset="0"/>
-                <a:ea typeface="+mn-ea"/>
-                <a:cs typeface="+mn-cs"/>
-              </a:rPr>
-              <a:t>PC</a:t>
-            </a:r>
-            <a:r>
-              <a:rPr lang="ko-KR" altLang="en-US" sz="1200" kern="1200" dirty="0" smtClean="0">
-                <a:solidFill>
-                  <a:schemeClr val="tx1"/>
-                </a:solidFill>
-                <a:latin typeface="Arial" charset="0"/>
-                <a:ea typeface="+mn-ea"/>
-                <a:cs typeface="+mn-cs"/>
-              </a:rPr>
-              <a:t>로 </a:t>
-            </a:r>
-            <a:r>
-              <a:rPr lang="ko-KR" altLang="en-US" sz="1200" kern="1200" dirty="0" smtClean="0">
-                <a:solidFill>
-                  <a:schemeClr val="tx1"/>
-                </a:solidFill>
-                <a:latin typeface="Arial" charset="0"/>
-                <a:ea typeface="+mn-ea"/>
-                <a:cs typeface="+mn-cs"/>
-              </a:rPr>
-              <a:t>전송하는데</a:t>
+              <a:t>로 전송하는데</a:t>
             </a:r>
             <a:r>
               <a:rPr lang="en-US" altLang="ko-KR" sz="1200" kern="1200" dirty="0" smtClean="0">
@@ -2938,7 +2851,11 @@
             </a:r>
             <a:r>
               <a:rPr lang="ko-KR" altLang="en-US" dirty="0" smtClean="0"/>
-              <a:t>의 모습입니다</a:t>
+              <a:t>의 </a:t>
+            </a:r>
+            <a:r>
+              <a:rPr lang="ko-KR" altLang="en-US" dirty="0" smtClean="0"/>
+              <a:t>화면입니다</a:t>
             </a:r>
             <a:r>
               <a:rPr lang="en-US" altLang="ko-KR" dirty="0" smtClean="0"/>
@@ -2970,7 +2887,15 @@
             </a:r>
             <a:r>
               <a:rPr lang="ko-KR" altLang="en-US" baseline="0" dirty="0" smtClean="0"/>
-              <a:t> 어플리케이션을 통한 조작으로 마우스처럼 사용할 수 있습니다</a:t>
+              <a:t> 어플리케이션을 통한 조작으로 </a:t>
+            </a:r>
+            <a:r>
+              <a:rPr lang="ko-KR" altLang="en-US" baseline="0" dirty="0" smtClean="0"/>
+              <a:t>터치패드로 </a:t>
+            </a:r>
+            <a:r>
+              <a:rPr lang="ko-KR" altLang="en-US" baseline="0" dirty="0" smtClean="0"/>
+              <a:t>사용할 수 있습니다</a:t>
             </a:r>
             <a:r>
               <a:rPr lang="en-US" altLang="ko-KR" baseline="0" dirty="0" smtClean="0"/>
@@ -3051,6 +2976,391 @@
               <a:rPr lang="en-US" altLang="ko-KR" smtClean="0"/>
               <a:pPr/>
               <a:t>14</a:t>
+            </a:fld>
+            <a:endParaRPr lang="en-US" altLang="ko-KR"/>
+          </a:p>
+        </p:txBody>
+      </p:sp>
+    </p:spTree>
+  </p:cSld>
+  <p:clrMapOvr>
+    <a:masterClrMapping/>
+  </p:clrMapOvr>
+</p:notes>
+</file>
+
+<file path=ppt/notesSlides/notesSlide15.xml><?xml version="1.0" encoding="utf-8"?>
+<p:notes xmlns:a="http://schemas.openxmlformats.org/drawingml/2006/main" xmlns:r="http://schemas.openxmlformats.org/officeDocument/2006/relationships" xmlns:p="http://schemas.openxmlformats.org/presentationml/2006/main">
+  <p:cSld>
+    <p:spTree>
+      <p:nvGrpSpPr>
+        <p:cNvPr id="1" name=""/>
+        <p:cNvGrpSpPr/>
+        <p:nvPr/>
+      </p:nvGrpSpPr>
+      <p:grpSpPr>
+        <a:xfrm>
+          <a:off x="0" y="0"/>
+          <a:ext cx="0" cy="0"/>
+          <a:chOff x="0" y="0"/>
+          <a:chExt cx="0" cy="0"/>
+        </a:xfrm>
+      </p:grpSpPr>
+      <p:sp>
+        <p:nvSpPr>
+          <p:cNvPr id="2" name="슬라이드 이미지 개체 틀 1"/>
+          <p:cNvSpPr>
+            <a:spLocks noGrp="1" noRot="1" noChangeAspect="1"/>
+          </p:cNvSpPr>
+          <p:nvPr>
+            <p:ph type="sldImg"/>
+          </p:nvPr>
+        </p:nvSpPr>
+        <p:spPr/>
+      </p:sp>
+      <p:sp>
+        <p:nvSpPr>
+          <p:cNvPr id="3" name="슬라이드 노트 개체 틀 2"/>
+          <p:cNvSpPr>
+            <a:spLocks noGrp="1"/>
+          </p:cNvSpPr>
+          <p:nvPr>
+            <p:ph type="body" idx="1"/>
+          </p:nvPr>
+        </p:nvSpPr>
+        <p:spPr/>
+        <p:txBody>
+          <a:bodyPr>
+            <a:normAutofit/>
+          </a:bodyPr>
+          <a:lstStyle/>
+          <a:p>
+            <a:pPr marL="0" marR="0" indent="0" algn="just" defTabSz="914400" rtl="0" eaLnBrk="1" fontAlgn="base" latinLnBrk="0" hangingPunct="1">
+              <a:lnSpc>
+                <a:spcPct val="100000"/>
+              </a:lnSpc>
+              <a:spcBef>
+                <a:spcPct val="30000"/>
+              </a:spcBef>
+              <a:spcAft>
+                <a:spcPct val="0"/>
+              </a:spcAft>
+              <a:buClrTx/>
+              <a:buSzTx/>
+              <a:buFontTx/>
+              <a:buNone/>
+              <a:tabLst/>
+              <a:defRPr/>
+            </a:pPr>
+            <a:r>
+              <a:rPr lang="en-US" altLang="ko-KR" sz="1200" kern="1200" dirty="0" err="1" smtClean="0">
+                <a:solidFill>
+                  <a:schemeClr val="tx1"/>
+                </a:solidFill>
+                <a:latin typeface="Arial" charset="0"/>
+                <a:ea typeface="+mn-ea"/>
+                <a:cs typeface="+mn-cs"/>
+              </a:rPr>
+              <a:t>LTouchPad</a:t>
+            </a:r>
+            <a:r>
+              <a:rPr lang="en-US" altLang="ko-KR" sz="1200" kern="1200" dirty="0" smtClean="0">
+                <a:solidFill>
+                  <a:schemeClr val="tx1"/>
+                </a:solidFill>
+                <a:latin typeface="Arial" charset="0"/>
+                <a:ea typeface="+mn-ea"/>
+                <a:cs typeface="+mn-cs"/>
+              </a:rPr>
+              <a:t> </a:t>
+            </a:r>
+            <a:r>
+              <a:rPr lang="ko-KR" altLang="en-US" sz="1200" kern="1200" dirty="0" smtClean="0">
+                <a:solidFill>
+                  <a:schemeClr val="tx1"/>
+                </a:solidFill>
+                <a:latin typeface="Arial" charset="0"/>
+                <a:ea typeface="+mn-ea"/>
+                <a:cs typeface="+mn-cs"/>
+              </a:rPr>
+              <a:t>어플리케이션의 </a:t>
+            </a:r>
+            <a:r>
+              <a:rPr lang="ko-KR" altLang="en-US" sz="1200" kern="1200" dirty="0" smtClean="0">
+                <a:solidFill>
+                  <a:schemeClr val="tx1"/>
+                </a:solidFill>
+                <a:latin typeface="Arial" charset="0"/>
+                <a:ea typeface="+mn-ea"/>
+                <a:cs typeface="+mn-cs"/>
+              </a:rPr>
+              <a:t>구조입니다</a:t>
+            </a:r>
+            <a:r>
+              <a:rPr lang="en-US" altLang="ko-KR" sz="1200" kern="1200" dirty="0" smtClean="0">
+                <a:solidFill>
+                  <a:schemeClr val="tx1"/>
+                </a:solidFill>
+                <a:latin typeface="Arial" charset="0"/>
+                <a:ea typeface="+mn-ea"/>
+                <a:cs typeface="+mn-cs"/>
+              </a:rPr>
+              <a:t>. </a:t>
+            </a:r>
+            <a:r>
+              <a:rPr lang="ko-KR" altLang="en-US" sz="1200" kern="1200" dirty="0" err="1" smtClean="0">
+                <a:solidFill>
+                  <a:schemeClr val="tx1"/>
+                </a:solidFill>
+                <a:latin typeface="Arial" charset="0"/>
+                <a:ea typeface="+mn-ea"/>
+                <a:cs typeface="+mn-cs"/>
+              </a:rPr>
+              <a:t>스마트폰에서</a:t>
+            </a:r>
+            <a:r>
+              <a:rPr lang="ko-KR" altLang="en-US" sz="1200" kern="1200" dirty="0" smtClean="0">
+                <a:solidFill>
+                  <a:schemeClr val="tx1"/>
+                </a:solidFill>
+                <a:latin typeface="Arial" charset="0"/>
+                <a:ea typeface="+mn-ea"/>
+                <a:cs typeface="+mn-cs"/>
+              </a:rPr>
+              <a:t> </a:t>
+            </a:r>
+            <a:r>
+              <a:rPr lang="en-US" altLang="ko-KR" sz="1200" kern="1200" dirty="0" err="1" smtClean="0">
+                <a:solidFill>
+                  <a:schemeClr val="tx1"/>
+                </a:solidFill>
+                <a:latin typeface="Arial" charset="0"/>
+                <a:ea typeface="+mn-ea"/>
+                <a:cs typeface="+mn-cs"/>
+              </a:rPr>
+              <a:t>LTouchPad</a:t>
+            </a:r>
+            <a:r>
+              <a:rPr lang="ko-KR" altLang="en-US" sz="1200" kern="1200" dirty="0" smtClean="0">
+                <a:solidFill>
+                  <a:schemeClr val="tx1"/>
+                </a:solidFill>
+                <a:latin typeface="Arial" charset="0"/>
+                <a:ea typeface="+mn-ea"/>
+                <a:cs typeface="+mn-cs"/>
+              </a:rPr>
+              <a:t>를 실행하면 </a:t>
+            </a:r>
+            <a:r>
+              <a:rPr lang="en-US" altLang="ko-KR" sz="1200" kern="1200" dirty="0" smtClean="0">
+                <a:solidFill>
+                  <a:schemeClr val="tx1"/>
+                </a:solidFill>
+                <a:latin typeface="Arial" charset="0"/>
+                <a:ea typeface="+mn-ea"/>
+                <a:cs typeface="+mn-cs"/>
+              </a:rPr>
+              <a:t>USB/IP</a:t>
+            </a:r>
+            <a:r>
+              <a:rPr lang="ko-KR" altLang="en-US" sz="1200" kern="1200" dirty="0" smtClean="0">
+                <a:solidFill>
+                  <a:schemeClr val="tx1"/>
+                </a:solidFill>
+                <a:latin typeface="Arial" charset="0"/>
+                <a:ea typeface="+mn-ea"/>
+                <a:cs typeface="+mn-cs"/>
+              </a:rPr>
+              <a:t>를 통해 </a:t>
+            </a:r>
+            <a:r>
+              <a:rPr lang="en-US" altLang="ko-KR" sz="1200" kern="1200" dirty="0" smtClean="0">
+                <a:solidFill>
+                  <a:schemeClr val="tx1"/>
+                </a:solidFill>
+                <a:latin typeface="Arial" charset="0"/>
+                <a:ea typeface="+mn-ea"/>
+                <a:cs typeface="+mn-cs"/>
+              </a:rPr>
+              <a:t>PC</a:t>
+            </a:r>
+            <a:r>
+              <a:rPr lang="ko-KR" altLang="en-US" sz="1200" kern="1200" dirty="0" smtClean="0">
+                <a:solidFill>
+                  <a:schemeClr val="tx1"/>
+                </a:solidFill>
+                <a:latin typeface="Arial" charset="0"/>
+                <a:ea typeface="+mn-ea"/>
+                <a:cs typeface="+mn-cs"/>
+              </a:rPr>
+              <a:t>에게 자신의 장치 정보를 보냅니다</a:t>
+            </a:r>
+            <a:r>
+              <a:rPr lang="en-US" altLang="ko-KR" sz="1200" kern="1200" dirty="0" smtClean="0">
+                <a:solidFill>
+                  <a:schemeClr val="tx1"/>
+                </a:solidFill>
+                <a:latin typeface="Arial" charset="0"/>
+                <a:ea typeface="+mn-ea"/>
+                <a:cs typeface="+mn-cs"/>
+              </a:rPr>
+              <a:t>. PC</a:t>
+            </a:r>
+            <a:r>
+              <a:rPr lang="ko-KR" altLang="en-US" sz="1200" kern="1200" dirty="0" smtClean="0">
+                <a:solidFill>
+                  <a:schemeClr val="tx1"/>
+                </a:solidFill>
+                <a:latin typeface="Arial" charset="0"/>
+                <a:ea typeface="+mn-ea"/>
+                <a:cs typeface="+mn-cs"/>
+              </a:rPr>
+              <a:t>에선 마우스 장치가 연결된 것처럼 보이고</a:t>
+            </a:r>
+            <a:r>
+              <a:rPr lang="en-US" altLang="ko-KR" sz="1200" kern="1200" dirty="0" smtClean="0">
+                <a:solidFill>
+                  <a:schemeClr val="tx1"/>
+                </a:solidFill>
+                <a:latin typeface="Arial" charset="0"/>
+                <a:ea typeface="+mn-ea"/>
+                <a:cs typeface="+mn-cs"/>
+              </a:rPr>
+              <a:t>, </a:t>
+            </a:r>
+            <a:r>
+              <a:rPr lang="ko-KR" altLang="en-US" sz="1200" kern="1200" dirty="0" smtClean="0">
+                <a:solidFill>
+                  <a:schemeClr val="tx1"/>
+                </a:solidFill>
+                <a:latin typeface="Arial" charset="0"/>
+                <a:ea typeface="+mn-ea"/>
+                <a:cs typeface="+mn-cs"/>
+              </a:rPr>
+              <a:t>연결된 후 </a:t>
+            </a:r>
+            <a:r>
+              <a:rPr lang="en-US" altLang="ko-KR" sz="1200" kern="1200" dirty="0" err="1" smtClean="0">
+                <a:solidFill>
+                  <a:schemeClr val="tx1"/>
+                </a:solidFill>
+                <a:latin typeface="Arial" charset="0"/>
+                <a:ea typeface="+mn-ea"/>
+                <a:cs typeface="+mn-cs"/>
+              </a:rPr>
+              <a:t>LTouchPad</a:t>
+            </a:r>
+            <a:r>
+              <a:rPr lang="ko-KR" altLang="en-US" sz="1200" kern="1200" dirty="0" smtClean="0">
+                <a:solidFill>
+                  <a:schemeClr val="tx1"/>
+                </a:solidFill>
+                <a:latin typeface="Arial" charset="0"/>
+                <a:ea typeface="+mn-ea"/>
+                <a:cs typeface="+mn-cs"/>
+              </a:rPr>
+              <a:t>로 입력한 클릭</a:t>
+            </a:r>
+            <a:r>
+              <a:rPr lang="en-US" altLang="ko-KR" sz="1200" kern="1200" dirty="0" smtClean="0">
+                <a:solidFill>
+                  <a:schemeClr val="tx1"/>
+                </a:solidFill>
+                <a:latin typeface="Arial" charset="0"/>
+                <a:ea typeface="+mn-ea"/>
+                <a:cs typeface="+mn-cs"/>
+              </a:rPr>
+              <a:t>, </a:t>
+            </a:r>
+            <a:r>
+              <a:rPr lang="ko-KR" altLang="en-US" sz="1200" kern="1200" dirty="0" smtClean="0">
+                <a:solidFill>
+                  <a:schemeClr val="tx1"/>
+                </a:solidFill>
+                <a:latin typeface="Arial" charset="0"/>
+                <a:ea typeface="+mn-ea"/>
+                <a:cs typeface="+mn-cs"/>
+              </a:rPr>
+              <a:t>더블 클릭</a:t>
+            </a:r>
+            <a:r>
+              <a:rPr lang="en-US" altLang="ko-KR" sz="1200" kern="1200" dirty="0" smtClean="0">
+                <a:solidFill>
+                  <a:schemeClr val="tx1"/>
+                </a:solidFill>
+                <a:latin typeface="Arial" charset="0"/>
+                <a:ea typeface="+mn-ea"/>
+                <a:cs typeface="+mn-cs"/>
+              </a:rPr>
+              <a:t>, </a:t>
+            </a:r>
+            <a:r>
+              <a:rPr lang="ko-KR" altLang="en-US" sz="1200" kern="1200" dirty="0" smtClean="0">
+                <a:solidFill>
+                  <a:schemeClr val="tx1"/>
+                </a:solidFill>
+                <a:latin typeface="Arial" charset="0"/>
+                <a:ea typeface="+mn-ea"/>
+                <a:cs typeface="+mn-cs"/>
+              </a:rPr>
+              <a:t>이동 등의 정보를 전송하여 </a:t>
+            </a:r>
+            <a:r>
+              <a:rPr lang="en-US" altLang="ko-KR" sz="1200" kern="1200" dirty="0" smtClean="0">
+                <a:solidFill>
+                  <a:schemeClr val="tx1"/>
+                </a:solidFill>
+                <a:latin typeface="Arial" charset="0"/>
+                <a:ea typeface="+mn-ea"/>
+                <a:cs typeface="+mn-cs"/>
+              </a:rPr>
+              <a:t>PC</a:t>
+            </a:r>
+            <a:r>
+              <a:rPr lang="ko-KR" altLang="en-US" sz="1200" kern="1200" dirty="0" smtClean="0">
+                <a:solidFill>
+                  <a:schemeClr val="tx1"/>
+                </a:solidFill>
+                <a:latin typeface="Arial" charset="0"/>
+                <a:ea typeface="+mn-ea"/>
+                <a:cs typeface="+mn-cs"/>
+              </a:rPr>
+              <a:t>에서 터치패드로 사용 할 수 있습니다</a:t>
+            </a:r>
+            <a:r>
+              <a:rPr lang="en-US" altLang="ko-KR" sz="1200" kern="1200" dirty="0" smtClean="0">
+                <a:solidFill>
+                  <a:schemeClr val="tx1"/>
+                </a:solidFill>
+                <a:latin typeface="Arial" charset="0"/>
+                <a:ea typeface="+mn-ea"/>
+                <a:cs typeface="+mn-cs"/>
+              </a:rPr>
+              <a:t>.</a:t>
+            </a:r>
+            <a:endParaRPr lang="ko-KR" altLang="en-US" dirty="0"/>
+          </a:p>
+        </p:txBody>
+      </p:sp>
+      <p:sp>
+        <p:nvSpPr>
+          <p:cNvPr id="4" name="슬라이드 번호 개체 틀 3"/>
+          <p:cNvSpPr>
+            <a:spLocks noGrp="1"/>
+          </p:cNvSpPr>
+          <p:nvPr>
+            <p:ph type="sldNum" sz="quarter" idx="10"/>
+          </p:nvPr>
+        </p:nvSpPr>
+        <p:spPr/>
+        <p:txBody>
+          <a:bodyPr/>
+          <a:lstStyle/>
+          <a:p>
+            <a:fld id="{A606312C-0A6A-4281-8CFC-2032C6C14C8F}" type="slidenum">
+              <a:rPr lang="en-US" altLang="ko-KR" smtClean="0"/>
+              <a:pPr/>
+              <a:t>15</a:t>
             </a:fld>
             <a:endParaRPr lang="en-US" altLang="ko-KR"/>
           </a:p>
@@ -3427,7 +3737,7 @@
     </p:spTree>
     <p:extLst>
       <p:ext uri="{BB962C8B-B14F-4D97-AF65-F5344CB8AC3E}">
-        <p14:creationId xmlns="" xmlns:p14="http://schemas.microsoft.com/office/powerpoint/2010/main" val="483073219"/>
+        <p14:creationId xmlns:p14="http://schemas.microsoft.com/office/powerpoint/2010/main" xmlns="" val="483073219"/>
       </p:ext>
     </p:extLst>
   </p:cSld>
@@ -3613,29 +3923,7 @@
                 <a:ea typeface="+mn-ea"/>
                 <a:cs typeface="+mn-cs"/>
               </a:rPr>
-              <a:t>가능한 환경에서는 스마트폰의 </a:t>
-            </a:r>
-            <a:r>
-              <a:rPr lang="ko-KR" altLang="ko-KR" sz="1200" kern="1200" dirty="0" smtClean="0">
-                <a:solidFill>
-                  <a:schemeClr val="tx1"/>
-                </a:solidFill>
-                <a:latin typeface="Arial" charset="0"/>
-                <a:ea typeface="+mn-ea"/>
-                <a:cs typeface="+mn-cs"/>
-              </a:rPr>
-              <a:t>많은 </a:t>
-            </a:r>
-            <a:r>
-              <a:rPr lang="ko-KR" altLang="ko-KR" sz="1200" kern="1200" dirty="0" smtClean="0">
-                <a:solidFill>
-                  <a:schemeClr val="tx1"/>
-                </a:solidFill>
-                <a:latin typeface="Arial" charset="0"/>
-                <a:ea typeface="+mn-ea"/>
-                <a:cs typeface="+mn-cs"/>
-              </a:rPr>
-              <a:t>서비스들을 </a:t>
+              <a:t>가능한 환경에서는 스마트폰의 많은 서비스들을 </a:t>
             </a:r>
             <a:r>
               <a:rPr lang="en-US" altLang="ko-KR" sz="1200" kern="1200" dirty="0" smtClean="0">
@@ -3787,11 +4075,7 @@
             </a:r>
             <a:r>
               <a:rPr lang="ko-KR" altLang="en-US" dirty="0" smtClean="0"/>
-              <a:t>는 </a:t>
-            </a:r>
-            <a:r>
-              <a:rPr lang="ko-KR" altLang="en-US" dirty="0" smtClean="0"/>
-              <a:t>기존에는 </a:t>
+              <a:t>는 기존에는 </a:t>
             </a:r>
             <a:r>
               <a:rPr lang="en-US" altLang="ko-KR" dirty="0" smtClean="0"/>
@@ -3799,11 +4083,7 @@
             </a:r>
             <a:r>
               <a:rPr lang="ko-KR" altLang="en-US" dirty="0" smtClean="0"/>
-              <a:t>와 주변 기기의 </a:t>
-            </a:r>
-            <a:r>
-              <a:rPr lang="ko-KR" altLang="en-US" dirty="0" smtClean="0"/>
-              <a:t>연결방식이 매우 다양해서 불편함이 많았는데</a:t>
+              <a:t>와 주변 기기의 연결방식이 매우 다양해서 불편함이 많았는데</a:t>
             </a:r>
             <a:r>
               <a:rPr lang="en-US" altLang="ko-KR" dirty="0" smtClean="0"/>
@@ -3811,11 +4091,15 @@
             </a:r>
             <a:r>
               <a:rPr lang="ko-KR" altLang="en-US" dirty="0" smtClean="0"/>
-              <a:t>는 이런 다양한 연결방식을 통합하기위해 만들어진 </a:t>
+              <a:t>는 이런 다양한 연결방식을 </a:t>
             </a:r>
             <a:r>
               <a:rPr lang="ko-KR" altLang="en-US" dirty="0" smtClean="0"/>
-              <a:t>입출력 표준으로써</a:t>
+              <a:t>통합하기 위해 </a:t>
+            </a:r>
+            <a:r>
+              <a:rPr lang="ko-KR" altLang="en-US" dirty="0" smtClean="0"/>
+              <a:t>만들어진 입출력 표준으로써</a:t>
             </a:r>
             <a:r>
               <a:rPr lang="en-US" altLang="ko-KR" dirty="0" smtClean="0"/>
@@ -4195,7 +4479,7 @@
                 <a:ea typeface="+mn-ea"/>
                 <a:cs typeface="+mn-cs"/>
               </a:rPr>
-              <a:t>.</a:t>
+              <a:t>. </a:t>
             </a:r>
             <a:r>
               <a:rPr lang="ko-KR" altLang="en-US" sz="1200" kern="1200" dirty="0" smtClean="0">
@@ -4206,7 +4490,18 @@
                 <a:ea typeface="+mn-ea"/>
                 <a:cs typeface="+mn-cs"/>
               </a:rPr>
-              <a:t>이것은 앞 슬라이드에서 설명 드렸듯이 많은 </a:t>
+              <a:t>이것은 </a:t>
+            </a:r>
+            <a:r>
+              <a:rPr lang="ko-KR" altLang="en-US" sz="1200" kern="1200" dirty="0" smtClean="0">
+                <a:solidFill>
+                  <a:schemeClr val="tx1"/>
+                </a:solidFill>
+                <a:latin typeface="Arial" charset="0"/>
+                <a:ea typeface="+mn-ea"/>
+                <a:cs typeface="+mn-cs"/>
+              </a:rPr>
+              <a:t>앞 슬라이드에서 설명 드렸듯이 많은 </a:t>
             </a:r>
             <a:r>
               <a:rPr lang="en-US" altLang="ko-KR" sz="1200" kern="1200" dirty="0" smtClean="0">
@@ -4228,7 +4523,18 @@
                 <a:ea typeface="+mn-ea"/>
                 <a:cs typeface="+mn-cs"/>
               </a:rPr>
-              <a:t>의 장점이 있기때문에 </a:t>
+              <a:t>의 장점이 </a:t>
+            </a:r>
+            <a:r>
+              <a:rPr lang="ko-KR" altLang="en-US" sz="1200" kern="1200" dirty="0" smtClean="0">
+                <a:solidFill>
+                  <a:schemeClr val="tx1"/>
+                </a:solidFill>
+                <a:latin typeface="Arial" charset="0"/>
+                <a:ea typeface="+mn-ea"/>
+                <a:cs typeface="+mn-cs"/>
+              </a:rPr>
+              <a:t>있기 때문에 </a:t>
             </a:r>
             <a:r>
               <a:rPr lang="en-US" altLang="ko-KR" sz="1200" kern="1200" dirty="0" smtClean="0">
@@ -5024,18 +5330,7 @@
                 <a:ea typeface="+mn-ea"/>
                 <a:cs typeface="+mn-cs"/>
               </a:rPr>
-              <a:t>카메라 </a:t>
-            </a:r>
-            <a:r>
-              <a:rPr lang="ko-KR" altLang="en-US" sz="1200" kern="1200" dirty="0" smtClean="0">
-                <a:solidFill>
-                  <a:schemeClr val="tx1"/>
-                </a:solidFill>
-                <a:latin typeface="Arial" charset="0"/>
-                <a:ea typeface="+mn-ea"/>
-                <a:cs typeface="+mn-cs"/>
-              </a:rPr>
-              <a:t>어플리케이션도 </a:t>
+              <a:t>카메라 어플리케이션도 </a:t>
             </a:r>
             <a:r>
               <a:rPr lang="en-US" altLang="ko-KR" sz="1200" kern="1200" dirty="0" smtClean="0">
@@ -5375,7 +5670,18 @@
                 <a:ea typeface="+mn-ea"/>
                 <a:cs typeface="+mn-cs"/>
               </a:rPr>
-              <a:t>용 프로그램들을 </a:t>
+              <a:t>용 프로그램들을 수정 없이 사용할 수 있다는 장점을 갖습니다</a:t>
+            </a:r>
+            <a:r>
+              <a:rPr lang="en-US" altLang="ko-KR" sz="1200" kern="1200" dirty="0" smtClean="0">
+                <a:solidFill>
+                  <a:schemeClr val="tx1"/>
+                </a:solidFill>
+                <a:latin typeface="Arial" charset="0"/>
+                <a:ea typeface="+mn-ea"/>
+                <a:cs typeface="+mn-cs"/>
+              </a:rPr>
+              <a:t>. </a:t>
             </a:r>
             <a:r>
               <a:rPr lang="ko-KR" altLang="en-US" sz="1200" kern="1200" dirty="0" smtClean="0">
@@ -5386,7 +5692,7 @@
                 <a:ea typeface="+mn-ea"/>
                 <a:cs typeface="+mn-cs"/>
               </a:rPr>
-              <a:t>수정 없이 사용할 수 있다는 장점을 갖습니다</a:t>
+              <a:t>하지만 </a:t>
             </a:r>
             <a:r>
               <a:rPr lang="en-US" altLang="ko-KR" sz="1200" kern="1200" dirty="0" smtClean="0">
@@ -5397,7 +5703,7 @@
                 <a:ea typeface="+mn-ea"/>
                 <a:cs typeface="+mn-cs"/>
               </a:rPr>
-              <a:t>. </a:t>
+              <a:t>TCP/IP</a:t>
             </a:r>
             <a:r>
               <a:rPr lang="ko-KR" altLang="en-US" sz="1200" kern="1200" dirty="0" smtClean="0">
@@ -5408,7 +5714,7 @@
                 <a:ea typeface="+mn-ea"/>
                 <a:cs typeface="+mn-cs"/>
               </a:rPr>
-              <a:t>하지만 </a:t>
+              <a:t>로 연결해서 </a:t>
             </a:r>
             <a:r>
               <a:rPr lang="en-US" altLang="ko-KR" sz="1200" kern="1200" dirty="0" smtClean="0">
@@ -5419,7 +5725,7 @@
                 <a:ea typeface="+mn-ea"/>
                 <a:cs typeface="+mn-cs"/>
               </a:rPr>
-              <a:t>TCP/IP</a:t>
+              <a:t>USB</a:t>
             </a:r>
             <a:r>
               <a:rPr lang="ko-KR" altLang="en-US" sz="1200" kern="1200" dirty="0" smtClean="0">
@@ -5430,40 +5736,7 @@
                 <a:ea typeface="+mn-ea"/>
                 <a:cs typeface="+mn-cs"/>
               </a:rPr>
-              <a:t>로 연결해서 </a:t>
-            </a:r>
-            <a:r>
-              <a:rPr lang="en-US" altLang="ko-KR" sz="1200" kern="1200" dirty="0" smtClean="0">
-                <a:solidFill>
-                  <a:schemeClr val="tx1"/>
-                </a:solidFill>
-                <a:latin typeface="Arial" charset="0"/>
-                <a:ea typeface="+mn-ea"/>
-                <a:cs typeface="+mn-cs"/>
-              </a:rPr>
-              <a:t>USB</a:t>
-            </a:r>
-            <a:r>
-              <a:rPr lang="ko-KR" altLang="en-US" sz="1200" kern="1200" dirty="0" smtClean="0">
-                <a:solidFill>
-                  <a:schemeClr val="tx1"/>
-                </a:solidFill>
-                <a:latin typeface="Arial" charset="0"/>
-                <a:ea typeface="+mn-ea"/>
-                <a:cs typeface="+mn-cs"/>
-              </a:rPr>
-              <a:t>장치를 사용하려면 프로그램 수정 해야 </a:t>
-            </a:r>
-            <a:r>
-              <a:rPr lang="ko-KR" altLang="en-US" sz="1200" kern="1200" dirty="0" smtClean="0">
-                <a:solidFill>
-                  <a:schemeClr val="tx1"/>
-                </a:solidFill>
-                <a:latin typeface="Arial" charset="0"/>
-                <a:ea typeface="+mn-ea"/>
-                <a:cs typeface="+mn-cs"/>
-              </a:rPr>
-              <a:t>되는 문제점이 있습니다</a:t>
+              <a:t>장치를 사용하려면 프로그램 수정 해야 되는 문제점이 있습니다</a:t>
             </a:r>
             <a:r>
               <a:rPr lang="en-US" altLang="ko-KR" sz="1200" kern="1200" dirty="0" smtClean="0">
@@ -5565,7 +5838,7 @@
           </a:xfrm>
           <a:extLst>
             <a:ext uri="{AF507438-7753-43E0-B8FC-AC1667EBCBE1}">
-              <a14:hiddenEffects xmlns="" xmlns:a14="http://schemas.microsoft.com/office/drawing/2010/main">
+              <a14:hiddenEffects xmlns:a14="http://schemas.microsoft.com/office/drawing/2010/main" xmlns="">
                 <a:effectLst>
                   <a:outerShdw dist="17961" dir="2700000" algn="ctr" rotWithShape="0">
                     <a:schemeClr val="bg1"/>
@@ -5609,7 +5882,7 @@
           </a:xfrm>
           <a:extLst>
             <a:ext uri="{AF507438-7753-43E0-B8FC-AC1667EBCBE1}">
-              <a14:hiddenEffects xmlns="" xmlns:a14="http://schemas.microsoft.com/office/drawing/2010/main">
+              <a14:hiddenEffects xmlns:a14="http://schemas.microsoft.com/office/drawing/2010/main" xmlns="">
                 <a:effectLst>
                   <a:outerShdw dist="17961" dir="2700000" algn="ctr" rotWithShape="0">
                     <a:schemeClr val="bg1"/>
@@ -5745,7 +6018,7 @@
     </p:spTree>
     <p:extLst>
       <p:ext uri="{BB962C8B-B14F-4D97-AF65-F5344CB8AC3E}">
-        <p14:creationId xmlns="" xmlns:p14="http://schemas.microsoft.com/office/powerpoint/2010/main" val="3191849363"/>
+        <p14:creationId xmlns:p14="http://schemas.microsoft.com/office/powerpoint/2010/main" xmlns="" val="3191849363"/>
       </p:ext>
     </p:extLst>
   </p:cSld>
@@ -5860,7 +6133,7 @@
     </p:spTree>
     <p:extLst>
       <p:ext uri="{BB962C8B-B14F-4D97-AF65-F5344CB8AC3E}">
-        <p14:creationId xmlns="" xmlns:p14="http://schemas.microsoft.com/office/powerpoint/2010/main" val="1524186507"/>
+        <p14:creationId xmlns:p14="http://schemas.microsoft.com/office/powerpoint/2010/main" xmlns="" val="1524186507"/>
       </p:ext>
     </p:extLst>
   </p:cSld>
@@ -5965,7 +6238,7 @@
     </p:spTree>
     <p:extLst>
       <p:ext uri="{BB962C8B-B14F-4D97-AF65-F5344CB8AC3E}">
-        <p14:creationId xmlns="" xmlns:p14="http://schemas.microsoft.com/office/powerpoint/2010/main" val="3261712152"/>
+        <p14:creationId xmlns:p14="http://schemas.microsoft.com/office/powerpoint/2010/main" xmlns="" val="3261712152"/>
       </p:ext>
     </p:extLst>
   </p:cSld>
@@ -6092,7 +6365,7 @@
     </p:spTree>
     <p:extLst>
       <p:ext uri="{BB962C8B-B14F-4D97-AF65-F5344CB8AC3E}">
-        <p14:creationId xmlns="" xmlns:p14="http://schemas.microsoft.com/office/powerpoint/2010/main" val="346190723"/>
+        <p14:creationId xmlns:p14="http://schemas.microsoft.com/office/powerpoint/2010/main" xmlns="" val="346190723"/>
       </p:ext>
     </p:extLst>
   </p:cSld>
@@ -6315,7 +6588,7 @@
     </p:spTree>
     <p:extLst>
       <p:ext uri="{BB962C8B-B14F-4D97-AF65-F5344CB8AC3E}">
-        <p14:creationId xmlns="" xmlns:p14="http://schemas.microsoft.com/office/powerpoint/2010/main" val="4255224362"/>
+        <p14:creationId xmlns:p14="http://schemas.microsoft.com/office/powerpoint/2010/main" xmlns="" val="4255224362"/>
       </p:ext>
     </p:extLst>
   </p:cSld>
@@ -6677,7 +6950,7 @@
     </p:spTree>
     <p:extLst>
       <p:ext uri="{BB962C8B-B14F-4D97-AF65-F5344CB8AC3E}">
-        <p14:creationId xmlns="" xmlns:p14="http://schemas.microsoft.com/office/powerpoint/2010/main" val="234523478"/>
+        <p14:creationId xmlns:p14="http://schemas.microsoft.com/office/powerpoint/2010/main" xmlns="" val="234523478"/>
       </p:ext>
     </p:extLst>
   </p:cSld>
@@ -6730,7 +7003,7 @@
     </p:spTree>
     <p:extLst>
       <p:ext uri="{BB962C8B-B14F-4D97-AF65-F5344CB8AC3E}">
-        <p14:creationId xmlns="" xmlns:p14="http://schemas.microsoft.com/office/powerpoint/2010/main" val="4170126094"/>
+        <p14:creationId xmlns:p14="http://schemas.microsoft.com/office/powerpoint/2010/main" xmlns="" val="4170126094"/>
       </p:ext>
     </p:extLst>
   </p:cSld>
@@ -6760,7 +7033,7 @@
     </p:spTree>
     <p:extLst>
       <p:ext uri="{BB962C8B-B14F-4D97-AF65-F5344CB8AC3E}">
-        <p14:creationId xmlns="" xmlns:p14="http://schemas.microsoft.com/office/powerpoint/2010/main" val="3131819388"/>
+        <p14:creationId xmlns:p14="http://schemas.microsoft.com/office/powerpoint/2010/main" xmlns="" val="3131819388"/>
       </p:ext>
     </p:extLst>
   </p:cSld>
@@ -6972,7 +7245,7 @@
     </p:spTree>
     <p:extLst>
       <p:ext uri="{BB962C8B-B14F-4D97-AF65-F5344CB8AC3E}">
-        <p14:creationId xmlns="" xmlns:p14="http://schemas.microsoft.com/office/powerpoint/2010/main" val="1266256783"/>
+        <p14:creationId xmlns:p14="http://schemas.microsoft.com/office/powerpoint/2010/main" xmlns="" val="1266256783"/>
       </p:ext>
     </p:extLst>
   </p:cSld>
@@ -7164,7 +7437,7 @@
     </p:spTree>
     <p:extLst>
       <p:ext uri="{BB962C8B-B14F-4D97-AF65-F5344CB8AC3E}">
-        <p14:creationId xmlns="" xmlns:p14="http://schemas.microsoft.com/office/powerpoint/2010/main" val="511494401"/>
+        <p14:creationId xmlns:p14="http://schemas.microsoft.com/office/powerpoint/2010/main" xmlns="" val="511494401"/>
       </p:ext>
     </p:extLst>
   </p:cSld>
@@ -7228,14 +7501,14 @@
           <a:effectLst/>
           <a:extLst>
             <a:ext uri="{909E8E84-426E-40DD-AFC4-6F175D3DCCD1}">
-              <a14:hiddenFill xmlns="" xmlns:a14="http://schemas.microsoft.com/office/drawing/2010/main">
+              <a14:hiddenFill xmlns:a14="http://schemas.microsoft.com/office/drawing/2010/main" xmlns="">
                 <a:solidFill>
                   <a:schemeClr val="accent1"/>
                 </a:solidFill>
               </a14:hiddenFill>
             </a:ext>
             <a:ext uri="{91240B29-F687-4F45-9708-019B960494DF}">
-              <a14:hiddenLine xmlns="" xmlns:a14="http://schemas.microsoft.com/office/drawing/2010/main" w="9525">
+              <a14:hiddenLine xmlns:a14="http://schemas.microsoft.com/office/drawing/2010/main" xmlns="" w="9525">
                 <a:solidFill>
                   <a:schemeClr val="tx1"/>
                 </a:solidFill>
@@ -7245,7 +7518,7 @@
               </a14:hiddenLine>
             </a:ext>
             <a:ext uri="{AF507438-7753-43E0-B8FC-AC1667EBCBE1}">
-              <a14:hiddenEffects xmlns="" xmlns:a14="http://schemas.microsoft.com/office/drawing/2010/main">
+              <a14:hiddenEffects xmlns:a14="http://schemas.microsoft.com/office/drawing/2010/main" xmlns="">
                 <a:effectLst>
                   <a:outerShdw dist="35921" dir="2700000" algn="ctr" rotWithShape="0">
                     <a:schemeClr val="bg2"/>
@@ -7297,14 +7570,14 @@
           <a:effectLst/>
           <a:extLst>
             <a:ext uri="{909E8E84-426E-40DD-AFC4-6F175D3DCCD1}">
-              <a14:hiddenFill xmlns="" xmlns:a14="http://schemas.microsoft.com/office/drawing/2010/main">
+              <a14:hiddenFill xmlns:a14="http://schemas.microsoft.com/office/drawing/2010/main" xmlns="">
                 <a:solidFill>
                   <a:schemeClr val="accent1"/>
                 </a:solidFill>
               </a14:hiddenFill>
             </a:ext>
             <a:ext uri="{91240B29-F687-4F45-9708-019B960494DF}">
-              <a14:hiddenLine xmlns="" xmlns:a14="http://schemas.microsoft.com/office/drawing/2010/main" w="9525">
+              <a14:hiddenLine xmlns:a14="http://schemas.microsoft.com/office/drawing/2010/main" xmlns="" w="9525">
                 <a:solidFill>
                   <a:schemeClr val="tx1"/>
                 </a:solidFill>
@@ -7314,7 +7587,7 @@
               </a14:hiddenLine>
             </a:ext>
             <a:ext uri="{AF507438-7753-43E0-B8FC-AC1667EBCBE1}">
-              <a14:hiddenEffects xmlns="" xmlns:a14="http://schemas.microsoft.com/office/drawing/2010/main">
+              <a14:hiddenEffects xmlns:a14="http://schemas.microsoft.com/office/drawing/2010/main" xmlns="">
                 <a:effectLst>
                   <a:outerShdw dist="35921" dir="2700000" algn="ctr" rotWithShape="0">
                     <a:schemeClr val="bg2"/>
@@ -7823,7 +8096,7 @@
             <a:blip r:embed="rId4" cstate="print">
               <a:extLst>
                 <a:ext uri="{28A0092B-C50C-407E-A947-70E740481C1C}">
-                  <a14:useLocalDpi xmlns="" xmlns:a14="http://schemas.microsoft.com/office/drawing/2010/main" val="0"/>
+                  <a14:useLocalDpi xmlns:a14="http://schemas.microsoft.com/office/drawing/2010/main" xmlns="" val="0"/>
                 </a:ext>
               </a:extLst>
             </a:blip>
@@ -7843,7 +8116,7 @@
             <a:noFill/>
             <a:extLst>
               <a:ext uri="{909E8E84-426E-40DD-AFC4-6F175D3DCCD1}">
-                <a14:hiddenFill xmlns="" xmlns:a14="http://schemas.microsoft.com/office/drawing/2010/main">
+                <a14:hiddenFill xmlns:a14="http://schemas.microsoft.com/office/drawing/2010/main" xmlns="">
                   <a:solidFill>
                     <a:srgbClr val="FFFFFF"/>
                   </a:solidFill>
@@ -7862,7 +8135,7 @@
           <p:nvPr>
             <p:extLst>
               <p:ext uri="{D42A27DB-BD31-4B8C-83A1-F6EECF244321}">
-                <p14:modId xmlns="" xmlns:p14="http://schemas.microsoft.com/office/powerpoint/2010/main" val="3019215210"/>
+                <p14:modId xmlns:p14="http://schemas.microsoft.com/office/powerpoint/2010/main" xmlns="" val="3019215210"/>
               </p:ext>
             </p:extLst>
           </p:nvPr>
@@ -8736,7 +9009,7 @@
           <a:blip r:embed="rId3" cstate="print">
             <a:extLst>
               <a:ext uri="{28A0092B-C50C-407E-A947-70E740481C1C}">
-                <a14:useLocalDpi xmlns="" xmlns:a14="http://schemas.microsoft.com/office/drawing/2010/main" val="0"/>
+                <a14:useLocalDpi xmlns:a14="http://schemas.microsoft.com/office/drawing/2010/main" xmlns="" val="0"/>
               </a:ext>
             </a:extLst>
           </a:blip>
@@ -8861,7 +9134,7 @@
           <a:blip r:embed="rId4" cstate="print">
             <a:extLst>
               <a:ext uri="{28A0092B-C50C-407E-A947-70E740481C1C}">
-                <a14:useLocalDpi xmlns="" xmlns:a14="http://schemas.microsoft.com/office/drawing/2010/main" val="0"/>
+                <a14:useLocalDpi xmlns:a14="http://schemas.microsoft.com/office/drawing/2010/main" xmlns="" val="0"/>
               </a:ext>
             </a:extLst>
           </a:blip>
@@ -8881,7 +9154,7 @@
           <a:noFill/>
           <a:extLst>
             <a:ext uri="{909E8E84-426E-40DD-AFC4-6F175D3DCCD1}">
-              <a14:hiddenFill xmlns="" xmlns:a14="http://schemas.microsoft.com/office/drawing/2010/main">
+              <a14:hiddenFill xmlns:a14="http://schemas.microsoft.com/office/drawing/2010/main" xmlns="">
                 <a:solidFill>
                   <a:srgbClr val="FFFFFF"/>
                 </a:solidFill>
@@ -8902,7 +9175,7 @@
           <a:blip r:embed="rId5" cstate="print">
             <a:extLst>
               <a:ext uri="{28A0092B-C50C-407E-A947-70E740481C1C}">
-                <a14:useLocalDpi xmlns="" xmlns:a14="http://schemas.microsoft.com/office/drawing/2010/main" val="0"/>
+                <a14:useLocalDpi xmlns:a14="http://schemas.microsoft.com/office/drawing/2010/main" xmlns="" val="0"/>
               </a:ext>
             </a:extLst>
           </a:blip>
@@ -8922,7 +9195,7 @@
           <a:noFill/>
           <a:extLst>
             <a:ext uri="{909E8E84-426E-40DD-AFC4-6F175D3DCCD1}">
-              <a14:hiddenFill xmlns="" xmlns:a14="http://schemas.microsoft.com/office/drawing/2010/main">
+              <a14:hiddenFill xmlns:a14="http://schemas.microsoft.com/office/drawing/2010/main" xmlns="">
                 <a:solidFill>
                   <a:srgbClr val="FFFFFF"/>
                 </a:solidFill>
@@ -8943,7 +9216,7 @@
           <a:blip r:embed="rId6" cstate="print">
             <a:extLst>
               <a:ext uri="{28A0092B-C50C-407E-A947-70E740481C1C}">
-                <a14:useLocalDpi xmlns="" xmlns:a14="http://schemas.microsoft.com/office/drawing/2010/main" val="0"/>
+                <a14:useLocalDpi xmlns:a14="http://schemas.microsoft.com/office/drawing/2010/main" xmlns="" val="0"/>
               </a:ext>
             </a:extLst>
           </a:blip>
@@ -8963,7 +9236,7 @@
           <a:noFill/>
           <a:extLst>
             <a:ext uri="{909E8E84-426E-40DD-AFC4-6F175D3DCCD1}">
-              <a14:hiddenFill xmlns="" xmlns:a14="http://schemas.microsoft.com/office/drawing/2010/main">
+              <a14:hiddenFill xmlns:a14="http://schemas.microsoft.com/office/drawing/2010/main" xmlns="">
                 <a:solidFill>
                   <a:srgbClr val="FFFFFF"/>
                 </a:solidFill>
@@ -8984,7 +9257,7 @@
           <a:blip r:embed="rId5" cstate="print">
             <a:extLst>
               <a:ext uri="{28A0092B-C50C-407E-A947-70E740481C1C}">
-                <a14:useLocalDpi xmlns="" xmlns:a14="http://schemas.microsoft.com/office/drawing/2010/main" val="0"/>
+                <a14:useLocalDpi xmlns:a14="http://schemas.microsoft.com/office/drawing/2010/main" xmlns="" val="0"/>
               </a:ext>
             </a:extLst>
           </a:blip>
@@ -9004,7 +9277,7 @@
           <a:noFill/>
           <a:extLst>
             <a:ext uri="{909E8E84-426E-40DD-AFC4-6F175D3DCCD1}">
-              <a14:hiddenFill xmlns="" xmlns:a14="http://schemas.microsoft.com/office/drawing/2010/main">
+              <a14:hiddenFill xmlns:a14="http://schemas.microsoft.com/office/drawing/2010/main" xmlns="">
                 <a:solidFill>
                   <a:srgbClr val="FFFFFF"/>
                 </a:solidFill>
@@ -9025,7 +9298,7 @@
           <a:blip r:embed="rId6" cstate="print">
             <a:extLst>
               <a:ext uri="{28A0092B-C50C-407E-A947-70E740481C1C}">
-                <a14:useLocalDpi xmlns="" xmlns:a14="http://schemas.microsoft.com/office/drawing/2010/main" val="0"/>
+                <a14:useLocalDpi xmlns:a14="http://schemas.microsoft.com/office/drawing/2010/main" xmlns="" val="0"/>
               </a:ext>
             </a:extLst>
           </a:blip>
@@ -9045,7 +9318,7 @@
           <a:noFill/>
           <a:extLst>
             <a:ext uri="{909E8E84-426E-40DD-AFC4-6F175D3DCCD1}">
-              <a14:hiddenFill xmlns="" xmlns:a14="http://schemas.microsoft.com/office/drawing/2010/main">
+              <a14:hiddenFill xmlns:a14="http://schemas.microsoft.com/office/drawing/2010/main" xmlns="">
                 <a:solidFill>
                   <a:srgbClr val="FFFFFF"/>
                 </a:solidFill>
@@ -9142,7 +9415,7 @@
           <a:blip r:embed="rId7" cstate="print">
             <a:extLst>
               <a:ext uri="{28A0092B-C50C-407E-A947-70E740481C1C}">
-                <a14:useLocalDpi xmlns="" xmlns:a14="http://schemas.microsoft.com/office/drawing/2010/main" val="0"/>
+                <a14:useLocalDpi xmlns:a14="http://schemas.microsoft.com/office/drawing/2010/main" xmlns="" val="0"/>
               </a:ext>
             </a:extLst>
           </a:blip>
@@ -9162,7 +9435,7 @@
           <a:noFill/>
           <a:extLst>
             <a:ext uri="{909E8E84-426E-40DD-AFC4-6F175D3DCCD1}">
-              <a14:hiddenFill xmlns="" xmlns:a14="http://schemas.microsoft.com/office/drawing/2010/main">
+              <a14:hiddenFill xmlns:a14="http://schemas.microsoft.com/office/drawing/2010/main" xmlns="">
                 <a:solidFill>
                   <a:srgbClr val="FFFFFF"/>
                 </a:solidFill>
@@ -9183,7 +9456,7 @@
           <a:blip r:embed="rId8" cstate="print">
             <a:extLst>
               <a:ext uri="{28A0092B-C50C-407E-A947-70E740481C1C}">
-                <a14:useLocalDpi xmlns="" xmlns:a14="http://schemas.microsoft.com/office/drawing/2010/main" val="0"/>
+                <a14:useLocalDpi xmlns:a14="http://schemas.microsoft.com/office/drawing/2010/main" xmlns="" val="0"/>
               </a:ext>
             </a:extLst>
           </a:blip>
@@ -9203,7 +9476,7 @@
           <a:noFill/>
           <a:extLst>
             <a:ext uri="{909E8E84-426E-40DD-AFC4-6F175D3DCCD1}">
-              <a14:hiddenFill xmlns="" xmlns:a14="http://schemas.microsoft.com/office/drawing/2010/main">
+              <a14:hiddenFill xmlns:a14="http://schemas.microsoft.com/office/drawing/2010/main" xmlns="">
                 <a:solidFill>
                   <a:srgbClr val="FFFFFF"/>
                 </a:solidFill>
@@ -9224,7 +9497,7 @@
           <a:blip r:embed="rId9" cstate="print">
             <a:extLst>
               <a:ext uri="{28A0092B-C50C-407E-A947-70E740481C1C}">
-                <a14:useLocalDpi xmlns="" xmlns:a14="http://schemas.microsoft.com/office/drawing/2010/main" val="0"/>
+                <a14:useLocalDpi xmlns:a14="http://schemas.microsoft.com/office/drawing/2010/main" xmlns="" val="0"/>
               </a:ext>
             </a:extLst>
           </a:blip>
@@ -9244,7 +9517,7 @@
           <a:noFill/>
           <a:extLst>
             <a:ext uri="{909E8E84-426E-40DD-AFC4-6F175D3DCCD1}">
-              <a14:hiddenFill xmlns="" xmlns:a14="http://schemas.microsoft.com/office/drawing/2010/main">
+              <a14:hiddenFill xmlns:a14="http://schemas.microsoft.com/office/drawing/2010/main" xmlns="">
                 <a:solidFill>
                   <a:srgbClr val="FFFFFF"/>
                 </a:solidFill>
@@ -9265,7 +9538,7 @@
           <a:blip r:embed="rId10" cstate="print">
             <a:extLst>
               <a:ext uri="{28A0092B-C50C-407E-A947-70E740481C1C}">
-                <a14:useLocalDpi xmlns="" xmlns:a14="http://schemas.microsoft.com/office/drawing/2010/main" val="0"/>
+                <a14:useLocalDpi xmlns:a14="http://schemas.microsoft.com/office/drawing/2010/main" xmlns="" val="0"/>
               </a:ext>
             </a:extLst>
           </a:blip>
@@ -9285,7 +9558,7 @@
           <a:noFill/>
           <a:extLst>
             <a:ext uri="{909E8E84-426E-40DD-AFC4-6F175D3DCCD1}">
-              <a14:hiddenFill xmlns="" xmlns:a14="http://schemas.microsoft.com/office/drawing/2010/main">
+              <a14:hiddenFill xmlns:a14="http://schemas.microsoft.com/office/drawing/2010/main" xmlns="">
                 <a:solidFill>
                   <a:srgbClr val="FFFFFF"/>
                 </a:solidFill>
@@ -9297,7 +9570,7 @@
     </p:spTree>
     <p:extLst>
       <p:ext uri="{BB962C8B-B14F-4D97-AF65-F5344CB8AC3E}">
-        <p14:creationId xmlns="" xmlns:p14="http://schemas.microsoft.com/office/powerpoint/2010/main" val="1407908346"/>
+        <p14:creationId xmlns:p14="http://schemas.microsoft.com/office/powerpoint/2010/main" xmlns="" val="1407908346"/>
       </p:ext>
     </p:extLst>
   </p:cSld>
@@ -9709,7 +9982,7 @@
     </p:spTree>
     <p:extLst>
       <p:ext uri="{BB962C8B-B14F-4D97-AF65-F5344CB8AC3E}">
-        <p14:creationId xmlns="" xmlns:p14="http://schemas.microsoft.com/office/powerpoint/2010/main" val="2718990012"/>
+        <p14:creationId xmlns:p14="http://schemas.microsoft.com/office/powerpoint/2010/main" xmlns="" val="2718990012"/>
       </p:ext>
     </p:extLst>
   </p:cSld>
@@ -9971,7 +10244,7 @@
     </p:spTree>
     <p:extLst>
       <p:ext uri="{BB962C8B-B14F-4D97-AF65-F5344CB8AC3E}">
-        <p14:creationId xmlns="" xmlns:p14="http://schemas.microsoft.com/office/powerpoint/2010/main" val="2718990012"/>
+        <p14:creationId xmlns:p14="http://schemas.microsoft.com/office/powerpoint/2010/main" xmlns="" val="2718990012"/>
       </p:ext>
     </p:extLst>
   </p:cSld>
@@ -10484,7 +10757,7 @@
           <a:effectLst/>
           <a:extLst>
             <a:ext uri="{AF507438-7753-43E0-B8FC-AC1667EBCBE1}">
-              <a14:hiddenEffects xmlns="" xmlns:a14="http://schemas.microsoft.com/office/drawing/2010/main">
+              <a14:hiddenEffects xmlns:a14="http://schemas.microsoft.com/office/drawing/2010/main" xmlns="">
                 <a:effectLst>
                   <a:outerShdw dist="35921" dir="2700000" algn="ctr" rotWithShape="0">
                     <a:schemeClr val="bg2"/>
@@ -10912,7 +11185,7 @@
           <a:effectLst/>
           <a:extLst>
             <a:ext uri="{AF507438-7753-43E0-B8FC-AC1667EBCBE1}">
-              <a14:hiddenEffects xmlns="" xmlns:a14="http://schemas.microsoft.com/office/drawing/2010/main">
+              <a14:hiddenEffects xmlns:a14="http://schemas.microsoft.com/office/drawing/2010/main" xmlns="">
                 <a:effectLst>
                   <a:outerShdw dist="35921" dir="2700000" algn="ctr" rotWithShape="0">
                     <a:schemeClr val="bg2"/>
@@ -10969,7 +11242,7 @@
           <a:effectLst/>
           <a:extLst>
             <a:ext uri="{AF507438-7753-43E0-B8FC-AC1667EBCBE1}">
-              <a14:hiddenEffects xmlns="" xmlns:a14="http://schemas.microsoft.com/office/drawing/2010/main">
+              <a14:hiddenEffects xmlns:a14="http://schemas.microsoft.com/office/drawing/2010/main" xmlns="">
                 <a:effectLst>
                   <a:outerShdw dist="35921" dir="2700000" algn="ctr" rotWithShape="0">
                     <a:schemeClr val="bg2"/>
@@ -11160,7 +11433,7 @@
           <a:effectLst/>
           <a:extLst>
             <a:ext uri="{AF507438-7753-43E0-B8FC-AC1667EBCBE1}">
-              <a14:hiddenEffects xmlns="" xmlns:a14="http://schemas.microsoft.com/office/drawing/2010/main">
+              <a14:hiddenEffects xmlns:a14="http://schemas.microsoft.com/office/drawing/2010/main" xmlns="">
                 <a:effectLst>
                   <a:outerShdw dist="35921" dir="2700000" algn="ctr" rotWithShape="0">
                     <a:schemeClr val="bg2"/>
@@ -11340,7 +11613,7 @@
           <a:effectLst/>
           <a:extLst>
             <a:ext uri="{AF507438-7753-43E0-B8FC-AC1667EBCBE1}">
-              <a14:hiddenEffects xmlns="" xmlns:a14="http://schemas.microsoft.com/office/drawing/2010/main">
+              <a14:hiddenEffects xmlns:a14="http://schemas.microsoft.com/office/drawing/2010/main" xmlns="">
                 <a:effectLst>
                   <a:outerShdw dist="35921" dir="2700000" algn="ctr" rotWithShape="0">
                     <a:schemeClr val="bg2"/>
@@ -11727,7 +12000,7 @@
     </p:spTree>
     <p:extLst>
       <p:ext uri="{BB962C8B-B14F-4D97-AF65-F5344CB8AC3E}">
-        <p14:creationId xmlns="" xmlns:p14="http://schemas.microsoft.com/office/powerpoint/2010/main" val="2718990012"/>
+        <p14:creationId xmlns:p14="http://schemas.microsoft.com/office/powerpoint/2010/main" xmlns="" val="2718990012"/>
       </p:ext>
     </p:extLst>
   </p:cSld>
@@ -11913,7 +12186,848 @@
     </p:spTree>
     <p:extLst>
       <p:ext uri="{BB962C8B-B14F-4D97-AF65-F5344CB8AC3E}">
-        <p14:creationId xmlns="" xmlns:p14="http://schemas.microsoft.com/office/powerpoint/2010/main" val="2718990012"/>
+        <p14:creationId xmlns:p14="http://schemas.microsoft.com/office/powerpoint/2010/main" xmlns="" val="2718990012"/>
+      </p:ext>
+    </p:extLst>
+  </p:cSld>
+  <p:clrMapOvr>
+    <a:masterClrMapping/>
+  </p:clrMapOvr>
+  <p:transition advClick="0" advTm="20000"/>
+  <p:timing>
+    <p:tnLst>
+      <p:par>
+        <p:cTn id="1" dur="indefinite" restart="never" nodeType="tmRoot"/>
+      </p:par>
+    </p:tnLst>
+  </p:timing>
+</p:sld>
+</file>
+
+<file path=ppt/slides/slide15.xml><?xml version="1.0" encoding="utf-8"?>
+<p:sld xmlns:a="http://schemas.openxmlformats.org/drawingml/2006/main" xmlns:r="http://schemas.openxmlformats.org/officeDocument/2006/relationships" xmlns:p="http://schemas.openxmlformats.org/presentationml/2006/main">
+  <p:cSld>
+    <p:spTree>
+      <p:nvGrpSpPr>
+        <p:cNvPr id="1" name=""/>
+        <p:cNvGrpSpPr/>
+        <p:nvPr/>
+      </p:nvGrpSpPr>
+      <p:grpSpPr>
+        <a:xfrm>
+          <a:off x="0" y="0"/>
+          <a:ext cx="0" cy="0"/>
+          <a:chOff x="0" y="0"/>
+          <a:chExt cx="0" cy="0"/>
+        </a:xfrm>
+      </p:grpSpPr>
+      <p:sp>
+        <p:nvSpPr>
+          <p:cNvPr id="2" name="제목 1"/>
+          <p:cNvSpPr>
+            <a:spLocks noGrp="1"/>
+          </p:cNvSpPr>
+          <p:nvPr>
+            <p:ph type="title"/>
+          </p:nvPr>
+        </p:nvSpPr>
+        <p:spPr/>
+        <p:txBody>
+          <a:bodyPr/>
+          <a:lstStyle/>
+          <a:p>
+            <a:pPr marL="914400" indent="-914400">
+              <a:buFont typeface="+mj-lt"/>
+              <a:buAutoNum type="arabicPeriod" startAt="4"/>
+            </a:pPr>
+            <a:r>
+              <a:rPr lang="ko-KR" altLang="en-US" sz="5400" spc="600" dirty="0" smtClean="0">
+                <a:solidFill>
+                  <a:srgbClr val="000000"/>
+                </a:solidFill>
+                <a:latin typeface="HY동녘M" pitchFamily="18" charset="-127"/>
+                <a:ea typeface="HY동녘M" pitchFamily="18" charset="-127"/>
+              </a:rPr>
+              <a:t>활용 서비스</a:t>
+            </a:r>
+            <a:endParaRPr lang="en-US" altLang="ko-KR" sz="5400" dirty="0">
+              <a:solidFill>
+                <a:srgbClr val="000000"/>
+              </a:solidFill>
+              <a:latin typeface="HY동녘M" pitchFamily="18" charset="-127"/>
+              <a:ea typeface="HY동녘M" pitchFamily="18" charset="-127"/>
+            </a:endParaRPr>
+          </a:p>
+        </p:txBody>
+      </p:sp>
+      <p:sp>
+        <p:nvSpPr>
+          <p:cNvPr id="3" name="내용 개체 틀 2"/>
+          <p:cNvSpPr>
+            <a:spLocks noGrp="1"/>
+          </p:cNvSpPr>
+          <p:nvPr>
+            <p:ph idx="1"/>
+          </p:nvPr>
+        </p:nvSpPr>
+        <p:spPr>
+          <a:xfrm>
+            <a:off x="971600" y="1268760"/>
+            <a:ext cx="3384376" cy="576064"/>
+          </a:xfrm>
+        </p:spPr>
+        <p:txBody>
+          <a:bodyPr/>
+          <a:lstStyle/>
+          <a:p>
+            <a:pPr marL="514350" lvl="1" indent="-514350">
+              <a:buNone/>
+            </a:pPr>
+            <a:r>
+              <a:rPr lang="en-US" altLang="ko-KR" dirty="0" smtClean="0">
+                <a:solidFill>
+                  <a:srgbClr val="000000"/>
+                </a:solidFill>
+                <a:latin typeface="HY동녘M" pitchFamily="18" charset="-127"/>
+                <a:ea typeface="HY동녘M" pitchFamily="18" charset="-127"/>
+              </a:rPr>
+              <a:t>- </a:t>
+            </a:r>
+            <a:r>
+              <a:rPr lang="en-US" altLang="ko-KR" dirty="0" err="1" smtClean="0">
+                <a:solidFill>
+                  <a:srgbClr val="000000"/>
+                </a:solidFill>
+                <a:latin typeface="HY동녘M" pitchFamily="18" charset="-127"/>
+                <a:ea typeface="HY동녘M" pitchFamily="18" charset="-127"/>
+              </a:rPr>
+              <a:t>LTouchPad</a:t>
+            </a:r>
+            <a:r>
+              <a:rPr lang="en-US" altLang="ko-KR" dirty="0" smtClean="0">
+                <a:solidFill>
+                  <a:srgbClr val="000000"/>
+                </a:solidFill>
+                <a:latin typeface="HY동녘M" pitchFamily="18" charset="-127"/>
+                <a:ea typeface="HY동녘M" pitchFamily="18" charset="-127"/>
+              </a:rPr>
+              <a:t> </a:t>
+            </a:r>
+            <a:r>
+              <a:rPr lang="ko-KR" altLang="en-US" dirty="0" smtClean="0">
+                <a:solidFill>
+                  <a:srgbClr val="000000"/>
+                </a:solidFill>
+                <a:latin typeface="HY동녘M" pitchFamily="18" charset="-127"/>
+                <a:ea typeface="HY동녘M" pitchFamily="18" charset="-127"/>
+              </a:rPr>
+              <a:t>구조</a:t>
+            </a:r>
+            <a:endParaRPr lang="en-US" altLang="ko-KR" dirty="0" smtClean="0">
+              <a:solidFill>
+                <a:srgbClr val="000000"/>
+              </a:solidFill>
+              <a:latin typeface="HY동녘M" pitchFamily="18" charset="-127"/>
+              <a:ea typeface="HY동녘M" pitchFamily="18" charset="-127"/>
+            </a:endParaRPr>
+          </a:p>
+          <a:p>
+            <a:pPr marL="857250" lvl="3" indent="0">
+              <a:buNone/>
+            </a:pPr>
+            <a:endParaRPr lang="en-US" altLang="ko-KR" sz="1600" dirty="0">
+              <a:solidFill>
+                <a:srgbClr val="000000"/>
+              </a:solidFill>
+              <a:latin typeface="HY동녘M" pitchFamily="18" charset="-127"/>
+              <a:ea typeface="HY동녘M" pitchFamily="18" charset="-127"/>
+            </a:endParaRPr>
+          </a:p>
+          <a:p>
+            <a:pPr marL="742950" lvl="2" indent="-342900">
+              <a:buFont typeface="Wingdings" pitchFamily="2" charset="2"/>
+              <a:buChar char="l"/>
+            </a:pPr>
+            <a:endParaRPr lang="en-US" altLang="ko-KR" sz="2000" dirty="0" smtClean="0">
+              <a:solidFill>
+                <a:srgbClr val="000000"/>
+              </a:solidFill>
+              <a:latin typeface="HY동녘M" pitchFamily="18" charset="-127"/>
+              <a:ea typeface="HY동녘M" pitchFamily="18" charset="-127"/>
+            </a:endParaRPr>
+          </a:p>
+        </p:txBody>
+      </p:sp>
+      <p:sp>
+        <p:nvSpPr>
+          <p:cNvPr id="5" name="직사각형 4"/>
+          <p:cNvSpPr/>
+          <p:nvPr/>
+        </p:nvSpPr>
+        <p:spPr>
+          <a:xfrm>
+            <a:off x="5101108" y="2780928"/>
+            <a:ext cx="2232247" cy="864096"/>
+          </a:xfrm>
+          <a:prstGeom prst="rect">
+            <a:avLst/>
+          </a:prstGeom>
+          <a:ln/>
+        </p:spPr>
+        <p:style>
+          <a:lnRef idx="2">
+            <a:schemeClr val="accent2"/>
+          </a:lnRef>
+          <a:fillRef idx="1">
+            <a:schemeClr val="lt1"/>
+          </a:fillRef>
+          <a:effectRef idx="0">
+            <a:schemeClr val="accent2"/>
+          </a:effectRef>
+          <a:fontRef idx="minor">
+            <a:schemeClr val="dk1"/>
+          </a:fontRef>
+        </p:style>
+        <p:txBody>
+          <a:bodyPr rtlCol="0" anchor="ctr"/>
+          <a:lstStyle/>
+          <a:p>
+            <a:r>
+              <a:rPr lang="en-US" altLang="ko-KR" dirty="0" err="1" smtClean="0">
+                <a:solidFill>
+                  <a:srgbClr val="000000"/>
+                </a:solidFill>
+                <a:latin typeface="HY동녘M" pitchFamily="18" charset="-127"/>
+                <a:ea typeface="HY동녘M" pitchFamily="18" charset="-127"/>
+              </a:rPr>
+              <a:t>LTouchPad</a:t>
+            </a:r>
+            <a:endParaRPr lang="ko-KR" altLang="en-US" b="1" dirty="0">
+              <a:solidFill>
+                <a:schemeClr val="tx1"/>
+              </a:solidFill>
+              <a:latin typeface="HY동녘M" pitchFamily="18" charset="-127"/>
+              <a:ea typeface="HY동녘M" pitchFamily="18" charset="-127"/>
+            </a:endParaRPr>
+          </a:p>
+        </p:txBody>
+      </p:sp>
+      <p:cxnSp>
+        <p:nvCxnSpPr>
+          <p:cNvPr id="7" name="직선 연결선 6"/>
+          <p:cNvCxnSpPr/>
+          <p:nvPr/>
+        </p:nvCxnSpPr>
+        <p:spPr bwMode="auto">
+          <a:xfrm>
+            <a:off x="4716016" y="2276872"/>
+            <a:ext cx="0" cy="4176464"/>
+          </a:xfrm>
+          <a:prstGeom prst="line">
+            <a:avLst/>
+          </a:prstGeom>
+          <a:gradFill rotWithShape="1">
+            <a:gsLst>
+              <a:gs pos="0">
+                <a:schemeClr val="bg2">
+                  <a:gamma/>
+                  <a:tint val="26667"/>
+                  <a:invGamma/>
+                </a:schemeClr>
+              </a:gs>
+              <a:gs pos="100000">
+                <a:schemeClr val="bg2">
+                  <a:alpha val="14999"/>
+                </a:schemeClr>
+              </a:gs>
+            </a:gsLst>
+            <a:lin ang="5400000" scaled="1"/>
+          </a:gradFill>
+          <a:ln w="38100" cap="flat" cmpd="sng" algn="ctr">
+            <a:solidFill>
+              <a:schemeClr val="tx1"/>
+            </a:solidFill>
+            <a:prstDash val="dash"/>
+            <a:round/>
+            <a:headEnd type="none" w="med" len="med"/>
+            <a:tailEnd type="none" w="med" len="med"/>
+          </a:ln>
+          <a:effectLst/>
+          <a:extLst>
+            <a:ext uri="{AF507438-7753-43E0-B8FC-AC1667EBCBE1}">
+              <a14:hiddenEffects xmlns:a14="http://schemas.microsoft.com/office/drawing/2010/main" xmlns="">
+                <a:effectLst>
+                  <a:outerShdw dist="35921" dir="2700000" algn="ctr" rotWithShape="0">
+                    <a:schemeClr val="bg2"/>
+                  </a:outerShdw>
+                </a:effectLst>
+              </a14:hiddenEffects>
+            </a:ext>
+          </a:extLst>
+        </p:spPr>
+      </p:cxnSp>
+      <p:sp>
+        <p:nvSpPr>
+          <p:cNvPr id="28" name="직사각형 27"/>
+          <p:cNvSpPr/>
+          <p:nvPr/>
+        </p:nvSpPr>
+        <p:spPr>
+          <a:xfrm>
+            <a:off x="2123727" y="3789040"/>
+            <a:ext cx="2232247" cy="864096"/>
+          </a:xfrm>
+          <a:prstGeom prst="rect">
+            <a:avLst/>
+          </a:prstGeom>
+          <a:ln/>
+        </p:spPr>
+        <p:style>
+          <a:lnRef idx="2">
+            <a:schemeClr val="accent2"/>
+          </a:lnRef>
+          <a:fillRef idx="1">
+            <a:schemeClr val="lt1"/>
+          </a:fillRef>
+          <a:effectRef idx="0">
+            <a:schemeClr val="accent2"/>
+          </a:effectRef>
+          <a:fontRef idx="minor">
+            <a:schemeClr val="dk1"/>
+          </a:fontRef>
+        </p:style>
+        <p:txBody>
+          <a:bodyPr rtlCol="0" anchor="ctr"/>
+          <a:lstStyle/>
+          <a:p>
+            <a:r>
+              <a:rPr lang="en-US" altLang="ko-KR" b="1" dirty="0" smtClean="0">
+                <a:solidFill>
+                  <a:schemeClr val="tx1"/>
+                </a:solidFill>
+                <a:latin typeface="HY동녘M" pitchFamily="18" charset="-127"/>
+                <a:ea typeface="HY동녘M" pitchFamily="18" charset="-127"/>
+              </a:rPr>
+              <a:t>Mouse </a:t>
+            </a:r>
+            <a:r>
+              <a:rPr lang="en-US" altLang="ko-KR" b="1" dirty="0" smtClean="0">
+                <a:solidFill>
+                  <a:schemeClr val="tx1"/>
+                </a:solidFill>
+                <a:latin typeface="HY동녘M" pitchFamily="18" charset="-127"/>
+                <a:ea typeface="HY동녘M" pitchFamily="18" charset="-127"/>
+              </a:rPr>
+              <a:t>Driver</a:t>
+            </a:r>
+            <a:endParaRPr lang="en-US" altLang="ko-KR" b="1" dirty="0" smtClean="0">
+              <a:solidFill>
+                <a:schemeClr val="tx1"/>
+              </a:solidFill>
+              <a:latin typeface="HY동녘M" pitchFamily="18" charset="-127"/>
+              <a:ea typeface="HY동녘M" pitchFamily="18" charset="-127"/>
+            </a:endParaRPr>
+          </a:p>
+        </p:txBody>
+      </p:sp>
+      <p:sp>
+        <p:nvSpPr>
+          <p:cNvPr id="29" name="직사각형 28"/>
+          <p:cNvSpPr/>
+          <p:nvPr/>
+        </p:nvSpPr>
+        <p:spPr>
+          <a:xfrm>
+            <a:off x="2123728" y="4653136"/>
+            <a:ext cx="5184576" cy="864096"/>
+          </a:xfrm>
+          <a:prstGeom prst="rect">
+            <a:avLst/>
+          </a:prstGeom>
+          <a:ln/>
+        </p:spPr>
+        <p:style>
+          <a:lnRef idx="2">
+            <a:schemeClr val="accent2"/>
+          </a:lnRef>
+          <a:fillRef idx="1">
+            <a:schemeClr val="lt1"/>
+          </a:fillRef>
+          <a:effectRef idx="0">
+            <a:schemeClr val="accent2"/>
+          </a:effectRef>
+          <a:fontRef idx="minor">
+            <a:schemeClr val="dk1"/>
+          </a:fontRef>
+        </p:style>
+        <p:txBody>
+          <a:bodyPr rtlCol="0" anchor="ctr"/>
+          <a:lstStyle/>
+          <a:p>
+            <a:r>
+              <a:rPr lang="en-US" altLang="ko-KR" b="1" dirty="0" smtClean="0">
+                <a:solidFill>
+                  <a:schemeClr val="tx1"/>
+                </a:solidFill>
+                <a:latin typeface="HY동녘M" pitchFamily="18" charset="-127"/>
+                <a:ea typeface="HY동녘M" pitchFamily="18" charset="-127"/>
+              </a:rPr>
+              <a:t>USB/IP</a:t>
+            </a:r>
+            <a:endParaRPr lang="ko-KR" altLang="en-US" b="1" dirty="0">
+              <a:solidFill>
+                <a:schemeClr val="tx1"/>
+              </a:solidFill>
+              <a:latin typeface="HY동녘M" pitchFamily="18" charset="-127"/>
+              <a:ea typeface="HY동녘M" pitchFamily="18" charset="-127"/>
+            </a:endParaRPr>
+          </a:p>
+        </p:txBody>
+      </p:sp>
+      <p:cxnSp>
+        <p:nvCxnSpPr>
+          <p:cNvPr id="31" name="직선 화살표 연결선 30"/>
+          <p:cNvCxnSpPr>
+            <a:stCxn id="5" idx="2"/>
+          </p:cNvCxnSpPr>
+          <p:nvPr/>
+        </p:nvCxnSpPr>
+        <p:spPr bwMode="auto">
+          <a:xfrm>
+            <a:off x="6217232" y="3645024"/>
+            <a:ext cx="10952" cy="1008112"/>
+          </a:xfrm>
+          <a:prstGeom prst="straightConnector1">
+            <a:avLst/>
+          </a:prstGeom>
+          <a:gradFill rotWithShape="1">
+            <a:gsLst>
+              <a:gs pos="0">
+                <a:schemeClr val="bg2">
+                  <a:gamma/>
+                  <a:tint val="26667"/>
+                  <a:invGamma/>
+                </a:schemeClr>
+              </a:gs>
+              <a:gs pos="100000">
+                <a:schemeClr val="bg2">
+                  <a:alpha val="14999"/>
+                </a:schemeClr>
+              </a:gs>
+            </a:gsLst>
+            <a:lin ang="5400000" scaled="1"/>
+          </a:gradFill>
+          <a:ln w="38100">
+            <a:solidFill>
+              <a:schemeClr val="tx1"/>
+            </a:solidFill>
+            <a:tailEnd type="arrow"/>
+          </a:ln>
+          <a:effectLst/>
+          <a:extLst>
+            <a:ext uri="{91240B29-F687-4F45-9708-019B960494DF}">
+              <a14:hiddenLine xmlns:a14="http://schemas.microsoft.com/office/drawing/2010/main" xmlns="" w="9525" cap="flat" cmpd="sng" algn="ctr">
+                <a:solidFill>
+                  <a:schemeClr val="tx1"/>
+                </a:solidFill>
+                <a:prstDash val="solid"/>
+                <a:round/>
+                <a:headEnd type="none" w="med" len="med"/>
+                <a:tailEnd type="none" w="med" len="med"/>
+              </a14:hiddenLine>
+            </a:ext>
+            <a:ext uri="{AF507438-7753-43E0-B8FC-AC1667EBCBE1}">
+              <a14:hiddenEffects xmlns:a14="http://schemas.microsoft.com/office/drawing/2010/main" xmlns="">
+                <a:effectLst>
+                  <a:outerShdw dist="35921" dir="2700000" algn="ctr" rotWithShape="0">
+                    <a:schemeClr val="bg2"/>
+                  </a:outerShdw>
+                </a:effectLst>
+              </a14:hiddenEffects>
+            </a:ext>
+          </a:extLst>
+        </p:spPr>
+      </p:cxnSp>
+      <p:sp>
+        <p:nvSpPr>
+          <p:cNvPr id="43" name="TextBox 42"/>
+          <p:cNvSpPr txBox="1"/>
+          <p:nvPr/>
+        </p:nvSpPr>
+        <p:spPr>
+          <a:xfrm>
+            <a:off x="4932040" y="3861048"/>
+            <a:ext cx="1296144" cy="384721"/>
+          </a:xfrm>
+          <a:prstGeom prst="rect">
+            <a:avLst/>
+          </a:prstGeom>
+          <a:noFill/>
+        </p:spPr>
+        <p:txBody>
+          <a:bodyPr wrap="square" rtlCol="0">
+            <a:spAutoFit/>
+          </a:bodyPr>
+          <a:lstStyle/>
+          <a:p>
+            <a:r>
+              <a:rPr lang="ko-KR" altLang="en-US" sz="1900" b="1" dirty="0" smtClean="0"/>
+              <a:t>장</a:t>
+            </a:r>
+            <a:r>
+              <a:rPr lang="ko-KR" altLang="en-US" sz="1900" b="1" dirty="0" smtClean="0"/>
+              <a:t>치 </a:t>
+            </a:r>
+            <a:r>
+              <a:rPr lang="ko-KR" altLang="en-US" sz="1900" b="1" dirty="0" smtClean="0"/>
+              <a:t>정보</a:t>
+            </a:r>
+            <a:endParaRPr lang="ko-KR" altLang="en-US" sz="1900" b="1" dirty="0"/>
+          </a:p>
+        </p:txBody>
+      </p:sp>
+      <p:sp>
+        <p:nvSpPr>
+          <p:cNvPr id="44" name="TextBox 43"/>
+          <p:cNvSpPr txBox="1"/>
+          <p:nvPr/>
+        </p:nvSpPr>
+        <p:spPr>
+          <a:xfrm>
+            <a:off x="6156176" y="3832012"/>
+            <a:ext cx="2016224" cy="677108"/>
+          </a:xfrm>
+          <a:prstGeom prst="rect">
+            <a:avLst/>
+          </a:prstGeom>
+          <a:noFill/>
+        </p:spPr>
+        <p:txBody>
+          <a:bodyPr wrap="square" rtlCol="0">
+            <a:spAutoFit/>
+          </a:bodyPr>
+          <a:lstStyle/>
+          <a:p>
+            <a:r>
+              <a:rPr lang="ko-KR" altLang="en-US" sz="1900" b="1" dirty="0" smtClean="0"/>
+              <a:t>터치패드 클릭</a:t>
+            </a:r>
+            <a:r>
+              <a:rPr lang="en-US" altLang="ko-KR" sz="1900" b="1" dirty="0" smtClean="0"/>
+              <a:t>, </a:t>
+            </a:r>
+          </a:p>
+          <a:p>
+            <a:r>
+              <a:rPr lang="ko-KR" altLang="en-US" sz="1900" b="1" dirty="0" smtClean="0"/>
+              <a:t>이동 정보</a:t>
+            </a:r>
+            <a:endParaRPr lang="ko-KR" altLang="en-US" sz="1900" b="1" dirty="0"/>
+          </a:p>
+        </p:txBody>
+      </p:sp>
+      <p:sp>
+        <p:nvSpPr>
+          <p:cNvPr id="52" name="내용 개체 틀 2"/>
+          <p:cNvSpPr txBox="1">
+            <a:spLocks/>
+          </p:cNvSpPr>
+          <p:nvPr/>
+        </p:nvSpPr>
+        <p:spPr bwMode="auto">
+          <a:xfrm>
+            <a:off x="1403648" y="2060848"/>
+            <a:ext cx="2592288" cy="576064"/>
+          </a:xfrm>
+          <a:prstGeom prst="rect">
+            <a:avLst/>
+          </a:prstGeom>
+          <a:noFill/>
+          <a:ln>
+            <a:noFill/>
+          </a:ln>
+          <a:effectLst/>
+          <a:extLst>
+            <a:ext uri="{909E8E84-426E-40DD-AFC4-6F175D3DCCD1}">
+              <a14:hiddenFill xmlns:a14="http://schemas.microsoft.com/office/drawing/2010/main" xmlns="">
+                <a:solidFill>
+                  <a:schemeClr val="accent1"/>
+                </a:solidFill>
+              </a14:hiddenFill>
+            </a:ext>
+            <a:ext uri="{91240B29-F687-4F45-9708-019B960494DF}">
+              <a14:hiddenLine xmlns:a14="http://schemas.microsoft.com/office/drawing/2010/main" xmlns="" w="9525">
+                <a:solidFill>
+                  <a:schemeClr val="tx1"/>
+                </a:solidFill>
+                <a:miter lim="800000"/>
+                <a:headEnd/>
+                <a:tailEnd/>
+              </a14:hiddenLine>
+            </a:ext>
+            <a:ext uri="{AF507438-7753-43E0-B8FC-AC1667EBCBE1}">
+              <a14:hiddenEffects xmlns:a14="http://schemas.microsoft.com/office/drawing/2010/main" xmlns="">
+                <a:effectLst>
+                  <a:outerShdw dist="35921" dir="2700000" algn="ctr" rotWithShape="0">
+                    <a:schemeClr val="bg2"/>
+                  </a:outerShdw>
+                </a:effectLst>
+              </a14:hiddenEffects>
+            </a:ext>
+          </a:extLst>
+        </p:spPr>
+        <p:txBody>
+          <a:bodyPr vert="horz" wrap="square" lIns="91440" tIns="45720" rIns="91440" bIns="45720" numCol="1" anchor="t" anchorCtr="0" compatLnSpc="1">
+            <a:prstTxWarp prst="textNoShape">
+              <a:avLst/>
+            </a:prstTxWarp>
+          </a:bodyPr>
+          <a:lstStyle/>
+          <a:p>
+            <a:pPr marL="514350" marR="0" lvl="1" indent="-514350" algn="l" defTabSz="914400" rtl="0" eaLnBrk="1" fontAlgn="base" latinLnBrk="1" hangingPunct="1">
+              <a:lnSpc>
+                <a:spcPct val="100000"/>
+              </a:lnSpc>
+              <a:spcBef>
+                <a:spcPct val="20000"/>
+              </a:spcBef>
+              <a:spcAft>
+                <a:spcPct val="0"/>
+              </a:spcAft>
+              <a:buClrTx/>
+              <a:buSzTx/>
+              <a:buFontTx/>
+              <a:buNone/>
+              <a:tabLst/>
+              <a:defRPr/>
+            </a:pPr>
+            <a:r>
+              <a:rPr kumimoji="0" lang="en-US" altLang="ko-KR" sz="2800" b="0" i="0" u="none" strike="noStrike" kern="0" cap="none" spc="0" normalizeH="0" baseline="0" noProof="0" dirty="0" smtClean="0">
+                <a:ln>
+                  <a:noFill/>
+                </a:ln>
+                <a:solidFill>
+                  <a:srgbClr val="000000"/>
+                </a:solidFill>
+                <a:effectLst/>
+                <a:uLnTx/>
+                <a:uFillTx/>
+                <a:latin typeface="HY동녘M" pitchFamily="18" charset="-127"/>
+                <a:ea typeface="HY동녘M" pitchFamily="18" charset="-127"/>
+              </a:rPr>
+              <a:t>Windows</a:t>
+            </a:r>
+            <a:r>
+              <a:rPr kumimoji="0" lang="en-US" altLang="ko-KR" sz="2800" b="0" i="0" u="none" strike="noStrike" kern="0" cap="none" spc="0" normalizeH="0" noProof="0" dirty="0" smtClean="0">
+                <a:ln>
+                  <a:noFill/>
+                </a:ln>
+                <a:solidFill>
+                  <a:srgbClr val="000000"/>
+                </a:solidFill>
+                <a:effectLst/>
+                <a:uLnTx/>
+                <a:uFillTx/>
+                <a:latin typeface="HY동녘M" pitchFamily="18" charset="-127"/>
+                <a:ea typeface="HY동녘M" pitchFamily="18" charset="-127"/>
+              </a:rPr>
+              <a:t> PC</a:t>
+            </a:r>
+            <a:endParaRPr kumimoji="0" lang="en-US" altLang="ko-KR" sz="1600" b="0" i="0" u="none" strike="noStrike" kern="0" cap="none" spc="0" normalizeH="0" baseline="0" noProof="0" dirty="0" smtClean="0">
+              <a:ln>
+                <a:noFill/>
+              </a:ln>
+              <a:solidFill>
+                <a:srgbClr val="000000"/>
+              </a:solidFill>
+              <a:effectLst/>
+              <a:uLnTx/>
+              <a:uFillTx/>
+              <a:latin typeface="HY동녘M" pitchFamily="18" charset="-127"/>
+              <a:ea typeface="HY동녘M" pitchFamily="18" charset="-127"/>
+            </a:endParaRPr>
+          </a:p>
+          <a:p>
+            <a:pPr marL="742950" marR="0" lvl="2" indent="-342900" algn="l" defTabSz="914400" rtl="0" eaLnBrk="1" fontAlgn="base" latinLnBrk="1" hangingPunct="1">
+              <a:lnSpc>
+                <a:spcPct val="100000"/>
+              </a:lnSpc>
+              <a:spcBef>
+                <a:spcPct val="20000"/>
+              </a:spcBef>
+              <a:spcAft>
+                <a:spcPct val="0"/>
+              </a:spcAft>
+              <a:buClrTx/>
+              <a:buSzTx/>
+              <a:buFont typeface="Wingdings" pitchFamily="2" charset="2"/>
+              <a:buChar char="l"/>
+              <a:tabLst/>
+              <a:defRPr/>
+            </a:pPr>
+            <a:endParaRPr kumimoji="0" lang="en-US" altLang="ko-KR" sz="2000" b="0" i="0" u="none" strike="noStrike" kern="0" cap="none" spc="0" normalizeH="0" baseline="0" noProof="0" dirty="0" smtClean="0">
+              <a:ln>
+                <a:noFill/>
+              </a:ln>
+              <a:solidFill>
+                <a:srgbClr val="000000"/>
+              </a:solidFill>
+              <a:effectLst/>
+              <a:uLnTx/>
+              <a:uFillTx/>
+              <a:latin typeface="HY동녘M" pitchFamily="18" charset="-127"/>
+              <a:ea typeface="HY동녘M" pitchFamily="18" charset="-127"/>
+            </a:endParaRPr>
+          </a:p>
+        </p:txBody>
+      </p:sp>
+      <p:sp>
+        <p:nvSpPr>
+          <p:cNvPr id="53" name="내용 개체 틀 2"/>
+          <p:cNvSpPr txBox="1">
+            <a:spLocks/>
+          </p:cNvSpPr>
+          <p:nvPr/>
+        </p:nvSpPr>
+        <p:spPr bwMode="auto">
+          <a:xfrm>
+            <a:off x="5364088" y="1988840"/>
+            <a:ext cx="2592288" cy="576064"/>
+          </a:xfrm>
+          <a:prstGeom prst="rect">
+            <a:avLst/>
+          </a:prstGeom>
+          <a:noFill/>
+          <a:ln>
+            <a:noFill/>
+          </a:ln>
+          <a:effectLst/>
+          <a:extLst>
+            <a:ext uri="{909E8E84-426E-40DD-AFC4-6F175D3DCCD1}">
+              <a14:hiddenFill xmlns:a14="http://schemas.microsoft.com/office/drawing/2010/main" xmlns="">
+                <a:solidFill>
+                  <a:schemeClr val="accent1"/>
+                </a:solidFill>
+              </a14:hiddenFill>
+            </a:ext>
+            <a:ext uri="{91240B29-F687-4F45-9708-019B960494DF}">
+              <a14:hiddenLine xmlns:a14="http://schemas.microsoft.com/office/drawing/2010/main" xmlns="" w="9525">
+                <a:solidFill>
+                  <a:schemeClr val="tx1"/>
+                </a:solidFill>
+                <a:miter lim="800000"/>
+                <a:headEnd/>
+                <a:tailEnd/>
+              </a14:hiddenLine>
+            </a:ext>
+            <a:ext uri="{AF507438-7753-43E0-B8FC-AC1667EBCBE1}">
+              <a14:hiddenEffects xmlns:a14="http://schemas.microsoft.com/office/drawing/2010/main" xmlns="">
+                <a:effectLst>
+                  <a:outerShdw dist="35921" dir="2700000" algn="ctr" rotWithShape="0">
+                    <a:schemeClr val="bg2"/>
+                  </a:outerShdw>
+                </a:effectLst>
+              </a14:hiddenEffects>
+            </a:ext>
+          </a:extLst>
+        </p:spPr>
+        <p:txBody>
+          <a:bodyPr vert="horz" wrap="square" lIns="91440" tIns="45720" rIns="91440" bIns="45720" numCol="1" anchor="t" anchorCtr="0" compatLnSpc="1">
+            <a:prstTxWarp prst="textNoShape">
+              <a:avLst/>
+            </a:prstTxWarp>
+          </a:bodyPr>
+          <a:lstStyle/>
+          <a:p>
+            <a:pPr marL="514350" marR="0" lvl="1" indent="-514350" algn="l" defTabSz="914400" rtl="0" eaLnBrk="1" fontAlgn="base" latinLnBrk="1" hangingPunct="1">
+              <a:lnSpc>
+                <a:spcPct val="100000"/>
+              </a:lnSpc>
+              <a:spcBef>
+                <a:spcPct val="20000"/>
+              </a:spcBef>
+              <a:spcAft>
+                <a:spcPct val="0"/>
+              </a:spcAft>
+              <a:buClrTx/>
+              <a:buSzTx/>
+              <a:buFontTx/>
+              <a:buNone/>
+              <a:tabLst/>
+              <a:defRPr/>
+            </a:pPr>
+            <a:r>
+              <a:rPr lang="ko-KR" altLang="en-US" sz="2800" kern="0" dirty="0" err="1" smtClean="0">
+                <a:solidFill>
+                  <a:srgbClr val="000000"/>
+                </a:solidFill>
+                <a:latin typeface="HY동녘M" pitchFamily="18" charset="-127"/>
+                <a:ea typeface="HY동녘M" pitchFamily="18" charset="-127"/>
+              </a:rPr>
+              <a:t>스마트</a:t>
+            </a:r>
+            <a:r>
+              <a:rPr lang="ko-KR" altLang="en-US" sz="2800" kern="0" dirty="0" err="1" smtClean="0">
+                <a:solidFill>
+                  <a:srgbClr val="000000"/>
+                </a:solidFill>
+                <a:latin typeface="HY동녘M" pitchFamily="18" charset="-127"/>
+                <a:ea typeface="HY동녘M" pitchFamily="18" charset="-127"/>
+              </a:rPr>
+              <a:t>폰</a:t>
+            </a:r>
+            <a:endParaRPr kumimoji="0" lang="en-US" altLang="ko-KR" sz="1600" b="0" i="0" u="none" strike="noStrike" kern="0" cap="none" spc="0" normalizeH="0" baseline="0" noProof="0" dirty="0" smtClean="0">
+              <a:ln>
+                <a:noFill/>
+              </a:ln>
+              <a:solidFill>
+                <a:srgbClr val="000000"/>
+              </a:solidFill>
+              <a:effectLst/>
+              <a:uLnTx/>
+              <a:uFillTx/>
+              <a:latin typeface="HY동녘M" pitchFamily="18" charset="-127"/>
+              <a:ea typeface="HY동녘M" pitchFamily="18" charset="-127"/>
+            </a:endParaRPr>
+          </a:p>
+          <a:p>
+            <a:pPr marL="742950" marR="0" lvl="2" indent="-342900" algn="l" defTabSz="914400" rtl="0" eaLnBrk="1" fontAlgn="base" latinLnBrk="1" hangingPunct="1">
+              <a:lnSpc>
+                <a:spcPct val="100000"/>
+              </a:lnSpc>
+              <a:spcBef>
+                <a:spcPct val="20000"/>
+              </a:spcBef>
+              <a:spcAft>
+                <a:spcPct val="0"/>
+              </a:spcAft>
+              <a:buClrTx/>
+              <a:buSzTx/>
+              <a:buFont typeface="Wingdings" pitchFamily="2" charset="2"/>
+              <a:buChar char="l"/>
+              <a:tabLst/>
+              <a:defRPr/>
+            </a:pPr>
+            <a:endParaRPr kumimoji="0" lang="en-US" altLang="ko-KR" sz="2000" b="0" i="0" u="none" strike="noStrike" kern="0" cap="none" spc="0" normalizeH="0" baseline="0" noProof="0" dirty="0" smtClean="0">
+              <a:ln>
+                <a:noFill/>
+              </a:ln>
+              <a:solidFill>
+                <a:srgbClr val="000000"/>
+              </a:solidFill>
+              <a:effectLst/>
+              <a:uLnTx/>
+              <a:uFillTx/>
+              <a:latin typeface="HY동녘M" pitchFamily="18" charset="-127"/>
+              <a:ea typeface="HY동녘M" pitchFamily="18" charset="-127"/>
+            </a:endParaRPr>
+          </a:p>
+        </p:txBody>
+      </p:sp>
+    </p:spTree>
+    <p:extLst>
+      <p:ext uri="{BB962C8B-B14F-4D97-AF65-F5344CB8AC3E}">
+        <p14:creationId xmlns:p14="http://schemas.microsoft.com/office/powerpoint/2010/main" xmlns="" val="2718990012"/>
       </p:ext>
     </p:extLst>
   </p:cSld>
@@ -11994,7 +13108,7 @@
           <p:nvPr>
             <p:extLst>
               <p:ext uri="{D42A27DB-BD31-4B8C-83A1-F6EECF244321}">
-                <p14:modId xmlns="" xmlns:p14="http://schemas.microsoft.com/office/powerpoint/2010/main" val="864912804"/>
+                <p14:modId xmlns:p14="http://schemas.microsoft.com/office/powerpoint/2010/main" xmlns="" val="864912804"/>
               </p:ext>
             </p:extLst>
           </p:nvPr>
@@ -12016,7 +13130,7 @@
           <p:nvPr>
             <p:extLst>
               <p:ext uri="{D42A27DB-BD31-4B8C-83A1-F6EECF244321}">
-                <p14:modId xmlns="" xmlns:p14="http://schemas.microsoft.com/office/powerpoint/2010/main" val="550831738"/>
+                <p14:modId xmlns:p14="http://schemas.microsoft.com/office/powerpoint/2010/main" xmlns="" val="550831738"/>
               </p:ext>
             </p:extLst>
           </p:nvPr>
@@ -12128,7 +13242,7 @@
     </p:spTree>
     <p:extLst>
       <p:ext uri="{BB962C8B-B14F-4D97-AF65-F5344CB8AC3E}">
-        <p14:creationId xmlns="" xmlns:p14="http://schemas.microsoft.com/office/powerpoint/2010/main" val="3723977454"/>
+        <p14:creationId xmlns:p14="http://schemas.microsoft.com/office/powerpoint/2010/main" xmlns="" val="3723977454"/>
       </p:ext>
     </p:extLst>
   </p:cSld>
@@ -12288,7 +13402,7 @@
           <a:blip r:embed="rId3" cstate="print">
             <a:extLst>
               <a:ext uri="{28A0092B-C50C-407E-A947-70E740481C1C}">
-                <a14:useLocalDpi xmlns="" xmlns:a14="http://schemas.microsoft.com/office/drawing/2010/main" val="0"/>
+                <a14:useLocalDpi xmlns:a14="http://schemas.microsoft.com/office/drawing/2010/main" xmlns="" val="0"/>
               </a:ext>
             </a:extLst>
           </a:blip>
@@ -12318,7 +13432,7 @@
           <a:blip r:embed="rId4" cstate="print">
             <a:extLst>
               <a:ext uri="{28A0092B-C50C-407E-A947-70E740481C1C}">
-                <a14:useLocalDpi xmlns="" xmlns:a14="http://schemas.microsoft.com/office/drawing/2010/main" val="0"/>
+                <a14:useLocalDpi xmlns:a14="http://schemas.microsoft.com/office/drawing/2010/main" xmlns="" val="0"/>
               </a:ext>
             </a:extLst>
           </a:blip>
@@ -12338,7 +13452,7 @@
           <a:noFill/>
           <a:extLst>
             <a:ext uri="{909E8E84-426E-40DD-AFC4-6F175D3DCCD1}">
-              <a14:hiddenFill xmlns="" xmlns:a14="http://schemas.microsoft.com/office/drawing/2010/main">
+              <a14:hiddenFill xmlns:a14="http://schemas.microsoft.com/office/drawing/2010/main" xmlns="">
                 <a:solidFill>
                   <a:srgbClr val="FFFFFF"/>
                 </a:solidFill>
@@ -12444,7 +13558,7 @@
           <a:blip r:embed="rId5" cstate="print">
             <a:extLst>
               <a:ext uri="{28A0092B-C50C-407E-A947-70E740481C1C}">
-                <a14:useLocalDpi xmlns="" xmlns:a14="http://schemas.microsoft.com/office/drawing/2010/main" val="0"/>
+                <a14:useLocalDpi xmlns:a14="http://schemas.microsoft.com/office/drawing/2010/main" xmlns="" val="0"/>
               </a:ext>
             </a:extLst>
           </a:blip>
@@ -12464,7 +13578,7 @@
           <a:noFill/>
           <a:extLst>
             <a:ext uri="{909E8E84-426E-40DD-AFC4-6F175D3DCCD1}">
-              <a14:hiddenFill xmlns="" xmlns:a14="http://schemas.microsoft.com/office/drawing/2010/main">
+              <a14:hiddenFill xmlns:a14="http://schemas.microsoft.com/office/drawing/2010/main" xmlns="">
                 <a:solidFill>
                   <a:srgbClr val="FFFFFF"/>
                 </a:solidFill>
@@ -12485,7 +13599,7 @@
           <a:blip r:embed="rId6" cstate="print">
             <a:extLst>
               <a:ext uri="{28A0092B-C50C-407E-A947-70E740481C1C}">
-                <a14:useLocalDpi xmlns="" xmlns:a14="http://schemas.microsoft.com/office/drawing/2010/main" val="0"/>
+                <a14:useLocalDpi xmlns:a14="http://schemas.microsoft.com/office/drawing/2010/main" xmlns="" val="0"/>
               </a:ext>
             </a:extLst>
           </a:blip>
@@ -12505,7 +13619,7 @@
           <a:noFill/>
           <a:extLst>
             <a:ext uri="{909E8E84-426E-40DD-AFC4-6F175D3DCCD1}">
-              <a14:hiddenFill xmlns="" xmlns:a14="http://schemas.microsoft.com/office/drawing/2010/main">
+              <a14:hiddenFill xmlns:a14="http://schemas.microsoft.com/office/drawing/2010/main" xmlns="">
                 <a:solidFill>
                   <a:srgbClr val="FFFFFF"/>
                 </a:solidFill>
@@ -12526,7 +13640,7 @@
           <a:blip r:embed="rId7" cstate="print">
             <a:extLst>
               <a:ext uri="{28A0092B-C50C-407E-A947-70E740481C1C}">
-                <a14:useLocalDpi xmlns="" xmlns:a14="http://schemas.microsoft.com/office/drawing/2010/main" val="0"/>
+                <a14:useLocalDpi xmlns:a14="http://schemas.microsoft.com/office/drawing/2010/main" xmlns="" val="0"/>
               </a:ext>
             </a:extLst>
           </a:blip>
@@ -12546,7 +13660,7 @@
           <a:noFill/>
           <a:extLst>
             <a:ext uri="{909E8E84-426E-40DD-AFC4-6F175D3DCCD1}">
-              <a14:hiddenFill xmlns="" xmlns:a14="http://schemas.microsoft.com/office/drawing/2010/main">
+              <a14:hiddenFill xmlns:a14="http://schemas.microsoft.com/office/drawing/2010/main" xmlns="">
                 <a:solidFill>
                   <a:srgbClr val="FFFFFF"/>
                 </a:solidFill>
@@ -12558,7 +13672,7 @@
     </p:spTree>
     <p:extLst>
       <p:ext uri="{BB962C8B-B14F-4D97-AF65-F5344CB8AC3E}">
-        <p14:creationId xmlns="" xmlns:p14="http://schemas.microsoft.com/office/powerpoint/2010/main" val="26222973"/>
+        <p14:creationId xmlns:p14="http://schemas.microsoft.com/office/powerpoint/2010/main" xmlns="" val="26222973"/>
       </p:ext>
     </p:extLst>
   </p:cSld>
@@ -12665,25 +13779,8 @@
                 <a:latin typeface="HY동녘M" pitchFamily="18" charset="-127"/>
                 <a:ea typeface="HY동녘M" pitchFamily="18" charset="-127"/>
               </a:rPr>
-              <a:t>A. </a:t>
-            </a:r>
-            <a:r>
-              <a:rPr lang="en-US" altLang="ko-KR" dirty="0" smtClean="0">
-                <a:solidFill>
-                  <a:srgbClr val="000000"/>
-                </a:solidFill>
-                <a:latin typeface="HY동녘M" pitchFamily="18" charset="-127"/>
-                <a:ea typeface="HY동녘M" pitchFamily="18" charset="-127"/>
-              </a:rPr>
-              <a:t>USB</a:t>
-            </a:r>
-            <a:endParaRPr lang="en-US" altLang="ko-KR" dirty="0" smtClean="0">
-              <a:solidFill>
-                <a:srgbClr val="000000"/>
-              </a:solidFill>
-              <a:latin typeface="HY동녘M" pitchFamily="18" charset="-127"/>
-              <a:ea typeface="HY동녘M" pitchFamily="18" charset="-127"/>
-            </a:endParaRPr>
+              <a:t>A. USB</a:t>
+            </a:r>
           </a:p>
         </p:txBody>
       </p:sp>
@@ -12762,7 +13859,7 @@
           <a:blip r:embed="rId3" cstate="print">
             <a:extLst>
               <a:ext uri="{28A0092B-C50C-407E-A947-70E740481C1C}">
-                <a14:useLocalDpi xmlns="" xmlns:a14="http://schemas.microsoft.com/office/drawing/2010/main" val="0"/>
+                <a14:useLocalDpi xmlns:a14="http://schemas.microsoft.com/office/drawing/2010/main" xmlns="" val="0"/>
               </a:ext>
             </a:extLst>
           </a:blip>
@@ -12790,7 +13887,7 @@
           <a:blip r:embed="rId4" cstate="print">
             <a:extLst>
               <a:ext uri="{28A0092B-C50C-407E-A947-70E740481C1C}">
-                <a14:useLocalDpi xmlns="" xmlns:a14="http://schemas.microsoft.com/office/drawing/2010/main" val="0"/>
+                <a14:useLocalDpi xmlns:a14="http://schemas.microsoft.com/office/drawing/2010/main" xmlns="" val="0"/>
               </a:ext>
             </a:extLst>
           </a:blip>
@@ -12811,7 +13908,7 @@
     </p:spTree>
     <p:extLst>
       <p:ext uri="{BB962C8B-B14F-4D97-AF65-F5344CB8AC3E}">
-        <p14:creationId xmlns="" xmlns:p14="http://schemas.microsoft.com/office/powerpoint/2010/main" val="846475234"/>
+        <p14:creationId xmlns:p14="http://schemas.microsoft.com/office/powerpoint/2010/main" xmlns="" val="846475234"/>
       </p:ext>
     </p:extLst>
   </p:cSld>
@@ -12908,14 +14005,14 @@
           <a:effectLst/>
           <a:extLst>
             <a:ext uri="{909E8E84-426E-40DD-AFC4-6F175D3DCCD1}">
-              <a14:hiddenFill xmlns="" xmlns:a14="http://schemas.microsoft.com/office/drawing/2010/main">
+              <a14:hiddenFill xmlns:a14="http://schemas.microsoft.com/office/drawing/2010/main" xmlns="">
                 <a:solidFill>
                   <a:schemeClr val="accent1"/>
                 </a:solidFill>
               </a14:hiddenFill>
             </a:ext>
             <a:ext uri="{91240B29-F687-4F45-9708-019B960494DF}">
-              <a14:hiddenLine xmlns="" xmlns:a14="http://schemas.microsoft.com/office/drawing/2010/main" w="9525">
+              <a14:hiddenLine xmlns:a14="http://schemas.microsoft.com/office/drawing/2010/main" xmlns="" w="9525">
                 <a:solidFill>
                   <a:schemeClr val="tx1"/>
                 </a:solidFill>
@@ -12925,7 +14022,7 @@
               </a14:hiddenLine>
             </a:ext>
             <a:ext uri="{AF507438-7753-43E0-B8FC-AC1667EBCBE1}">
-              <a14:hiddenEffects xmlns="" xmlns:a14="http://schemas.microsoft.com/office/drawing/2010/main">
+              <a14:hiddenEffects xmlns:a14="http://schemas.microsoft.com/office/drawing/2010/main" xmlns="">
                 <a:effectLst>
                   <a:outerShdw dist="35921" dir="2700000" algn="ctr" rotWithShape="0">
                     <a:schemeClr val="bg2"/>
@@ -13218,7 +14315,7 @@
             <a:effectLst/>
             <a:extLst>
               <a:ext uri="{91240B29-F687-4F45-9708-019B960494DF}">
-                <a14:hiddenLine xmlns="" xmlns:a14="http://schemas.microsoft.com/office/drawing/2010/main" w="9525" cap="flat" cmpd="sng" algn="ctr">
+                <a14:hiddenLine xmlns:a14="http://schemas.microsoft.com/office/drawing/2010/main" xmlns="" w="9525" cap="flat" cmpd="sng" algn="ctr">
                   <a:solidFill>
                     <a:schemeClr val="tx1"/>
                   </a:solidFill>
@@ -13229,7 +14326,7 @@
                 </a14:hiddenLine>
               </a:ext>
               <a:ext uri="{AF507438-7753-43E0-B8FC-AC1667EBCBE1}">
-                <a14:hiddenEffects xmlns="" xmlns:a14="http://schemas.microsoft.com/office/drawing/2010/main">
+                <a14:hiddenEffects xmlns:a14="http://schemas.microsoft.com/office/drawing/2010/main" xmlns="">
                   <a:effectLst>
                     <a:outerShdw dist="35921" dir="2700000" algn="ctr" rotWithShape="0">
                       <a:schemeClr val="bg2"/>
@@ -13280,7 +14377,7 @@
             <a:effectLst/>
             <a:extLst>
               <a:ext uri="{91240B29-F687-4F45-9708-019B960494DF}">
-                <a14:hiddenLine xmlns="" xmlns:a14="http://schemas.microsoft.com/office/drawing/2010/main" w="9525" cap="flat" cmpd="sng" algn="ctr">
+                <a14:hiddenLine xmlns:a14="http://schemas.microsoft.com/office/drawing/2010/main" xmlns="" w="9525" cap="flat" cmpd="sng" algn="ctr">
                   <a:solidFill>
                     <a:schemeClr val="tx1"/>
                   </a:solidFill>
@@ -13291,7 +14388,7 @@
                 </a14:hiddenLine>
               </a:ext>
               <a:ext uri="{AF507438-7753-43E0-B8FC-AC1667EBCBE1}">
-                <a14:hiddenEffects xmlns="" xmlns:a14="http://schemas.microsoft.com/office/drawing/2010/main">
+                <a14:hiddenEffects xmlns:a14="http://schemas.microsoft.com/office/drawing/2010/main" xmlns="">
                   <a:effectLst>
                     <a:outerShdw dist="35921" dir="2700000" algn="ctr" rotWithShape="0">
                       <a:schemeClr val="bg2"/>
@@ -13342,7 +14439,7 @@
             <a:effectLst/>
             <a:extLst>
               <a:ext uri="{91240B29-F687-4F45-9708-019B960494DF}">
-                <a14:hiddenLine xmlns="" xmlns:a14="http://schemas.microsoft.com/office/drawing/2010/main" w="9525" cap="flat" cmpd="sng" algn="ctr">
+                <a14:hiddenLine xmlns:a14="http://schemas.microsoft.com/office/drawing/2010/main" xmlns="" w="9525" cap="flat" cmpd="sng" algn="ctr">
                   <a:solidFill>
                     <a:schemeClr val="tx1"/>
                   </a:solidFill>
@@ -13353,7 +14450,7 @@
                 </a14:hiddenLine>
               </a:ext>
               <a:ext uri="{AF507438-7753-43E0-B8FC-AC1667EBCBE1}">
-                <a14:hiddenEffects xmlns="" xmlns:a14="http://schemas.microsoft.com/office/drawing/2010/main">
+                <a14:hiddenEffects xmlns:a14="http://schemas.microsoft.com/office/drawing/2010/main" xmlns="">
                   <a:effectLst>
                     <a:outerShdw dist="35921" dir="2700000" algn="ctr" rotWithShape="0">
                       <a:schemeClr val="bg2"/>
@@ -13404,7 +14501,7 @@
             <a:effectLst/>
             <a:extLst>
               <a:ext uri="{91240B29-F687-4F45-9708-019B960494DF}">
-                <a14:hiddenLine xmlns="" xmlns:a14="http://schemas.microsoft.com/office/drawing/2010/main" w="9525" cap="flat" cmpd="sng" algn="ctr">
+                <a14:hiddenLine xmlns:a14="http://schemas.microsoft.com/office/drawing/2010/main" xmlns="" w="9525" cap="flat" cmpd="sng" algn="ctr">
                   <a:solidFill>
                     <a:schemeClr val="tx1"/>
                   </a:solidFill>
@@ -13415,7 +14512,7 @@
                 </a14:hiddenLine>
               </a:ext>
               <a:ext uri="{AF507438-7753-43E0-B8FC-AC1667EBCBE1}">
-                <a14:hiddenEffects xmlns="" xmlns:a14="http://schemas.microsoft.com/office/drawing/2010/main">
+                <a14:hiddenEffects xmlns:a14="http://schemas.microsoft.com/office/drawing/2010/main" xmlns="">
                   <a:effectLst>
                     <a:outerShdw dist="35921" dir="2700000" algn="ctr" rotWithShape="0">
                       <a:schemeClr val="bg2"/>
@@ -13453,7 +14550,7 @@
             <a:blip r:embed="rId8" cstate="print">
               <a:extLst>
                 <a:ext uri="{28A0092B-C50C-407E-A947-70E740481C1C}">
-                  <a14:useLocalDpi xmlns="" xmlns:a14="http://schemas.microsoft.com/office/drawing/2010/main" val="0"/>
+                  <a14:useLocalDpi xmlns:a14="http://schemas.microsoft.com/office/drawing/2010/main" xmlns="" val="0"/>
                 </a:ext>
               </a:extLst>
             </a:blip>
@@ -13483,7 +14580,7 @@
             <a:blip r:embed="rId9" cstate="print">
               <a:extLst>
                 <a:ext uri="{28A0092B-C50C-407E-A947-70E740481C1C}">
-                  <a14:useLocalDpi xmlns="" xmlns:a14="http://schemas.microsoft.com/office/drawing/2010/main" val="0"/>
+                  <a14:useLocalDpi xmlns:a14="http://schemas.microsoft.com/office/drawing/2010/main" xmlns="" val="0"/>
                 </a:ext>
               </a:extLst>
             </a:blip>
@@ -13581,7 +14678,7 @@
             <a:blip r:embed="rId10" cstate="print">
               <a:extLst>
                 <a:ext uri="{28A0092B-C50C-407E-A947-70E740481C1C}">
-                  <a14:useLocalDpi xmlns="" xmlns:a14="http://schemas.microsoft.com/office/drawing/2010/main" val="0"/>
+                  <a14:useLocalDpi xmlns:a14="http://schemas.microsoft.com/office/drawing/2010/main" xmlns="" val="0"/>
                 </a:ext>
               </a:extLst>
             </a:blip>
@@ -13637,7 +14734,7 @@
     </p:spTree>
     <p:extLst>
       <p:ext uri="{BB962C8B-B14F-4D97-AF65-F5344CB8AC3E}">
-        <p14:creationId xmlns="" xmlns:p14="http://schemas.microsoft.com/office/powerpoint/2010/main" val="2437256557"/>
+        <p14:creationId xmlns:p14="http://schemas.microsoft.com/office/powerpoint/2010/main" xmlns="" val="2437256557"/>
       </p:ext>
     </p:extLst>
   </p:cSld>
@@ -13759,7 +14856,7 @@
           <a:blip r:embed="rId3" cstate="print">
             <a:extLst>
               <a:ext uri="{28A0092B-C50C-407E-A947-70E740481C1C}">
-                <a14:useLocalDpi xmlns="" xmlns:a14="http://schemas.microsoft.com/office/drawing/2010/main" val="0"/>
+                <a14:useLocalDpi xmlns:a14="http://schemas.microsoft.com/office/drawing/2010/main" xmlns="" val="0"/>
               </a:ext>
             </a:extLst>
           </a:blip>
@@ -13779,7 +14876,7 @@
           <a:noFill/>
           <a:extLst>
             <a:ext uri="{909E8E84-426E-40DD-AFC4-6F175D3DCCD1}">
-              <a14:hiddenFill xmlns="" xmlns:a14="http://schemas.microsoft.com/office/drawing/2010/main">
+              <a14:hiddenFill xmlns:a14="http://schemas.microsoft.com/office/drawing/2010/main" xmlns="">
                 <a:solidFill>
                   <a:srgbClr val="FFFFFF"/>
                 </a:solidFill>
@@ -13800,7 +14897,7 @@
           <a:blip r:embed="rId3" cstate="print">
             <a:extLst>
               <a:ext uri="{28A0092B-C50C-407E-A947-70E740481C1C}">
-                <a14:useLocalDpi xmlns="" xmlns:a14="http://schemas.microsoft.com/office/drawing/2010/main" val="0"/>
+                <a14:useLocalDpi xmlns:a14="http://schemas.microsoft.com/office/drawing/2010/main" xmlns="" val="0"/>
               </a:ext>
             </a:extLst>
           </a:blip>
@@ -13820,7 +14917,7 @@
           <a:noFill/>
           <a:extLst>
             <a:ext uri="{909E8E84-426E-40DD-AFC4-6F175D3DCCD1}">
-              <a14:hiddenFill xmlns="" xmlns:a14="http://schemas.microsoft.com/office/drawing/2010/main">
+              <a14:hiddenFill xmlns:a14="http://schemas.microsoft.com/office/drawing/2010/main" xmlns="">
                 <a:solidFill>
                   <a:srgbClr val="FFFFFF"/>
                 </a:solidFill>
@@ -13841,7 +14938,7 @@
           <a:blip r:embed="rId4" cstate="print">
             <a:extLst>
               <a:ext uri="{28A0092B-C50C-407E-A947-70E740481C1C}">
-                <a14:useLocalDpi xmlns="" xmlns:a14="http://schemas.microsoft.com/office/drawing/2010/main" val="0"/>
+                <a14:useLocalDpi xmlns:a14="http://schemas.microsoft.com/office/drawing/2010/main" xmlns="" val="0"/>
               </a:ext>
             </a:extLst>
           </a:blip>
@@ -13861,7 +14958,7 @@
           <a:noFill/>
           <a:extLst>
             <a:ext uri="{909E8E84-426E-40DD-AFC4-6F175D3DCCD1}">
-              <a14:hiddenFill xmlns="" xmlns:a14="http://schemas.microsoft.com/office/drawing/2010/main">
+              <a14:hiddenFill xmlns:a14="http://schemas.microsoft.com/office/drawing/2010/main" xmlns="">
                 <a:solidFill>
                   <a:srgbClr val="FFFFFF"/>
                 </a:solidFill>
@@ -14012,14 +15109,14 @@
           <a:effectLst/>
           <a:extLst>
             <a:ext uri="{909E8E84-426E-40DD-AFC4-6F175D3DCCD1}">
-              <a14:hiddenFill xmlns="" xmlns:a14="http://schemas.microsoft.com/office/drawing/2010/main">
+              <a14:hiddenFill xmlns:a14="http://schemas.microsoft.com/office/drawing/2010/main" xmlns="">
                 <a:solidFill>
                   <a:schemeClr val="accent1"/>
                 </a:solidFill>
               </a14:hiddenFill>
             </a:ext>
             <a:ext uri="{91240B29-F687-4F45-9708-019B960494DF}">
-              <a14:hiddenLine xmlns="" xmlns:a14="http://schemas.microsoft.com/office/drawing/2010/main" w="9525">
+              <a14:hiddenLine xmlns:a14="http://schemas.microsoft.com/office/drawing/2010/main" xmlns="" w="9525">
                 <a:solidFill>
                   <a:schemeClr val="tx1"/>
                 </a:solidFill>
@@ -14029,7 +15126,7 @@
               </a14:hiddenLine>
             </a:ext>
             <a:ext uri="{AF507438-7753-43E0-B8FC-AC1667EBCBE1}">
-              <a14:hiddenEffects xmlns="" xmlns:a14="http://schemas.microsoft.com/office/drawing/2010/main">
+              <a14:hiddenEffects xmlns:a14="http://schemas.microsoft.com/office/drawing/2010/main" xmlns="">
                 <a:effectLst>
                   <a:outerShdw dist="35921" dir="2700000" algn="ctr" rotWithShape="0">
                     <a:schemeClr val="bg2"/>
@@ -14142,7 +15239,7 @@
     </p:spTree>
     <p:extLst>
       <p:ext uri="{BB962C8B-B14F-4D97-AF65-F5344CB8AC3E}">
-        <p14:creationId xmlns="" xmlns:p14="http://schemas.microsoft.com/office/powerpoint/2010/main" val="2437256557"/>
+        <p14:creationId xmlns:p14="http://schemas.microsoft.com/office/powerpoint/2010/main" xmlns="" val="2437256557"/>
       </p:ext>
     </p:extLst>
   </p:cSld>
@@ -14189,7 +15286,7 @@
           <a:blip r:embed="rId3" cstate="print">
             <a:extLst>
               <a:ext uri="{28A0092B-C50C-407E-A947-70E740481C1C}">
-                <a14:useLocalDpi xmlns="" xmlns:a14="http://schemas.microsoft.com/office/drawing/2010/main" val="0"/>
+                <a14:useLocalDpi xmlns:a14="http://schemas.microsoft.com/office/drawing/2010/main" xmlns="" val="0"/>
               </a:ext>
             </a:extLst>
           </a:blip>
@@ -14209,7 +15306,7 @@
           <a:noFill/>
           <a:extLst>
             <a:ext uri="{909E8E84-426E-40DD-AFC4-6F175D3DCCD1}">
-              <a14:hiddenFill xmlns="" xmlns:a14="http://schemas.microsoft.com/office/drawing/2010/main">
+              <a14:hiddenFill xmlns:a14="http://schemas.microsoft.com/office/drawing/2010/main" xmlns="">
                 <a:solidFill>
                   <a:srgbClr val="FFFFFF"/>
                 </a:solidFill>
@@ -14305,7 +15402,7 @@
           <a:blip r:embed="rId4" cstate="print">
             <a:extLst>
               <a:ext uri="{28A0092B-C50C-407E-A947-70E740481C1C}">
-                <a14:useLocalDpi xmlns="" xmlns:a14="http://schemas.microsoft.com/office/drawing/2010/main" val="0"/>
+                <a14:useLocalDpi xmlns:a14="http://schemas.microsoft.com/office/drawing/2010/main" xmlns="" val="0"/>
               </a:ext>
             </a:extLst>
           </a:blip>
@@ -14325,7 +15422,7 @@
           <a:noFill/>
           <a:extLst>
             <a:ext uri="{909E8E84-426E-40DD-AFC4-6F175D3DCCD1}">
-              <a14:hiddenFill xmlns="" xmlns:a14="http://schemas.microsoft.com/office/drawing/2010/main">
+              <a14:hiddenFill xmlns:a14="http://schemas.microsoft.com/office/drawing/2010/main" xmlns="">
                 <a:solidFill>
                   <a:srgbClr val="FFFFFF"/>
                 </a:solidFill>
@@ -14346,7 +15443,7 @@
           <a:blip r:embed="rId5" cstate="print">
             <a:extLst>
               <a:ext uri="{28A0092B-C50C-407E-A947-70E740481C1C}">
-                <a14:useLocalDpi xmlns="" xmlns:a14="http://schemas.microsoft.com/office/drawing/2010/main" val="0"/>
+                <a14:useLocalDpi xmlns:a14="http://schemas.microsoft.com/office/drawing/2010/main" xmlns="" val="0"/>
               </a:ext>
             </a:extLst>
           </a:blip>
@@ -14528,7 +15625,7 @@
             <a:blip r:embed="rId6" cstate="print">
               <a:extLst>
                 <a:ext uri="{28A0092B-C50C-407E-A947-70E740481C1C}">
-                  <a14:useLocalDpi xmlns="" xmlns:a14="http://schemas.microsoft.com/office/drawing/2010/main" val="0"/>
+                  <a14:useLocalDpi xmlns:a14="http://schemas.microsoft.com/office/drawing/2010/main" xmlns="" val="0"/>
                 </a:ext>
               </a:extLst>
             </a:blip>
@@ -14548,7 +15645,7 @@
             <a:noFill/>
             <a:extLst>
               <a:ext uri="{909E8E84-426E-40DD-AFC4-6F175D3DCCD1}">
-                <a14:hiddenFill xmlns="" xmlns:a14="http://schemas.microsoft.com/office/drawing/2010/main">
+                <a14:hiddenFill xmlns:a14="http://schemas.microsoft.com/office/drawing/2010/main" xmlns="">
                   <a:solidFill>
                     <a:srgbClr val="FFFFFF"/>
                   </a:solidFill>
@@ -14669,14 +15766,14 @@
           <a:effectLst/>
           <a:extLst>
             <a:ext uri="{909E8E84-426E-40DD-AFC4-6F175D3DCCD1}">
-              <a14:hiddenFill xmlns="" xmlns:a14="http://schemas.microsoft.com/office/drawing/2010/main">
+              <a14:hiddenFill xmlns:a14="http://schemas.microsoft.com/office/drawing/2010/main" xmlns="">
                 <a:solidFill>
                   <a:schemeClr val="accent1"/>
                 </a:solidFill>
               </a14:hiddenFill>
             </a:ext>
             <a:ext uri="{91240B29-F687-4F45-9708-019B960494DF}">
-              <a14:hiddenLine xmlns="" xmlns:a14="http://schemas.microsoft.com/office/drawing/2010/main" w="9525">
+              <a14:hiddenLine xmlns:a14="http://schemas.microsoft.com/office/drawing/2010/main" xmlns="" w="9525">
                 <a:solidFill>
                   <a:schemeClr val="tx1"/>
                 </a:solidFill>
@@ -14686,7 +15783,7 @@
               </a14:hiddenLine>
             </a:ext>
             <a:ext uri="{AF507438-7753-43E0-B8FC-AC1667EBCBE1}">
-              <a14:hiddenEffects xmlns="" xmlns:a14="http://schemas.microsoft.com/office/drawing/2010/main">
+              <a14:hiddenEffects xmlns:a14="http://schemas.microsoft.com/office/drawing/2010/main" xmlns="">
                 <a:effectLst>
                   <a:outerShdw dist="35921" dir="2700000" algn="ctr" rotWithShape="0">
                     <a:schemeClr val="bg2"/>
@@ -14831,7 +15928,7 @@
     </p:spTree>
     <p:extLst>
       <p:ext uri="{BB962C8B-B14F-4D97-AF65-F5344CB8AC3E}">
-        <p14:creationId xmlns="" xmlns:p14="http://schemas.microsoft.com/office/powerpoint/2010/main" val="1709874429"/>
+        <p14:creationId xmlns:p14="http://schemas.microsoft.com/office/powerpoint/2010/main" xmlns="" val="1709874429"/>
       </p:ext>
     </p:extLst>
   </p:cSld>
@@ -15562,7 +16659,7 @@
             <a:effectLst/>
             <a:extLst>
               <a:ext uri="{AF507438-7753-43E0-B8FC-AC1667EBCBE1}">
-                <a14:hiddenEffects xmlns="" xmlns:a14="http://schemas.microsoft.com/office/drawing/2010/main">
+                <a14:hiddenEffects xmlns:a14="http://schemas.microsoft.com/office/drawing/2010/main" xmlns="">
                   <a:effectLst>
                     <a:outerShdw dist="35921" dir="2700000" algn="ctr" rotWithShape="0">
                       <a:schemeClr val="bg2"/>
@@ -15612,7 +16709,7 @@
             <a:effectLst/>
             <a:extLst>
               <a:ext uri="{AF507438-7753-43E0-B8FC-AC1667EBCBE1}">
-                <a14:hiddenEffects xmlns="" xmlns:a14="http://schemas.microsoft.com/office/drawing/2010/main">
+                <a14:hiddenEffects xmlns:a14="http://schemas.microsoft.com/office/drawing/2010/main" xmlns="">
                   <a:effectLst>
                     <a:outerShdw dist="35921" dir="2700000" algn="ctr" rotWithShape="0">
                       <a:schemeClr val="bg2"/>
@@ -15662,7 +16759,7 @@
             <a:effectLst/>
             <a:extLst>
               <a:ext uri="{AF507438-7753-43E0-B8FC-AC1667EBCBE1}">
-                <a14:hiddenEffects xmlns="" xmlns:a14="http://schemas.microsoft.com/office/drawing/2010/main">
+                <a14:hiddenEffects xmlns:a14="http://schemas.microsoft.com/office/drawing/2010/main" xmlns="">
                   <a:effectLst>
                     <a:outerShdw dist="35921" dir="2700000" algn="ctr" rotWithShape="0">
                       <a:schemeClr val="bg2"/>
@@ -15712,7 +16809,7 @@
             <a:effectLst/>
             <a:extLst>
               <a:ext uri="{AF507438-7753-43E0-B8FC-AC1667EBCBE1}">
-                <a14:hiddenEffects xmlns="" xmlns:a14="http://schemas.microsoft.com/office/drawing/2010/main">
+                <a14:hiddenEffects xmlns:a14="http://schemas.microsoft.com/office/drawing/2010/main" xmlns="">
                   <a:effectLst>
                     <a:outerShdw dist="35921" dir="2700000" algn="ctr" rotWithShape="0">
                       <a:schemeClr val="bg2"/>
@@ -15762,7 +16859,7 @@
             <a:effectLst/>
             <a:extLst>
               <a:ext uri="{AF507438-7753-43E0-B8FC-AC1667EBCBE1}">
-                <a14:hiddenEffects xmlns="" xmlns:a14="http://schemas.microsoft.com/office/drawing/2010/main">
+                <a14:hiddenEffects xmlns:a14="http://schemas.microsoft.com/office/drawing/2010/main" xmlns="">
                   <a:effectLst>
                     <a:outerShdw dist="35921" dir="2700000" algn="ctr" rotWithShape="0">
                       <a:schemeClr val="bg2"/>
@@ -15812,7 +16909,7 @@
             <a:effectLst/>
             <a:extLst>
               <a:ext uri="{AF507438-7753-43E0-B8FC-AC1667EBCBE1}">
-                <a14:hiddenEffects xmlns="" xmlns:a14="http://schemas.microsoft.com/office/drawing/2010/main">
+                <a14:hiddenEffects xmlns:a14="http://schemas.microsoft.com/office/drawing/2010/main" xmlns="">
                   <a:effectLst>
                     <a:outerShdw dist="35921" dir="2700000" algn="ctr" rotWithShape="0">
                       <a:schemeClr val="bg2"/>
@@ -15884,7 +16981,7 @@
     </p:spTree>
     <p:extLst>
       <p:ext uri="{BB962C8B-B14F-4D97-AF65-F5344CB8AC3E}">
-        <p14:creationId xmlns="" xmlns:p14="http://schemas.microsoft.com/office/powerpoint/2010/main" val="1532431054"/>
+        <p14:creationId xmlns:p14="http://schemas.microsoft.com/office/powerpoint/2010/main" xmlns="" val="1532431054"/>
       </p:ext>
     </p:extLst>
   </p:cSld>
@@ -17131,7 +18228,7 @@
     </p:spTree>
     <p:extLst>
       <p:ext uri="{BB962C8B-B14F-4D97-AF65-F5344CB8AC3E}">
-        <p14:creationId xmlns="" xmlns:p14="http://schemas.microsoft.com/office/powerpoint/2010/main" val="1410092498"/>
+        <p14:creationId xmlns:p14="http://schemas.microsoft.com/office/powerpoint/2010/main" xmlns="" val="1410092498"/>
       </p:ext>
     </p:extLst>
   </p:cSld>
@@ -17447,7 +18544,7 @@
         <a:effectLst/>
         <a:extLst>
           <a:ext uri="{91240B29-F687-4F45-9708-019B960494DF}">
-            <a14:hiddenLine xmlns="" xmlns:a14="http://schemas.microsoft.com/office/drawing/2010/main" w="9525" cap="flat" cmpd="sng" algn="ctr">
+            <a14:hiddenLine xmlns:a14="http://schemas.microsoft.com/office/drawing/2010/main" xmlns="" w="9525" cap="flat" cmpd="sng" algn="ctr">
               <a:solidFill>
                 <a:schemeClr val="tx1"/>
               </a:solidFill>
@@ -17458,7 +18555,7 @@
             </a14:hiddenLine>
           </a:ext>
           <a:ext uri="{AF507438-7753-43E0-B8FC-AC1667EBCBE1}">
-            <a14:hiddenEffects xmlns="" xmlns:a14="http://schemas.microsoft.com/office/drawing/2010/main">
+            <a14:hiddenEffects xmlns:a14="http://schemas.microsoft.com/office/drawing/2010/main" xmlns="">
               <a:effectLst>
                 <a:outerShdw dist="35921" dir="2700000" algn="ctr" rotWithShape="0">
                   <a:schemeClr val="bg2"/>

</xml_diff>

<commit_message>
modified:   Documents/presentation doc/Final Presentation/final-presentation.pptx 	modified:   Documents/presentation doc/Final Presentation/final_presentation_script.docx
</commit_message>
<xml_diff>
--- a/Documents/presentation doc/Final Presentation/final-presentation.pptx
+++ b/Documents/presentation doc/Final Presentation/final-presentation.pptx
@@ -156,7 +156,6 @@
 
 <file path=ppt/charts/chart1.xml><?xml version="1.0" encoding="utf-8"?>
 <c:chartSpace xmlns:c="http://schemas.openxmlformats.org/drawingml/2006/chart" xmlns:a="http://schemas.openxmlformats.org/drawingml/2006/main" xmlns:r="http://schemas.openxmlformats.org/officeDocument/2006/relationships">
-  <c:date1904 val="1"/>
   <c:lang val="ko-KR"/>
   <c:style val="27"/>
   <c:chart>
@@ -167,10 +166,10 @@
           <c:layoutTarget val="inner"/>
           <c:xMode val="edge"/>
           <c:yMode val="edge"/>
-          <c:x val="0.13756541418769694"/>
-          <c:y val="0.31142121774829412"/>
+          <c:x val="0.13756541418769702"/>
+          <c:y val="0.31142121774829423"/>
           <c:w val="0.82290353753797463"/>
-          <c:h val="0.56776310568666688"/>
+          <c:h val="0.56776310568666666"/>
         </c:manualLayout>
       </c:layout>
       <c:barChart>
@@ -240,7 +239,7 @@
             <c:numRef>
               <c:f>Sheet1!$B$2:$B$6</c:f>
               <c:numCache>
-                <c:formatCode>General</c:formatCode>
+                <c:formatCode>g/"표""준"</c:formatCode>
                 <c:ptCount val="5"/>
                 <c:pt idx="0">
                   <c:v>64</c:v>
@@ -265,34 +264,34 @@
           <c:showVal val="1"/>
         </c:dLbls>
         <c:gapWidth val="75"/>
-        <c:axId val="68372352"/>
-        <c:axId val="68373888"/>
+        <c:axId val="75175040"/>
+        <c:axId val="75176576"/>
       </c:barChart>
       <c:catAx>
-        <c:axId val="68372352"/>
+        <c:axId val="75175040"/>
         <c:scaling>
           <c:orientation val="minMax"/>
         </c:scaling>
         <c:axPos val="b"/>
         <c:majorTickMark val="none"/>
         <c:tickLblPos val="nextTo"/>
-        <c:crossAx val="68373888"/>
+        <c:crossAx val="75176576"/>
         <c:crosses val="autoZero"/>
         <c:auto val="1"/>
         <c:lblAlgn val="ctr"/>
         <c:lblOffset val="100"/>
       </c:catAx>
       <c:valAx>
-        <c:axId val="68373888"/>
+        <c:axId val="75176576"/>
         <c:scaling>
           <c:orientation val="minMax"/>
           <c:min val="0"/>
         </c:scaling>
         <c:axPos val="l"/>
-        <c:numFmt formatCode="General" sourceLinked="1"/>
+        <c:numFmt formatCode="g/&quot;표&quot;&quot;준&quot;" sourceLinked="1"/>
         <c:majorTickMark val="none"/>
         <c:tickLblPos val="nextTo"/>
-        <c:crossAx val="68372352"/>
+        <c:crossAx val="75175040"/>
         <c:crosses val="autoZero"/>
         <c:crossBetween val="between"/>
         <c:majorUnit val="20"/>
@@ -304,10 +303,10 @@
         <c:manualLayout>
           <c:xMode val="edge"/>
           <c:yMode val="edge"/>
-          <c:x val="0.18942124246731373"/>
-          <c:y val="3.0763248527941586E-2"/>
-          <c:w val="0.681171680158149"/>
-          <c:h val="0.22344660117130047"/>
+          <c:x val="0.18942124246731384"/>
+          <c:y val="3.0763248527941607E-2"/>
+          <c:w val="0.68117168015814944"/>
+          <c:h val="0.22344660117130064"/>
         </c:manualLayout>
       </c:layout>
     </c:legend>
@@ -330,7 +329,6 @@
 
 <file path=ppt/charts/chart2.xml><?xml version="1.0" encoding="utf-8"?>
 <c:chartSpace xmlns:c="http://schemas.openxmlformats.org/drawingml/2006/chart" xmlns:a="http://schemas.openxmlformats.org/drawingml/2006/main" xmlns:r="http://schemas.openxmlformats.org/officeDocument/2006/relationships">
-  <c:date1904 val="1"/>
   <c:lang val="ko-KR"/>
   <c:style val="26"/>
   <c:chart>
@@ -387,7 +385,7 @@
             <c:numRef>
               <c:f>Sheet1!$B$2:$B$6</c:f>
               <c:numCache>
-                <c:formatCode>General</c:formatCode>
+                <c:formatCode>g/"표""준"</c:formatCode>
                 <c:ptCount val="5"/>
                 <c:pt idx="0">
                   <c:v>80</c:v>
@@ -408,34 +406,35 @@
             </c:numRef>
           </c:val>
         </c:ser>
+        <c:dLbls/>
         <c:marker val="1"/>
-        <c:axId val="71240320"/>
-        <c:axId val="71250304"/>
+        <c:axId val="75249920"/>
+        <c:axId val="75255808"/>
       </c:lineChart>
       <c:catAx>
-        <c:axId val="71240320"/>
+        <c:axId val="75249920"/>
         <c:scaling>
           <c:orientation val="minMax"/>
         </c:scaling>
         <c:axPos val="b"/>
         <c:tickLblPos val="nextTo"/>
-        <c:crossAx val="71250304"/>
+        <c:crossAx val="75255808"/>
         <c:crosses val="autoZero"/>
         <c:auto val="1"/>
         <c:lblAlgn val="ctr"/>
         <c:lblOffset val="100"/>
       </c:catAx>
       <c:valAx>
-        <c:axId val="71250304"/>
+        <c:axId val="75255808"/>
         <c:scaling>
           <c:orientation val="minMax"/>
           <c:max val="2000"/>
         </c:scaling>
         <c:axPos val="l"/>
         <c:majorGridlines/>
-        <c:numFmt formatCode="General" sourceLinked="1"/>
+        <c:numFmt formatCode="g/&quot;표&quot;&quot;준&quot;" sourceLinked="1"/>
         <c:tickLblPos val="nextTo"/>
-        <c:crossAx val="71240320"/>
+        <c:crossAx val="75249920"/>
         <c:crosses val="autoZero"/>
         <c:crossBetween val="between"/>
         <c:majorUnit val="500"/>
@@ -1135,7 +1134,51 @@
                 <a:ea typeface="+mn-ea"/>
                 <a:cs typeface="+mn-cs"/>
               </a:rPr>
-              <a:t>조 발표를 맞게 된 </a:t>
+              <a:t>조 </a:t>
+            </a:r>
+            <a:r>
+              <a:rPr lang="ko-KR" altLang="ko-KR" sz="1200" kern="1200" smtClean="0">
+                <a:solidFill>
+                  <a:schemeClr val="tx1"/>
+                </a:solidFill>
+                <a:latin typeface="Arial" charset="0"/>
+                <a:ea typeface="+mn-ea"/>
+                <a:cs typeface="+mn-cs"/>
+              </a:rPr>
+              <a:t>발표를 </a:t>
+            </a:r>
+            <a:r>
+              <a:rPr lang="ko-KR" altLang="en-US" sz="1200" kern="1200" smtClean="0">
+                <a:solidFill>
+                  <a:schemeClr val="tx1"/>
+                </a:solidFill>
+                <a:latin typeface="Arial" charset="0"/>
+                <a:ea typeface="+mn-ea"/>
+                <a:cs typeface="+mn-cs"/>
+              </a:rPr>
+              <a:t>맡</a:t>
+            </a:r>
+            <a:r>
+              <a:rPr lang="ko-KR" altLang="ko-KR" sz="1200" kern="1200" smtClean="0">
+                <a:solidFill>
+                  <a:schemeClr val="tx1"/>
+                </a:solidFill>
+                <a:latin typeface="Arial" charset="0"/>
+                <a:ea typeface="+mn-ea"/>
+                <a:cs typeface="+mn-cs"/>
+              </a:rPr>
+              <a:t>게 </a:t>
+            </a:r>
+            <a:r>
+              <a:rPr lang="ko-KR" altLang="ko-KR" sz="1200" kern="1200" dirty="0" smtClean="0">
+                <a:solidFill>
+                  <a:schemeClr val="tx1"/>
+                </a:solidFill>
+                <a:latin typeface="Arial" charset="0"/>
+                <a:ea typeface="+mn-ea"/>
+                <a:cs typeface="+mn-cs"/>
+              </a:rPr>
+              <a:t>된 </a:t>
             </a:r>
             <a:r>
               <a:rPr lang="en-US" altLang="ko-KR" sz="1200" kern="1200" dirty="0" smtClean="0">
@@ -2346,6 +2389,116 @@
               <a:t>. </a:t>
             </a:r>
             <a:r>
+              <a:rPr lang="en-US" altLang="ko-KR" sz="1200" kern="1200" baseline="0" dirty="0" err="1" smtClean="0">
+                <a:solidFill>
+                  <a:schemeClr val="tx1"/>
+                </a:solidFill>
+                <a:latin typeface="Arial" charset="0"/>
+                <a:ea typeface="+mn-ea"/>
+                <a:cs typeface="+mn-cs"/>
+              </a:rPr>
+              <a:t>KatalkPCLinker</a:t>
+            </a:r>
+            <a:r>
+              <a:rPr lang="ko-KR" altLang="en-US" sz="1200" kern="1200" baseline="0" dirty="0" smtClean="0">
+                <a:solidFill>
+                  <a:schemeClr val="tx1"/>
+                </a:solidFill>
+                <a:latin typeface="Arial" charset="0"/>
+                <a:ea typeface="+mn-ea"/>
+                <a:cs typeface="+mn-cs"/>
+              </a:rPr>
+              <a:t>는 </a:t>
+            </a:r>
+            <a:r>
+              <a:rPr lang="en-US" altLang="ko-KR" sz="1200" kern="1200" baseline="0" dirty="0" smtClean="0">
+                <a:solidFill>
+                  <a:schemeClr val="tx1"/>
+                </a:solidFill>
+                <a:latin typeface="Arial" charset="0"/>
+                <a:ea typeface="+mn-ea"/>
+                <a:cs typeface="+mn-cs"/>
+              </a:rPr>
+              <a:t>PC</a:t>
+            </a:r>
+            <a:r>
+              <a:rPr lang="ko-KR" altLang="en-US" sz="1200" kern="1200" baseline="0" dirty="0" smtClean="0">
+                <a:solidFill>
+                  <a:schemeClr val="tx1"/>
+                </a:solidFill>
+                <a:latin typeface="Arial" charset="0"/>
+                <a:ea typeface="+mn-ea"/>
+                <a:cs typeface="+mn-cs"/>
+              </a:rPr>
+              <a:t>에 </a:t>
+            </a:r>
+            <a:r>
+              <a:rPr lang="en-US" altLang="ko-KR" sz="1200" kern="1200" dirty="0" smtClean="0">
+                <a:solidFill>
+                  <a:schemeClr val="tx1"/>
+                </a:solidFill>
+                <a:latin typeface="Arial" charset="0"/>
+                <a:ea typeface="+mn-ea"/>
+                <a:cs typeface="+mn-cs"/>
+              </a:rPr>
+              <a:t>USB</a:t>
+            </a:r>
+            <a:r>
+              <a:rPr lang="ko-KR" altLang="en-US" sz="1200" kern="1200" dirty="0" smtClean="0">
+                <a:solidFill>
+                  <a:schemeClr val="tx1"/>
+                </a:solidFill>
+                <a:latin typeface="Arial" charset="0"/>
+                <a:ea typeface="+mn-ea"/>
+                <a:cs typeface="+mn-cs"/>
+              </a:rPr>
+              <a:t>카메라로 인식돼서 </a:t>
+            </a:r>
+            <a:r>
+              <a:rPr lang="ko-KR" altLang="en-US" sz="1200" kern="1200" dirty="0" smtClean="0">
+                <a:solidFill>
+                  <a:schemeClr val="tx1"/>
+                </a:solidFill>
+                <a:latin typeface="Arial" charset="0"/>
+                <a:ea typeface="+mn-ea"/>
+                <a:cs typeface="+mn-cs"/>
+              </a:rPr>
+              <a:t>어플리케이션의 수정 없이 </a:t>
+            </a:r>
+            <a:r>
+              <a:rPr lang="ko-KR" altLang="en-US" sz="1200" kern="1200" err="1" smtClean="0">
+                <a:solidFill>
+                  <a:schemeClr val="tx1"/>
+                </a:solidFill>
+                <a:latin typeface="Arial" charset="0"/>
+                <a:ea typeface="+mn-ea"/>
+                <a:cs typeface="+mn-cs"/>
+              </a:rPr>
+              <a:t>카카오톡</a:t>
+            </a:r>
+            <a:r>
+              <a:rPr lang="ko-KR" altLang="en-US" sz="1200" kern="1200" smtClean="0">
+                <a:solidFill>
+                  <a:schemeClr val="tx1"/>
+                </a:solidFill>
+                <a:latin typeface="Arial" charset="0"/>
+                <a:ea typeface="+mn-ea"/>
+                <a:cs typeface="+mn-cs"/>
+              </a:rPr>
+              <a:t> 화면뿐만 </a:t>
+            </a:r>
+            <a:r>
+              <a:rPr lang="ko-KR" altLang="en-US" sz="1200" kern="1200" dirty="0" smtClean="0">
+                <a:solidFill>
+                  <a:schemeClr val="tx1"/>
+                </a:solidFill>
+                <a:latin typeface="Arial" charset="0"/>
+                <a:ea typeface="+mn-ea"/>
+                <a:cs typeface="+mn-cs"/>
+              </a:rPr>
+              <a:t>아니라 </a:t>
+            </a:r>
+            <a:r>
               <a:rPr lang="ko-KR" altLang="en-US" sz="1200" kern="1200" baseline="0" dirty="0" err="1" smtClean="0">
                 <a:solidFill>
                   <a:schemeClr val="tx1"/>
@@ -2354,7 +2507,7 @@
                 <a:ea typeface="+mn-ea"/>
                 <a:cs typeface="+mn-cs"/>
               </a:rPr>
-              <a:t>카카오톡</a:t>
+              <a:t>스마트폰의</a:t>
             </a:r>
             <a:r>
               <a:rPr lang="ko-KR" altLang="en-US" sz="1200" kern="1200" baseline="0" dirty="0" smtClean="0">
@@ -2365,18 +2518,7 @@
                 <a:ea typeface="+mn-ea"/>
                 <a:cs typeface="+mn-cs"/>
               </a:rPr>
-              <a:t> 이미지 부분에 영상을 출력하는데 </a:t>
-            </a:r>
-            <a:r>
-              <a:rPr lang="en-US" altLang="ko-KR" sz="1200" kern="1200" baseline="0" dirty="0" err="1" smtClean="0">
-                <a:solidFill>
-                  <a:schemeClr val="tx1"/>
-                </a:solidFill>
-                <a:latin typeface="Arial" charset="0"/>
-                <a:ea typeface="+mn-ea"/>
-                <a:cs typeface="+mn-cs"/>
-              </a:rPr>
-              <a:t>KatalkPCLinker</a:t>
+              <a:t> 모든 </a:t>
             </a:r>
             <a:r>
               <a:rPr lang="ko-KR" altLang="en-US" sz="1200" kern="1200" baseline="0" dirty="0" smtClean="0">
@@ -2387,89 +2529,7 @@
                 <a:ea typeface="+mn-ea"/>
                 <a:cs typeface="+mn-cs"/>
               </a:rPr>
-              <a:t>는 </a:t>
-            </a:r>
-            <a:r>
-              <a:rPr lang="en-US" altLang="ko-KR" sz="1200" kern="1200" dirty="0" smtClean="0">
-                <a:solidFill>
-                  <a:schemeClr val="tx1"/>
-                </a:solidFill>
-                <a:latin typeface="Arial" charset="0"/>
-                <a:ea typeface="+mn-ea"/>
-                <a:cs typeface="+mn-cs"/>
-              </a:rPr>
-              <a:t>USB</a:t>
-            </a:r>
-            <a:r>
-              <a:rPr lang="ko-KR" altLang="en-US" sz="1200" kern="1200" dirty="0" smtClean="0">
-                <a:solidFill>
-                  <a:schemeClr val="tx1"/>
-                </a:solidFill>
-                <a:latin typeface="Arial" charset="0"/>
-                <a:ea typeface="+mn-ea"/>
-                <a:cs typeface="+mn-cs"/>
-              </a:rPr>
-              <a:t>카메라로 인식돼서 </a:t>
-            </a:r>
-            <a:r>
-              <a:rPr lang="ko-KR" altLang="en-US" sz="1200" kern="1200" baseline="0" dirty="0" smtClean="0">
-                <a:solidFill>
-                  <a:schemeClr val="tx1"/>
-                </a:solidFill>
-                <a:latin typeface="Arial" charset="0"/>
-                <a:ea typeface="+mn-ea"/>
-                <a:cs typeface="+mn-cs"/>
-              </a:rPr>
-              <a:t>스마</a:t>
-            </a:r>
-            <a:endParaRPr lang="en-US" altLang="ko-KR" sz="1200" kern="1200" baseline="0" dirty="0" smtClean="0">
-              <a:solidFill>
-                <a:schemeClr val="tx1"/>
-              </a:solidFill>
-              <a:latin typeface="Arial" charset="0"/>
-              <a:ea typeface="+mn-ea"/>
-              <a:cs typeface="+mn-cs"/>
-            </a:endParaRPr>
-          </a:p>
-          <a:p>
-            <a:pPr marL="0" marR="0" indent="0" algn="just" defTabSz="914400" rtl="0" eaLnBrk="1" fontAlgn="base" latinLnBrk="0" hangingPunct="1">
-              <a:lnSpc>
-                <a:spcPct val="100000"/>
-              </a:lnSpc>
-              <a:spcBef>
-                <a:spcPct val="30000"/>
-              </a:spcBef>
-              <a:spcAft>
-                <a:spcPct val="0"/>
-              </a:spcAft>
-              <a:buClrTx/>
-              <a:buSzTx/>
-              <a:buFontTx/>
-              <a:buNone/>
-              <a:tabLst/>
-              <a:defRPr/>
-            </a:pPr>
-            <a:r>
-              <a:rPr lang="ko-KR" altLang="en-US" sz="1200" kern="1200" baseline="0" dirty="0" err="1" smtClean="0">
-                <a:solidFill>
-                  <a:schemeClr val="tx1"/>
-                </a:solidFill>
-                <a:latin typeface="Arial" charset="0"/>
-                <a:ea typeface="+mn-ea"/>
-                <a:cs typeface="+mn-cs"/>
-              </a:rPr>
-              <a:t>트폰의</a:t>
-            </a:r>
-            <a:r>
-              <a:rPr lang="ko-KR" altLang="en-US" sz="1200" kern="1200" baseline="0" dirty="0" smtClean="0">
-                <a:solidFill>
-                  <a:schemeClr val="tx1"/>
-                </a:solidFill>
-                <a:latin typeface="Arial" charset="0"/>
-                <a:ea typeface="+mn-ea"/>
-                <a:cs typeface="+mn-cs"/>
-              </a:rPr>
-              <a:t> 지나가는 모든 화면을 </a:t>
+              <a:t>화면을 </a:t>
             </a:r>
             <a:r>
               <a:rPr lang="en-US" altLang="ko-KR" sz="1200" kern="1200" baseline="0" dirty="0" smtClean="0">
@@ -3635,18 +3695,18 @@
                 <a:ea typeface="+mn-ea"/>
                 <a:cs typeface="+mn-cs"/>
               </a:rPr>
-              <a:t>스마트폰에서</a:t>
-            </a:r>
-            <a:r>
-              <a:rPr lang="ko-KR" altLang="ko-KR" sz="1200" kern="1200" dirty="0" smtClean="0">
-                <a:solidFill>
-                  <a:schemeClr val="tx1"/>
-                </a:solidFill>
-                <a:latin typeface="Arial" charset="0"/>
-                <a:ea typeface="+mn-ea"/>
-                <a:cs typeface="+mn-cs"/>
-              </a:rPr>
-              <a:t> 가능한 일</a:t>
+              <a:t>스마트폰</a:t>
+            </a:r>
+            <a:r>
+              <a:rPr lang="ko-KR" altLang="en-US" sz="1200" kern="1200" dirty="0" err="1" smtClean="0">
+                <a:solidFill>
+                  <a:schemeClr val="tx1"/>
+                </a:solidFill>
+                <a:latin typeface="Arial" charset="0"/>
+                <a:ea typeface="+mn-ea"/>
+                <a:cs typeface="+mn-cs"/>
+              </a:rPr>
+              <a:t>의</a:t>
             </a:r>
             <a:r>
               <a:rPr lang="ko-KR" altLang="en-US" sz="1200" kern="1200" dirty="0" smtClean="0">
@@ -3657,18 +3717,7 @@
                 <a:ea typeface="+mn-ea"/>
                 <a:cs typeface="+mn-cs"/>
               </a:rPr>
-              <a:t>은</a:t>
-            </a:r>
-            <a:r>
-              <a:rPr lang="ko-KR" altLang="ko-KR" sz="1200" kern="1200" dirty="0" smtClean="0">
-                <a:solidFill>
-                  <a:schemeClr val="tx1"/>
-                </a:solidFill>
-                <a:latin typeface="Arial" charset="0"/>
-                <a:ea typeface="+mn-ea"/>
-                <a:cs typeface="+mn-cs"/>
-              </a:rPr>
-              <a:t> 많지만</a:t>
+              <a:t> 기능은 많지만</a:t>
             </a:r>
             <a:r>
               <a:rPr lang="en-US" altLang="ko-KR" sz="1200" kern="1200" dirty="0" smtClean="0">
@@ -4140,12 +4189,8 @@
           <a:lstStyle/>
           <a:p>
             <a:r>
-              <a:rPr lang="en-US" altLang="ko-KR" dirty="0" smtClean="0"/>
-              <a:t>USB</a:t>
-            </a:r>
-            <a:r>
               <a:rPr lang="ko-KR" altLang="en-US" dirty="0" smtClean="0"/>
-              <a:t>는 기존에는 </a:t>
+              <a:t>기존에는 </a:t>
             </a:r>
             <a:r>
               <a:rPr lang="en-US" altLang="ko-KR" dirty="0" smtClean="0"/>
@@ -5370,7 +5415,29 @@
                 <a:ea typeface="+mn-ea"/>
                 <a:cs typeface="+mn-cs"/>
               </a:rPr>
-              <a:t>예를 들어 좌측 구조가 윈도우 어플리케이션에 </a:t>
+              <a:t>예를 들어 </a:t>
+            </a:r>
+            <a:r>
+              <a:rPr lang="ko-KR" altLang="en-US" sz="1200" kern="1200" dirty="0" smtClean="0">
+                <a:solidFill>
+                  <a:schemeClr val="tx1"/>
+                </a:solidFill>
+                <a:latin typeface="Arial" charset="0"/>
+                <a:ea typeface="+mn-ea"/>
+                <a:cs typeface="+mn-cs"/>
+              </a:rPr>
+              <a:t>좌측이 </a:t>
+            </a:r>
+            <a:r>
+              <a:rPr lang="ko-KR" altLang="en-US" sz="1200" kern="1200" dirty="0" smtClean="0">
+                <a:solidFill>
+                  <a:schemeClr val="tx1"/>
+                </a:solidFill>
+                <a:latin typeface="Arial" charset="0"/>
+                <a:ea typeface="+mn-ea"/>
+                <a:cs typeface="+mn-cs"/>
+              </a:rPr>
+              <a:t>윈도우 어플리케이션에 </a:t>
             </a:r>
             <a:r>
               <a:rPr lang="en-US" altLang="ko-KR" sz="1200" kern="1200" dirty="0" smtClean="0">
@@ -5425,7 +5492,7 @@
                 <a:ea typeface="+mn-ea"/>
                 <a:cs typeface="+mn-cs"/>
               </a:rPr>
-              <a:t> 구조에서 </a:t>
+              <a:t>에서 </a:t>
             </a:r>
             <a:r>
               <a:rPr lang="ko-KR" altLang="en-US" sz="1200" kern="1200" baseline="0" dirty="0" err="1" smtClean="0">
@@ -5502,7 +5569,18 @@
                 <a:ea typeface="+mn-ea"/>
                 <a:cs typeface="+mn-cs"/>
               </a:rPr>
-              <a:t>장치로 인식하게 하고 </a:t>
+              <a:t>장치로 </a:t>
+            </a:r>
+            <a:r>
+              <a:rPr lang="ko-KR" altLang="en-US" sz="1200" kern="1200" dirty="0" smtClean="0">
+                <a:solidFill>
+                  <a:schemeClr val="tx1"/>
+                </a:solidFill>
+                <a:latin typeface="Arial" charset="0"/>
+                <a:ea typeface="+mn-ea"/>
+                <a:cs typeface="+mn-cs"/>
+              </a:rPr>
+              <a:t>인식되고</a:t>
             </a:r>
             <a:r>
               <a:rPr lang="en-US" altLang="ko-KR" sz="1200" kern="1200" dirty="0" smtClean="0">
@@ -5513,6 +5591,28 @@
                 <a:ea typeface="+mn-ea"/>
                 <a:cs typeface="+mn-cs"/>
               </a:rPr>
+              <a:t>,</a:t>
+            </a:r>
+            <a:r>
+              <a:rPr lang="ko-KR" altLang="en-US" sz="1200" kern="1200" dirty="0" smtClean="0">
+                <a:solidFill>
+                  <a:schemeClr val="tx1"/>
+                </a:solidFill>
+                <a:latin typeface="Arial" charset="0"/>
+                <a:ea typeface="+mn-ea"/>
+                <a:cs typeface="+mn-cs"/>
+              </a:rPr>
+              <a:t> </a:t>
+            </a:r>
+            <a:r>
+              <a:rPr lang="en-US" altLang="ko-KR" sz="1200" kern="1200" dirty="0" smtClean="0">
+                <a:solidFill>
+                  <a:schemeClr val="tx1"/>
+                </a:solidFill>
+                <a:latin typeface="Arial" charset="0"/>
+                <a:ea typeface="+mn-ea"/>
+                <a:cs typeface="+mn-cs"/>
+              </a:rPr>
               <a:t>USB/IP</a:t>
             </a:r>
             <a:r>
@@ -5536,6 +5636,17 @@
                 <a:cs typeface="+mn-cs"/>
               </a:rPr>
               <a:t> </a:t>
+            </a:r>
+            <a:r>
+              <a:rPr lang="ko-KR" altLang="en-US" sz="1200" kern="1200" baseline="0" dirty="0" smtClean="0">
+                <a:solidFill>
+                  <a:schemeClr val="tx1"/>
+                </a:solidFill>
+                <a:latin typeface="Arial" charset="0"/>
+                <a:ea typeface="+mn-ea"/>
+                <a:cs typeface="+mn-cs"/>
+              </a:rPr>
+              <a:t>어플리케이션의 수정 없이 </a:t>
             </a:r>
             <a:r>
               <a:rPr lang="en-US" altLang="ko-KR" sz="1200" kern="1200" baseline="0" dirty="0" smtClean="0">
@@ -5798,7 +5909,29 @@
                 <a:ea typeface="+mn-ea"/>
                 <a:cs typeface="+mn-cs"/>
               </a:rPr>
-              <a:t>용 프로그램들을 수정 없이 사용할 수 있다는 장점을 갖습니다</a:t>
+              <a:t>용 </a:t>
+            </a:r>
+            <a:r>
+              <a:rPr lang="ko-KR" altLang="en-US" sz="1200" kern="1200" dirty="0" smtClean="0">
+                <a:solidFill>
+                  <a:schemeClr val="tx1"/>
+                </a:solidFill>
+                <a:latin typeface="Arial" charset="0"/>
+                <a:ea typeface="+mn-ea"/>
+                <a:cs typeface="+mn-cs"/>
+              </a:rPr>
+              <a:t>어플리케이션들을 수정 </a:t>
+            </a:r>
+            <a:r>
+              <a:rPr lang="ko-KR" altLang="en-US" sz="1200" kern="1200" dirty="0" smtClean="0">
+                <a:solidFill>
+                  <a:schemeClr val="tx1"/>
+                </a:solidFill>
+                <a:latin typeface="Arial" charset="0"/>
+                <a:ea typeface="+mn-ea"/>
+                <a:cs typeface="+mn-cs"/>
+              </a:rPr>
+              <a:t>없이 사용할 수 있다는 장점을 갖습니다</a:t>
             </a:r>
             <a:r>
               <a:rPr lang="en-US" altLang="ko-KR" sz="1200" kern="1200" dirty="0" smtClean="0">
@@ -5875,7 +6008,7 @@
                 <a:ea typeface="+mn-ea"/>
                 <a:cs typeface="+mn-cs"/>
               </a:rPr>
-              <a:t>프로그램을 </a:t>
+              <a:t>어플리케이션을 </a:t>
             </a:r>
             <a:r>
               <a:rPr lang="ko-KR" altLang="en-US" sz="1200" kern="1200" dirty="0" smtClean="0">
@@ -5897,7 +6030,7 @@
                 <a:ea typeface="+mn-ea"/>
                 <a:cs typeface="+mn-cs"/>
               </a:rPr>
-              <a:t>..</a:t>
+              <a:t>.</a:t>
             </a:r>
             <a:endParaRPr lang="ko-KR" altLang="en-US" sz="1200" kern="1200" dirty="0" smtClean="0">
               <a:solidFill>
@@ -8985,7 +9118,7 @@
       </p:sp>
       <p:grpSp>
         <p:nvGrpSpPr>
-          <p:cNvPr id="9" name="그룹 8"/>
+          <p:cNvPr id="10" name="그룹 9"/>
           <p:cNvGrpSpPr/>
           <p:nvPr/>
         </p:nvGrpSpPr>
@@ -8993,7 +9126,7 @@
           <a:xfrm>
             <a:off x="2483768" y="2204864"/>
             <a:ext cx="3024336" cy="1902307"/>
-            <a:chOff x="2123728" y="2535682"/>
+            <a:chOff x="2483768" y="2204864"/>
             <a:chExt cx="3024336" cy="1902307"/>
           </a:xfrm>
         </p:grpSpPr>
@@ -9014,7 +9147,7 @@
           </p:blipFill>
           <p:spPr bwMode="auto">
             <a:xfrm>
-              <a:off x="2987825" y="2535682"/>
+              <a:off x="3347865" y="2204864"/>
               <a:ext cx="1296144" cy="1902307"/>
             </a:xfrm>
             <a:prstGeom prst="rect">
@@ -9046,7 +9179,7 @@
           </p:blipFill>
           <p:spPr bwMode="auto">
             <a:xfrm>
-              <a:off x="2123728" y="2636912"/>
+              <a:off x="2483768" y="2306094"/>
               <a:ext cx="3024336" cy="1728192"/>
             </a:xfrm>
             <a:prstGeom prst="rect">
@@ -9965,64 +10098,6 @@
           </a:p>
         </p:txBody>
       </p:sp>
-      <p:pic>
-        <p:nvPicPr>
-          <p:cNvPr id="1026" name="Picture 2"/>
-          <p:cNvPicPr>
-            <a:picLocks noChangeAspect="1" noChangeArrowheads="1"/>
-          </p:cNvPicPr>
-          <p:nvPr/>
-        </p:nvPicPr>
-        <p:blipFill>
-          <a:blip r:embed="rId3" cstate="print"/>
-          <a:srcRect/>
-          <a:stretch>
-            <a:fillRect/>
-          </a:stretch>
-        </p:blipFill>
-        <p:spPr bwMode="auto">
-          <a:xfrm>
-            <a:off x="827584" y="2204864"/>
-            <a:ext cx="2304256" cy="3486514"/>
-          </a:xfrm>
-          <a:prstGeom prst="rect">
-            <a:avLst/>
-          </a:prstGeom>
-          <a:noFill/>
-          <a:ln w="9525">
-            <a:noFill/>
-            <a:miter lim="800000"/>
-            <a:headEnd/>
-            <a:tailEnd/>
-          </a:ln>
-        </p:spPr>
-      </p:pic>
-      <p:pic>
-        <p:nvPicPr>
-          <p:cNvPr id="4" name="Picture 2" descr="N:\백업용\Screenshot_2012-05-07-15-50-22.png"/>
-          <p:cNvPicPr>
-            <a:picLocks noChangeAspect="1" noChangeArrowheads="1"/>
-          </p:cNvPicPr>
-          <p:nvPr/>
-        </p:nvPicPr>
-        <p:blipFill>
-          <a:blip r:embed="rId4" cstate="print"/>
-          <a:srcRect/>
-          <a:stretch>
-            <a:fillRect/>
-          </a:stretch>
-        </p:blipFill>
-        <p:spPr bwMode="auto">
-          <a:xfrm>
-            <a:off x="3203848" y="2204864"/>
-            <a:ext cx="2088232" cy="3528392"/>
-          </a:xfrm>
-          <a:prstGeom prst="rect">
-            <a:avLst/>
-          </a:prstGeom>
-          <a:noFill/>
-        </p:spPr>
-      </p:pic>
       <p:sp>
         <p:nvSpPr>
           <p:cNvPr id="7" name="모서리가 둥근 직사각형 6"/>
@@ -10082,7 +10157,7 @@
           <p:nvPr/>
         </p:nvPicPr>
         <p:blipFill>
-          <a:blip r:embed="rId5" cstate="print"/>
+          <a:blip r:embed="rId3" cstate="print"/>
           <a:srcRect/>
           <a:stretch>
             <a:fillRect/>
@@ -10103,6 +10178,99 @@
             <a:headEnd/>
             <a:tailEnd/>
           </a:ln>
+        </p:spPr>
+      </p:pic>
+      <p:grpSp>
+        <p:nvGrpSpPr>
+          <p:cNvPr id="24" name="그룹 23"/>
+          <p:cNvGrpSpPr/>
+          <p:nvPr/>
+        </p:nvGrpSpPr>
+        <p:grpSpPr>
+          <a:xfrm>
+            <a:off x="3203848" y="2204864"/>
+            <a:ext cx="2160240" cy="3600400"/>
+            <a:chOff x="3203848" y="2204864"/>
+            <a:chExt cx="2160240" cy="3600400"/>
+          </a:xfrm>
+        </p:grpSpPr>
+        <p:pic>
+          <p:nvPicPr>
+            <p:cNvPr id="22" name="Picture 2" descr="C:\Documents and Settings\Administrator\바탕 화면\Untitled-1.gif"/>
+            <p:cNvPicPr>
+              <a:picLocks noChangeAspect="1" noChangeArrowheads="1"/>
+            </p:cNvPicPr>
+            <p:nvPr/>
+          </p:nvPicPr>
+          <p:blipFill>
+            <a:blip r:embed="rId4" cstate="print"/>
+            <a:srcRect/>
+            <a:stretch>
+              <a:fillRect/>
+            </a:stretch>
+          </p:blipFill>
+          <p:spPr bwMode="auto">
+            <a:xfrm>
+              <a:off x="3203848" y="2204864"/>
+              <a:ext cx="2160240" cy="3600400"/>
+            </a:xfrm>
+            <a:prstGeom prst="rect">
+              <a:avLst/>
+            </a:prstGeom>
+            <a:noFill/>
+          </p:spPr>
+        </p:pic>
+        <p:pic>
+          <p:nvPicPr>
+            <p:cNvPr id="4" name="Picture 2" descr="N:\백업용\Screenshot_2012-05-07-15-50-22.png"/>
+            <p:cNvPicPr>
+              <a:picLocks noChangeAspect="1" noChangeArrowheads="1"/>
+            </p:cNvPicPr>
+            <p:nvPr/>
+          </p:nvPicPr>
+          <p:blipFill>
+            <a:blip r:embed="rId5" cstate="print"/>
+            <a:srcRect/>
+            <a:stretch>
+              <a:fillRect/>
+            </a:stretch>
+          </p:blipFill>
+          <p:spPr bwMode="auto">
+            <a:xfrm>
+              <a:off x="3347864" y="2636912"/>
+              <a:ext cx="1872208" cy="2736304"/>
+            </a:xfrm>
+            <a:prstGeom prst="rect">
+              <a:avLst/>
+            </a:prstGeom>
+            <a:noFill/>
+          </p:spPr>
+        </p:pic>
+      </p:grpSp>
+      <p:pic>
+        <p:nvPicPr>
+          <p:cNvPr id="25" name="Picture 4" descr="N:\설계프로젝트\제목 없음.png"/>
+          <p:cNvPicPr>
+            <a:picLocks noChangeAspect="1" noChangeArrowheads="1"/>
+          </p:cNvPicPr>
+          <p:nvPr/>
+        </p:nvPicPr>
+        <p:blipFill>
+          <a:blip r:embed="rId6" cstate="print"/>
+          <a:srcRect/>
+          <a:stretch>
+            <a:fillRect/>
+          </a:stretch>
+        </p:blipFill>
+        <p:spPr bwMode="auto">
+          <a:xfrm>
+            <a:off x="815059" y="2239294"/>
+            <a:ext cx="2244774" cy="3528391"/>
+          </a:xfrm>
+          <a:prstGeom prst="rect">
+            <a:avLst/>
+          </a:prstGeom>
+          <a:noFill/>
         </p:spPr>
       </p:pic>
     </p:spTree>
@@ -10259,64 +10427,6 @@
           </a:p>
         </p:txBody>
       </p:sp>
-      <p:pic>
-        <p:nvPicPr>
-          <p:cNvPr id="1026" name="Picture 2"/>
-          <p:cNvPicPr>
-            <a:picLocks noChangeAspect="1" noChangeArrowheads="1"/>
-          </p:cNvPicPr>
-          <p:nvPr/>
-        </p:nvPicPr>
-        <p:blipFill>
-          <a:blip r:embed="rId3" cstate="print"/>
-          <a:srcRect/>
-          <a:stretch>
-            <a:fillRect/>
-          </a:stretch>
-        </p:blipFill>
-        <p:spPr bwMode="auto">
-          <a:xfrm>
-            <a:off x="934076" y="2348880"/>
-            <a:ext cx="4176464" cy="3543185"/>
-          </a:xfrm>
-          <a:prstGeom prst="rect">
-            <a:avLst/>
-          </a:prstGeom>
-          <a:noFill/>
-          <a:ln w="9525">
-            <a:noFill/>
-            <a:miter lim="800000"/>
-            <a:headEnd/>
-            <a:tailEnd/>
-          </a:ln>
-        </p:spPr>
-      </p:pic>
-      <p:pic>
-        <p:nvPicPr>
-          <p:cNvPr id="4" name="Picture 2" descr="N:\백업용\Screenshot_2012-05-07-15-50-22.png"/>
-          <p:cNvPicPr>
-            <a:picLocks noChangeAspect="1" noChangeArrowheads="1"/>
-          </p:cNvPicPr>
-          <p:nvPr/>
-        </p:nvPicPr>
-        <p:blipFill>
-          <a:blip r:embed="rId4" cstate="print"/>
-          <a:srcRect/>
-          <a:stretch>
-            <a:fillRect/>
-          </a:stretch>
-        </p:blipFill>
-        <p:spPr bwMode="auto">
-          <a:xfrm>
-            <a:off x="5686604" y="2348880"/>
-            <a:ext cx="2413788" cy="3590933"/>
-          </a:xfrm>
-          <a:prstGeom prst="rect">
-            <a:avLst/>
-          </a:prstGeom>
-          <a:noFill/>
-        </p:spPr>
-      </p:pic>
       <p:sp>
         <p:nvSpPr>
           <p:cNvPr id="6" name="내용 개체 틀 2"/>
@@ -10582,6 +10692,166 @@
           </a:p>
         </p:txBody>
       </p:sp>
+      <p:pic>
+        <p:nvPicPr>
+          <p:cNvPr id="9" name="Picture 2" descr="N:\백업용\Screenshot_2012-05-07-15-50-22.png"/>
+          <p:cNvPicPr>
+            <a:picLocks noChangeAspect="1" noChangeArrowheads="1"/>
+          </p:cNvPicPr>
+          <p:nvPr/>
+        </p:nvPicPr>
+        <p:blipFill>
+          <a:blip r:embed="rId3" cstate="print"/>
+          <a:srcRect/>
+          <a:stretch>
+            <a:fillRect/>
+          </a:stretch>
+        </p:blipFill>
+        <p:spPr bwMode="auto">
+          <a:xfrm>
+            <a:off x="1093658" y="2649439"/>
+            <a:ext cx="2304256" cy="2664295"/>
+          </a:xfrm>
+          <a:prstGeom prst="rect">
+            <a:avLst/>
+          </a:prstGeom>
+          <a:noFill/>
+        </p:spPr>
+      </p:pic>
+      <p:grpSp>
+        <p:nvGrpSpPr>
+          <p:cNvPr id="16" name="그룹 15"/>
+          <p:cNvGrpSpPr/>
+          <p:nvPr/>
+        </p:nvGrpSpPr>
+        <p:grpSpPr>
+          <a:xfrm>
+            <a:off x="5625833" y="2276872"/>
+            <a:ext cx="2546567" cy="3600400"/>
+            <a:chOff x="5481817" y="1815602"/>
+            <a:chExt cx="2808311" cy="4709742"/>
+          </a:xfrm>
+        </p:grpSpPr>
+        <p:pic>
+          <p:nvPicPr>
+            <p:cNvPr id="14" name="Picture 2" descr="C:\Documents and Settings\Administrator\바탕 화면\Untitled-1.gif"/>
+            <p:cNvPicPr>
+              <a:picLocks noChangeAspect="1" noChangeArrowheads="1"/>
+            </p:cNvPicPr>
+            <p:nvPr/>
+          </p:nvPicPr>
+          <p:blipFill>
+            <a:blip r:embed="rId4" cstate="print"/>
+            <a:srcRect/>
+            <a:stretch>
+              <a:fillRect/>
+            </a:stretch>
+          </p:blipFill>
+          <p:spPr bwMode="auto">
+            <a:xfrm>
+              <a:off x="5481817" y="1815602"/>
+              <a:ext cx="2808311" cy="4709742"/>
+            </a:xfrm>
+            <a:prstGeom prst="rect">
+              <a:avLst/>
+            </a:prstGeom>
+            <a:noFill/>
+          </p:spPr>
+        </p:pic>
+        <p:pic>
+          <p:nvPicPr>
+            <p:cNvPr id="1027" name="Picture 3" descr="N:\설계프로젝트\자료실, 소스코드\Screenshot_2012-05-22-21-04-09.png"/>
+            <p:cNvPicPr>
+              <a:picLocks noChangeAspect="1" noChangeArrowheads="1"/>
+            </p:cNvPicPr>
+            <p:nvPr/>
+          </p:nvPicPr>
+          <p:blipFill>
+            <a:blip r:embed="rId5" cstate="print"/>
+            <a:srcRect/>
+            <a:stretch>
+              <a:fillRect/>
+            </a:stretch>
+          </p:blipFill>
+          <p:spPr bwMode="auto">
+            <a:xfrm>
+              <a:off x="5652120" y="2348880"/>
+              <a:ext cx="2448272" cy="3569092"/>
+            </a:xfrm>
+            <a:prstGeom prst="rect">
+              <a:avLst/>
+            </a:prstGeom>
+            <a:noFill/>
+          </p:spPr>
+        </p:pic>
+      </p:grpSp>
+      <p:grpSp>
+        <p:nvGrpSpPr>
+          <p:cNvPr id="18" name="그룹 17"/>
+          <p:cNvGrpSpPr/>
+          <p:nvPr/>
+        </p:nvGrpSpPr>
+        <p:grpSpPr>
+          <a:xfrm>
+            <a:off x="971600" y="2348881"/>
+            <a:ext cx="4176463" cy="3528391"/>
+            <a:chOff x="971600" y="2348881"/>
+            <a:chExt cx="4176463" cy="3528391"/>
+          </a:xfrm>
+        </p:grpSpPr>
+        <p:pic>
+          <p:nvPicPr>
+            <p:cNvPr id="1028" name="Picture 4" descr="N:\설계프로젝트\제목 없음.png"/>
+            <p:cNvPicPr>
+              <a:picLocks noChangeAspect="1" noChangeArrowheads="1"/>
+            </p:cNvPicPr>
+            <p:nvPr/>
+          </p:nvPicPr>
+          <p:blipFill>
+            <a:blip r:embed="rId6" cstate="print"/>
+            <a:srcRect/>
+            <a:stretch>
+              <a:fillRect/>
+            </a:stretch>
+          </p:blipFill>
+          <p:spPr bwMode="auto">
+            <a:xfrm>
+              <a:off x="971600" y="2348881"/>
+              <a:ext cx="4176463" cy="3528391"/>
+            </a:xfrm>
+            <a:prstGeom prst="rect">
+              <a:avLst/>
+            </a:prstGeom>
+            <a:noFill/>
+          </p:spPr>
+        </p:pic>
+        <p:pic>
+          <p:nvPicPr>
+            <p:cNvPr id="12" name="Picture 3" descr="N:\설계프로젝트\자료실, 소스코드\Screenshot_2012-05-22-21-04-09.png"/>
+            <p:cNvPicPr>
+              <a:picLocks noChangeAspect="1" noChangeArrowheads="1"/>
+            </p:cNvPicPr>
+            <p:nvPr/>
+          </p:nvPicPr>
+          <p:blipFill>
+            <a:blip r:embed="rId5" cstate="print"/>
+            <a:srcRect/>
+            <a:stretch>
+              <a:fillRect/>
+            </a:stretch>
+          </p:blipFill>
+          <p:spPr bwMode="auto">
+            <a:xfrm>
+              <a:off x="1094408" y="2636913"/>
+              <a:ext cx="2304256" cy="2664295"/>
+            </a:xfrm>
+            <a:prstGeom prst="rect">
+              <a:avLst/>
+            </a:prstGeom>
+            <a:noFill/>
+          </p:spPr>
+        </p:pic>
+      </p:grpSp>
     </p:spTree>
     <p:extLst>
       <p:ext uri="{BB962C8B-B14F-4D97-AF65-F5344CB8AC3E}">
@@ -12462,38 +12732,120 @@
           </a:p>
         </p:txBody>
       </p:sp>
-      <p:pic>
-        <p:nvPicPr>
-          <p:cNvPr id="3074" name="Picture 2"/>
-          <p:cNvPicPr>
-            <a:picLocks noChangeAspect="1" noChangeArrowheads="1"/>
-          </p:cNvPicPr>
+      <p:grpSp>
+        <p:nvGrpSpPr>
+          <p:cNvPr id="8" name="그룹 7"/>
+          <p:cNvGrpSpPr/>
           <p:nvPr/>
-        </p:nvPicPr>
-        <p:blipFill>
-          <a:blip r:embed="rId3" cstate="print"/>
-          <a:srcRect/>
-          <a:stretch>
-            <a:fillRect/>
-          </a:stretch>
-        </p:blipFill>
-        <p:spPr bwMode="auto">
+        </p:nvGrpSpPr>
+        <p:grpSpPr>
           <a:xfrm>
-            <a:off x="2627784" y="1988840"/>
-            <a:ext cx="3672408" cy="4089727"/>
+            <a:off x="2699792" y="1844824"/>
+            <a:ext cx="3600400" cy="4248472"/>
+            <a:chOff x="2483768" y="1556792"/>
+            <a:chExt cx="4104456" cy="4824536"/>
           </a:xfrm>
-          <a:prstGeom prst="rect">
-            <a:avLst/>
-          </a:prstGeom>
-          <a:noFill/>
-          <a:ln w="9525">
+        </p:grpSpPr>
+        <p:grpSp>
+          <p:nvGrpSpPr>
+            <p:cNvPr id="5" name="그룹 4"/>
+            <p:cNvGrpSpPr/>
+            <p:nvPr/>
+          </p:nvGrpSpPr>
+          <p:grpSpPr>
+            <a:xfrm>
+              <a:off x="2483768" y="1556792"/>
+              <a:ext cx="4104456" cy="4824536"/>
+              <a:chOff x="5481817" y="1815602"/>
+              <a:chExt cx="2808311" cy="4709742"/>
+            </a:xfrm>
+          </p:grpSpPr>
+          <p:pic>
+            <p:nvPicPr>
+              <p:cNvPr id="6" name="Picture 2" descr="C:\Documents and Settings\Administrator\바탕 화면\Untitled-1.gif"/>
+              <p:cNvPicPr>
+                <a:picLocks noChangeAspect="1" noChangeArrowheads="1"/>
+              </p:cNvPicPr>
+              <p:nvPr/>
+            </p:nvPicPr>
+            <p:blipFill>
+              <a:blip r:embed="rId3" cstate="print"/>
+              <a:srcRect/>
+              <a:stretch>
+                <a:fillRect/>
+              </a:stretch>
+            </p:blipFill>
+            <p:spPr bwMode="auto">
+              <a:xfrm>
+                <a:off x="5481817" y="1815602"/>
+                <a:ext cx="2808311" cy="4709742"/>
+              </a:xfrm>
+              <a:prstGeom prst="rect">
+                <a:avLst/>
+              </a:prstGeom>
+              <a:noFill/>
+            </p:spPr>
+          </p:pic>
+          <p:pic>
+            <p:nvPicPr>
+              <p:cNvPr id="7" name="Picture 3" descr="N:\설계프로젝트\자료실, 소스코드\Screenshot_2012-05-22-21-04-09.png"/>
+              <p:cNvPicPr>
+                <a:picLocks noChangeAspect="1" noChangeArrowheads="1"/>
+              </p:cNvPicPr>
+              <p:nvPr/>
+            </p:nvPicPr>
+            <p:blipFill>
+              <a:blip r:embed="rId4" cstate="print"/>
+              <a:srcRect/>
+              <a:stretch>
+                <a:fillRect/>
+              </a:stretch>
+            </p:blipFill>
+            <p:spPr bwMode="auto">
+              <a:xfrm>
+                <a:off x="5652120" y="2348880"/>
+                <a:ext cx="2448272" cy="3569092"/>
+              </a:xfrm>
+              <a:prstGeom prst="rect">
+                <a:avLst/>
+              </a:prstGeom>
+              <a:noFill/>
+            </p:spPr>
+          </p:pic>
+        </p:grpSp>
+        <p:pic>
+          <p:nvPicPr>
+            <p:cNvPr id="3074" name="Picture 2"/>
+            <p:cNvPicPr>
+              <a:picLocks noChangeAspect="1" noChangeArrowheads="1"/>
+            </p:cNvPicPr>
+            <p:nvPr/>
+          </p:nvPicPr>
+          <p:blipFill>
+            <a:blip r:embed="rId5" cstate="print"/>
+            <a:srcRect/>
+            <a:stretch>
+              <a:fillRect/>
+            </a:stretch>
+          </p:blipFill>
+          <p:spPr bwMode="auto">
+            <a:xfrm>
+              <a:off x="2734221" y="2107805"/>
+              <a:ext cx="3607735" cy="3697459"/>
+            </a:xfrm>
+            <a:prstGeom prst="rect">
+              <a:avLst/>
+            </a:prstGeom>
             <a:noFill/>
-            <a:miter lim="800000"/>
-            <a:headEnd/>
-            <a:tailEnd/>
-          </a:ln>
-        </p:spPr>
-      </p:pic>
+            <a:ln w="9525">
+              <a:noFill/>
+              <a:miter lim="800000"/>
+              <a:headEnd/>
+              <a:tailEnd/>
+            </a:ln>
+          </p:spPr>
+        </p:pic>
+      </p:grpSp>
     </p:spTree>
     <p:extLst>
       <p:ext uri="{BB962C8B-B14F-4D97-AF65-F5344CB8AC3E}">
@@ -12919,17 +13271,6 @@
           </a:ln>
           <a:effectLst/>
           <a:extLst>
-            <a:ext uri="{91240B29-F687-4F45-9708-019B960494DF}">
-              <a14:hiddenLine xmlns:a14="http://schemas.microsoft.com/office/drawing/2010/main" xmlns="" w="9525" cap="flat" cmpd="sng" algn="ctr">
-                <a:solidFill>
-                  <a:schemeClr val="tx1"/>
-                </a:solidFill>
-                <a:prstDash val="solid"/>
-                <a:round/>
-                <a:headEnd type="none" w="med" len="med"/>
-                <a:tailEnd type="none" w="med" len="med"/>
-              </a14:hiddenLine>
-            </a:ext>
             <a:ext uri="{AF507438-7753-43E0-B8FC-AC1667EBCBE1}">
               <a14:hiddenEffects xmlns:a14="http://schemas.microsoft.com/office/drawing/2010/main" xmlns="">
                 <a:effectLst>
@@ -14590,17 +14931,6 @@
             </a:ln>
             <a:effectLst/>
             <a:extLst>
-              <a:ext uri="{91240B29-F687-4F45-9708-019B960494DF}">
-                <a14:hiddenLine xmlns:a14="http://schemas.microsoft.com/office/drawing/2010/main" xmlns="" w="9525" cap="flat" cmpd="sng" algn="ctr">
-                  <a:solidFill>
-                    <a:schemeClr val="tx1"/>
-                  </a:solidFill>
-                  <a:prstDash val="solid"/>
-                  <a:round/>
-                  <a:headEnd type="none" w="med" len="med"/>
-                  <a:tailEnd type="none" w="med" len="med"/>
-                </a14:hiddenLine>
-              </a:ext>
               <a:ext uri="{AF507438-7753-43E0-B8FC-AC1667EBCBE1}">
                 <a14:hiddenEffects xmlns:a14="http://schemas.microsoft.com/office/drawing/2010/main" xmlns="">
                   <a:effectLst>
@@ -14652,17 +14982,6 @@
             </a:ln>
             <a:effectLst/>
             <a:extLst>
-              <a:ext uri="{91240B29-F687-4F45-9708-019B960494DF}">
-                <a14:hiddenLine xmlns:a14="http://schemas.microsoft.com/office/drawing/2010/main" xmlns="" w="9525" cap="flat" cmpd="sng" algn="ctr">
-                  <a:solidFill>
-                    <a:schemeClr val="tx1"/>
-                  </a:solidFill>
-                  <a:prstDash val="solid"/>
-                  <a:round/>
-                  <a:headEnd type="none" w="med" len="med"/>
-                  <a:tailEnd type="none" w="med" len="med"/>
-                </a14:hiddenLine>
-              </a:ext>
               <a:ext uri="{AF507438-7753-43E0-B8FC-AC1667EBCBE1}">
                 <a14:hiddenEffects xmlns:a14="http://schemas.microsoft.com/office/drawing/2010/main" xmlns="">
                   <a:effectLst>
@@ -14714,17 +15033,6 @@
             </a:ln>
             <a:effectLst/>
             <a:extLst>
-              <a:ext uri="{91240B29-F687-4F45-9708-019B960494DF}">
-                <a14:hiddenLine xmlns:a14="http://schemas.microsoft.com/office/drawing/2010/main" xmlns="" w="9525" cap="flat" cmpd="sng" algn="ctr">
-                  <a:solidFill>
-                    <a:schemeClr val="tx1"/>
-                  </a:solidFill>
-                  <a:prstDash val="solid"/>
-                  <a:round/>
-                  <a:headEnd type="none" w="med" len="med"/>
-                  <a:tailEnd type="none" w="med" len="med"/>
-                </a14:hiddenLine>
-              </a:ext>
               <a:ext uri="{AF507438-7753-43E0-B8FC-AC1667EBCBE1}">
                 <a14:hiddenEffects xmlns:a14="http://schemas.microsoft.com/office/drawing/2010/main" xmlns="">
                   <a:effectLst>
@@ -14776,17 +15084,6 @@
             </a:ln>
             <a:effectLst/>
             <a:extLst>
-              <a:ext uri="{91240B29-F687-4F45-9708-019B960494DF}">
-                <a14:hiddenLine xmlns:a14="http://schemas.microsoft.com/office/drawing/2010/main" xmlns="" w="9525" cap="flat" cmpd="sng" algn="ctr">
-                  <a:solidFill>
-                    <a:schemeClr val="tx1"/>
-                  </a:solidFill>
-                  <a:prstDash val="solid"/>
-                  <a:round/>
-                  <a:headEnd type="none" w="med" len="med"/>
-                  <a:tailEnd type="none" w="med" len="med"/>
-                </a14:hiddenLine>
-              </a:ext>
               <a:ext uri="{AF507438-7753-43E0-B8FC-AC1667EBCBE1}">
                 <a14:hiddenEffects xmlns:a14="http://schemas.microsoft.com/office/drawing/2010/main" xmlns="">
                   <a:effectLst>

</xml_diff>

<commit_message>
modified:   Documents/presentation doc/Final Presentation/final_presentation_script.docx
</commit_message>
<xml_diff>
--- a/Documents/presentation doc/Final Presentation/final-presentation.pptx
+++ b/Documents/presentation doc/Final Presentation/final-presentation.pptx
@@ -166,10 +166,10 @@
           <c:layoutTarget val="inner"/>
           <c:xMode val="edge"/>
           <c:yMode val="edge"/>
-          <c:x val="0.13756541418769774"/>
-          <c:y val="0.31142121774829512"/>
+          <c:x val="0.13756541418769777"/>
+          <c:y val="0.31142121774829518"/>
           <c:w val="0.82290353753797463"/>
-          <c:h val="0.5677631056866651"/>
+          <c:h val="0.56776310568666499"/>
         </c:manualLayout>
       </c:layout>
       <c:barChart>
@@ -264,25 +264,25 @@
           <c:showVal val="1"/>
         </c:dLbls>
         <c:gapWidth val="75"/>
-        <c:axId val="69391488"/>
-        <c:axId val="69393024"/>
+        <c:axId val="66786816"/>
+        <c:axId val="66788352"/>
       </c:barChart>
       <c:catAx>
-        <c:axId val="69391488"/>
+        <c:axId val="66786816"/>
         <c:scaling>
           <c:orientation val="minMax"/>
         </c:scaling>
         <c:axPos val="b"/>
         <c:majorTickMark val="none"/>
         <c:tickLblPos val="nextTo"/>
-        <c:crossAx val="69393024"/>
+        <c:crossAx val="66788352"/>
         <c:crosses val="autoZero"/>
         <c:auto val="1"/>
         <c:lblAlgn val="ctr"/>
         <c:lblOffset val="100"/>
       </c:catAx>
       <c:valAx>
-        <c:axId val="69393024"/>
+        <c:axId val="66788352"/>
         <c:scaling>
           <c:orientation val="minMax"/>
           <c:min val="0"/>
@@ -291,7 +291,7 @@
         <c:numFmt formatCode="General" sourceLinked="1"/>
         <c:majorTickMark val="none"/>
         <c:tickLblPos val="nextTo"/>
-        <c:crossAx val="69391488"/>
+        <c:crossAx val="66786816"/>
         <c:crosses val="autoZero"/>
         <c:crossBetween val="between"/>
         <c:majorUnit val="20"/>
@@ -303,10 +303,10 @@
         <c:manualLayout>
           <c:xMode val="edge"/>
           <c:yMode val="edge"/>
-          <c:x val="0.18942124246731473"/>
-          <c:y val="3.0763248527941729E-2"/>
-          <c:w val="0.68117168015815255"/>
-          <c:h val="0.2234466011713018"/>
+          <c:x val="0.18942124246731479"/>
+          <c:y val="3.0763248527941742E-2"/>
+          <c:w val="0.68117168015815277"/>
+          <c:h val="0.22344660117130188"/>
         </c:manualLayout>
       </c:layout>
     </c:legend>
@@ -377,14 +377,14 @@
           <a:effectLst/>
           <a:extLst>
             <a:ext uri="{909E8E84-426E-40DD-AFC4-6F175D3DCCD1}">
-              <a14:hiddenFill xmlns:a14="http://schemas.microsoft.com/office/drawing/2010/main" xmlns="">
+              <a14:hiddenFill xmlns="" xmlns:a14="http://schemas.microsoft.com/office/drawing/2010/main">
                 <a:solidFill>
                   <a:schemeClr val="accent1"/>
                 </a:solidFill>
               </a14:hiddenFill>
             </a:ext>
             <a:ext uri="{91240B29-F687-4F45-9708-019B960494DF}">
-              <a14:hiddenLine xmlns:a14="http://schemas.microsoft.com/office/drawing/2010/main" xmlns="" w="9525">
+              <a14:hiddenLine xmlns="" xmlns:a14="http://schemas.microsoft.com/office/drawing/2010/main" w="9525">
                 <a:solidFill>
                   <a:schemeClr val="tx1"/>
                 </a:solidFill>
@@ -394,7 +394,7 @@
               </a14:hiddenLine>
             </a:ext>
             <a:ext uri="{AF507438-7753-43E0-B8FC-AC1667EBCBE1}">
-              <a14:hiddenEffects xmlns:a14="http://schemas.microsoft.com/office/drawing/2010/main" xmlns="">
+              <a14:hiddenEffects xmlns="" xmlns:a14="http://schemas.microsoft.com/office/drawing/2010/main">
                 <a:effectLst>
                   <a:outerShdw dist="35921" dir="2700000" algn="ctr" rotWithShape="0">
                     <a:schemeClr val="bg2"/>
@@ -447,14 +447,14 @@
           <a:effectLst/>
           <a:extLst>
             <a:ext uri="{909E8E84-426E-40DD-AFC4-6F175D3DCCD1}">
-              <a14:hiddenFill xmlns:a14="http://schemas.microsoft.com/office/drawing/2010/main" xmlns="">
+              <a14:hiddenFill xmlns="" xmlns:a14="http://schemas.microsoft.com/office/drawing/2010/main">
                 <a:solidFill>
                   <a:schemeClr val="accent1"/>
                 </a:solidFill>
               </a14:hiddenFill>
             </a:ext>
             <a:ext uri="{91240B29-F687-4F45-9708-019B960494DF}">
-              <a14:hiddenLine xmlns:a14="http://schemas.microsoft.com/office/drawing/2010/main" xmlns="" w="9525">
+              <a14:hiddenLine xmlns="" xmlns:a14="http://schemas.microsoft.com/office/drawing/2010/main" w="9525">
                 <a:solidFill>
                   <a:schemeClr val="tx1"/>
                 </a:solidFill>
@@ -464,7 +464,7 @@
               </a14:hiddenLine>
             </a:ext>
             <a:ext uri="{AF507438-7753-43E0-B8FC-AC1667EBCBE1}">
-              <a14:hiddenEffects xmlns:a14="http://schemas.microsoft.com/office/drawing/2010/main" xmlns="">
+              <a14:hiddenEffects xmlns="" xmlns:a14="http://schemas.microsoft.com/office/drawing/2010/main">
                 <a:effectLst>
                   <a:outerShdw dist="35921" dir="2700000" algn="ctr" rotWithShape="0">
                     <a:schemeClr val="bg2"/>
@@ -522,7 +522,7 @@
           <a:effectLst/>
           <a:extLst>
             <a:ext uri="{AF507438-7753-43E0-B8FC-AC1667EBCBE1}">
-              <a14:hiddenEffects xmlns:a14="http://schemas.microsoft.com/office/drawing/2010/main" xmlns="">
+              <a14:hiddenEffects xmlns="" xmlns:a14="http://schemas.microsoft.com/office/drawing/2010/main">
                 <a:effectLst>
                   <a:outerShdw dist="35921" dir="2700000" algn="ctr" rotWithShape="0">
                     <a:srgbClr val="808080"/>
@@ -531,7 +531,7 @@
               </a14:hiddenEffects>
             </a:ext>
             <a:ext uri="{53640926-AAD7-44D8-BBD7-CCE9431645EC}">
-              <a14:shadowObscured xmlns:a14="http://schemas.microsoft.com/office/drawing/2010/main" xmlns="" val="1"/>
+              <a14:shadowObscured xmlns="" xmlns:a14="http://schemas.microsoft.com/office/drawing/2010/main" val="1"/>
             </a:ext>
           </a:extLst>
         </p:spPr>
@@ -561,14 +561,14 @@
           <a:effectLst/>
           <a:extLst>
             <a:ext uri="{909E8E84-426E-40DD-AFC4-6F175D3DCCD1}">
-              <a14:hiddenFill xmlns:a14="http://schemas.microsoft.com/office/drawing/2010/main" xmlns="">
+              <a14:hiddenFill xmlns="" xmlns:a14="http://schemas.microsoft.com/office/drawing/2010/main">
                 <a:solidFill>
                   <a:schemeClr val="accent1"/>
                 </a:solidFill>
               </a14:hiddenFill>
             </a:ext>
             <a:ext uri="{91240B29-F687-4F45-9708-019B960494DF}">
-              <a14:hiddenLine xmlns:a14="http://schemas.microsoft.com/office/drawing/2010/main" xmlns="" w="9525">
+              <a14:hiddenLine xmlns="" xmlns:a14="http://schemas.microsoft.com/office/drawing/2010/main" w="9525">
                 <a:solidFill>
                   <a:schemeClr val="tx1"/>
                 </a:solidFill>
@@ -578,7 +578,7 @@
               </a14:hiddenLine>
             </a:ext>
             <a:ext uri="{AF507438-7753-43E0-B8FC-AC1667EBCBE1}">
-              <a14:hiddenEffects xmlns:a14="http://schemas.microsoft.com/office/drawing/2010/main" xmlns="">
+              <a14:hiddenEffects xmlns="" xmlns:a14="http://schemas.microsoft.com/office/drawing/2010/main">
                 <a:effectLst>
                   <a:outerShdw dist="35921" dir="2700000" algn="ctr" rotWithShape="0">
                     <a:schemeClr val="bg2"/>
@@ -657,14 +657,14 @@
           <a:effectLst/>
           <a:extLst>
             <a:ext uri="{909E8E84-426E-40DD-AFC4-6F175D3DCCD1}">
-              <a14:hiddenFill xmlns:a14="http://schemas.microsoft.com/office/drawing/2010/main" xmlns="">
+              <a14:hiddenFill xmlns="" xmlns:a14="http://schemas.microsoft.com/office/drawing/2010/main">
                 <a:solidFill>
                   <a:schemeClr val="accent1"/>
                 </a:solidFill>
               </a14:hiddenFill>
             </a:ext>
             <a:ext uri="{91240B29-F687-4F45-9708-019B960494DF}">
-              <a14:hiddenLine xmlns:a14="http://schemas.microsoft.com/office/drawing/2010/main" xmlns="" w="9525">
+              <a14:hiddenLine xmlns="" xmlns:a14="http://schemas.microsoft.com/office/drawing/2010/main" w="9525">
                 <a:solidFill>
                   <a:schemeClr val="tx1"/>
                 </a:solidFill>
@@ -674,7 +674,7 @@
               </a14:hiddenLine>
             </a:ext>
             <a:ext uri="{AF507438-7753-43E0-B8FC-AC1667EBCBE1}">
-              <a14:hiddenEffects xmlns:a14="http://schemas.microsoft.com/office/drawing/2010/main" xmlns="">
+              <a14:hiddenEffects xmlns="" xmlns:a14="http://schemas.microsoft.com/office/drawing/2010/main">
                 <a:effectLst>
                   <a:outerShdw dist="35921" dir="2700000" algn="ctr" rotWithShape="0">
                     <a:schemeClr val="bg2"/>
@@ -727,14 +727,14 @@
           <a:effectLst/>
           <a:extLst>
             <a:ext uri="{909E8E84-426E-40DD-AFC4-6F175D3DCCD1}">
-              <a14:hiddenFill xmlns:a14="http://schemas.microsoft.com/office/drawing/2010/main" xmlns="">
+              <a14:hiddenFill xmlns="" xmlns:a14="http://schemas.microsoft.com/office/drawing/2010/main">
                 <a:solidFill>
                   <a:schemeClr val="accent1"/>
                 </a:solidFill>
               </a14:hiddenFill>
             </a:ext>
             <a:ext uri="{91240B29-F687-4F45-9708-019B960494DF}">
-              <a14:hiddenLine xmlns:a14="http://schemas.microsoft.com/office/drawing/2010/main" xmlns="" w="9525">
+              <a14:hiddenLine xmlns="" xmlns:a14="http://schemas.microsoft.com/office/drawing/2010/main" w="9525">
                 <a:solidFill>
                   <a:schemeClr val="tx1"/>
                 </a:solidFill>
@@ -744,7 +744,7 @@
               </a14:hiddenLine>
             </a:ext>
             <a:ext uri="{AF507438-7753-43E0-B8FC-AC1667EBCBE1}">
-              <a14:hiddenEffects xmlns:a14="http://schemas.microsoft.com/office/drawing/2010/main" xmlns="">
+              <a14:hiddenEffects xmlns="" xmlns:a14="http://schemas.microsoft.com/office/drawing/2010/main">
                 <a:effectLst>
                   <a:outerShdw dist="35921" dir="2700000" algn="ctr" rotWithShape="0">
                     <a:schemeClr val="bg2"/>
@@ -780,7 +780,7 @@
     </p:spTree>
     <p:extLst>
       <p:ext uri="{BB962C8B-B14F-4D97-AF65-F5344CB8AC3E}">
-        <p14:creationId xmlns:p14="http://schemas.microsoft.com/office/powerpoint/2010/main" xmlns="" val="3354467039"/>
+        <p14:creationId xmlns="" xmlns:p14="http://schemas.microsoft.com/office/powerpoint/2010/main" val="3354467039"/>
       </p:ext>
     </p:extLst>
   </p:cSld>
@@ -3169,7 +3169,7 @@
     </p:spTree>
     <p:extLst>
       <p:ext uri="{BB962C8B-B14F-4D97-AF65-F5344CB8AC3E}">
-        <p14:creationId xmlns:p14="http://schemas.microsoft.com/office/powerpoint/2010/main" xmlns="" val="483073219"/>
+        <p14:creationId xmlns="" xmlns:p14="http://schemas.microsoft.com/office/powerpoint/2010/main" val="483073219"/>
       </p:ext>
     </p:extLst>
   </p:cSld>
@@ -4551,7 +4551,18 @@
               <a:defRPr/>
             </a:pPr>
             <a:r>
-              <a:rPr lang="ko-KR" altLang="en-US" sz="1200" kern="1200" baseline="0" dirty="0" err="1" smtClean="0">
+              <a:rPr lang="ko-KR" altLang="en-US" sz="1200" kern="1200" dirty="0" smtClean="0">
+                <a:solidFill>
+                  <a:schemeClr val="tx1"/>
+                </a:solidFill>
+                <a:latin typeface="Arial" charset="0"/>
+                <a:ea typeface="+mn-ea"/>
+                <a:cs typeface="+mn-cs"/>
+              </a:rPr>
+              <a:t>앞에서 예로든 </a:t>
+            </a:r>
+            <a:r>
+              <a:rPr lang="ko-KR" altLang="en-US" sz="1200" kern="1200" dirty="0" err="1" smtClean="0">
                 <a:solidFill>
                   <a:schemeClr val="tx1"/>
                 </a:solidFill>
@@ -4570,7 +4581,29 @@
                 <a:ea typeface="+mn-ea"/>
                 <a:cs typeface="+mn-cs"/>
               </a:rPr>
-              <a:t> 카메라를 </a:t>
+              <a:t> 카메라를 웹 캠으로 사용할 때</a:t>
+            </a:r>
+            <a:r>
+              <a:rPr lang="en-US" altLang="ko-KR" sz="1200" kern="1200" baseline="0" smtClean="0">
+                <a:solidFill>
+                  <a:schemeClr val="tx1"/>
+                </a:solidFill>
+                <a:latin typeface="Arial" charset="0"/>
+                <a:ea typeface="+mn-ea"/>
+                <a:cs typeface="+mn-cs"/>
+              </a:rPr>
+              <a:t>, TCP/IP</a:t>
+            </a:r>
+            <a:r>
+              <a:rPr lang="ko-KR" altLang="en-US" sz="1200" kern="1200" baseline="0" dirty="0" smtClean="0">
+                <a:solidFill>
+                  <a:schemeClr val="tx1"/>
+                </a:solidFill>
+                <a:latin typeface="Arial" charset="0"/>
+                <a:ea typeface="+mn-ea"/>
+                <a:cs typeface="+mn-cs"/>
+              </a:rPr>
+              <a:t>로 연결해서 사용하려면 새로운 프로그램을 설치해야 되는 문제가 있습니다</a:t>
             </a:r>
             <a:r>
               <a:rPr lang="en-US" altLang="ko-KR" sz="1200" kern="1200" baseline="0" dirty="0" smtClean="0">
@@ -4581,7 +4614,7 @@
                 <a:ea typeface="+mn-ea"/>
                 <a:cs typeface="+mn-cs"/>
               </a:rPr>
-              <a:t>TCP/IP</a:t>
+              <a:t>. </a:t>
             </a:r>
             <a:r>
               <a:rPr lang="ko-KR" altLang="en-US" sz="1200" kern="1200" baseline="0" dirty="0" smtClean="0">
@@ -4592,28 +4625,6 @@
                 <a:ea typeface="+mn-ea"/>
                 <a:cs typeface="+mn-cs"/>
               </a:rPr>
-              <a:t>로 연결해서 사용하려면 새로운 프로그램을 설치해야 되는 문제가 있습니다</a:t>
-            </a:r>
-            <a:r>
-              <a:rPr lang="en-US" altLang="ko-KR" sz="1200" kern="1200" baseline="0" dirty="0" smtClean="0">
-                <a:solidFill>
-                  <a:schemeClr val="tx1"/>
-                </a:solidFill>
-                <a:latin typeface="Arial" charset="0"/>
-                <a:ea typeface="+mn-ea"/>
-                <a:cs typeface="+mn-cs"/>
-              </a:rPr>
-              <a:t>. </a:t>
-            </a:r>
-            <a:r>
-              <a:rPr lang="ko-KR" altLang="en-US" sz="1200" kern="1200" baseline="0" dirty="0" smtClean="0">
-                <a:solidFill>
-                  <a:schemeClr val="tx1"/>
-                </a:solidFill>
-                <a:latin typeface="Arial" charset="0"/>
-                <a:ea typeface="+mn-ea"/>
-                <a:cs typeface="+mn-cs"/>
-              </a:rPr>
               <a:t>하지만 </a:t>
             </a:r>
             <a:r>
@@ -4636,40 +4647,7 @@
                 <a:ea typeface="+mn-ea"/>
                 <a:cs typeface="+mn-cs"/>
               </a:rPr>
-              <a:t>를 이용하게 되면 앞에서 예로든 </a:t>
-            </a:r>
-            <a:r>
-              <a:rPr lang="ko-KR" altLang="en-US" sz="1200" kern="1200" dirty="0" err="1" smtClean="0">
-                <a:solidFill>
-                  <a:schemeClr val="tx1"/>
-                </a:solidFill>
-                <a:latin typeface="Arial" charset="0"/>
-                <a:ea typeface="+mn-ea"/>
-                <a:cs typeface="+mn-cs"/>
-              </a:rPr>
-              <a:t>스마트폰</a:t>
-            </a:r>
-            <a:r>
-              <a:rPr lang="ko-KR" altLang="en-US" sz="1200" kern="1200" baseline="0" dirty="0" smtClean="0">
-                <a:solidFill>
-                  <a:schemeClr val="tx1"/>
-                </a:solidFill>
-                <a:latin typeface="Arial" charset="0"/>
-                <a:ea typeface="+mn-ea"/>
-                <a:cs typeface="+mn-cs"/>
-              </a:rPr>
-              <a:t> 카메라를 웹 캠으로 사용할 때</a:t>
-            </a:r>
-            <a:r>
-              <a:rPr lang="en-US" altLang="ko-KR" sz="1200" kern="1200" baseline="0" dirty="0" smtClean="0">
-                <a:solidFill>
-                  <a:schemeClr val="tx1"/>
-                </a:solidFill>
-                <a:latin typeface="Arial" charset="0"/>
-                <a:ea typeface="+mn-ea"/>
-                <a:cs typeface="+mn-cs"/>
-              </a:rPr>
-              <a:t>, </a:t>
+              <a:t>를 이용하게 되면 </a:t>
             </a:r>
             <a:r>
               <a:rPr lang="ko-KR" altLang="en-US" sz="1200" kern="1200" baseline="0" dirty="0" smtClean="0">
@@ -5464,7 +5442,7 @@
           </a:xfrm>
           <a:extLst>
             <a:ext uri="{AF507438-7753-43E0-B8FC-AC1667EBCBE1}">
-              <a14:hiddenEffects xmlns:a14="http://schemas.microsoft.com/office/drawing/2010/main" xmlns="">
+              <a14:hiddenEffects xmlns="" xmlns:a14="http://schemas.microsoft.com/office/drawing/2010/main">
                 <a:effectLst>
                   <a:outerShdw dist="17961" dir="2700000" algn="ctr" rotWithShape="0">
                     <a:schemeClr val="bg1"/>
@@ -5508,7 +5486,7 @@
           </a:xfrm>
           <a:extLst>
             <a:ext uri="{AF507438-7753-43E0-B8FC-AC1667EBCBE1}">
-              <a14:hiddenEffects xmlns:a14="http://schemas.microsoft.com/office/drawing/2010/main" xmlns="">
+              <a14:hiddenEffects xmlns="" xmlns:a14="http://schemas.microsoft.com/office/drawing/2010/main">
                 <a:effectLst>
                   <a:outerShdw dist="17961" dir="2700000" algn="ctr" rotWithShape="0">
                     <a:schemeClr val="bg1"/>
@@ -5644,7 +5622,7 @@
     </p:spTree>
     <p:extLst>
       <p:ext uri="{BB962C8B-B14F-4D97-AF65-F5344CB8AC3E}">
-        <p14:creationId xmlns:p14="http://schemas.microsoft.com/office/powerpoint/2010/main" xmlns="" val="3191849363"/>
+        <p14:creationId xmlns="" xmlns:p14="http://schemas.microsoft.com/office/powerpoint/2010/main" val="3191849363"/>
       </p:ext>
     </p:extLst>
   </p:cSld>
@@ -5759,7 +5737,7 @@
     </p:spTree>
     <p:extLst>
       <p:ext uri="{BB962C8B-B14F-4D97-AF65-F5344CB8AC3E}">
-        <p14:creationId xmlns:p14="http://schemas.microsoft.com/office/powerpoint/2010/main" xmlns="" val="1524186507"/>
+        <p14:creationId xmlns="" xmlns:p14="http://schemas.microsoft.com/office/powerpoint/2010/main" val="1524186507"/>
       </p:ext>
     </p:extLst>
   </p:cSld>
@@ -5864,7 +5842,7 @@
     </p:spTree>
     <p:extLst>
       <p:ext uri="{BB962C8B-B14F-4D97-AF65-F5344CB8AC3E}">
-        <p14:creationId xmlns:p14="http://schemas.microsoft.com/office/powerpoint/2010/main" xmlns="" val="3261712152"/>
+        <p14:creationId xmlns="" xmlns:p14="http://schemas.microsoft.com/office/powerpoint/2010/main" val="3261712152"/>
       </p:ext>
     </p:extLst>
   </p:cSld>
@@ -5991,7 +5969,7 @@
     </p:spTree>
     <p:extLst>
       <p:ext uri="{BB962C8B-B14F-4D97-AF65-F5344CB8AC3E}">
-        <p14:creationId xmlns:p14="http://schemas.microsoft.com/office/powerpoint/2010/main" xmlns="" val="346190723"/>
+        <p14:creationId xmlns="" xmlns:p14="http://schemas.microsoft.com/office/powerpoint/2010/main" val="346190723"/>
       </p:ext>
     </p:extLst>
   </p:cSld>
@@ -6214,7 +6192,7 @@
     </p:spTree>
     <p:extLst>
       <p:ext uri="{BB962C8B-B14F-4D97-AF65-F5344CB8AC3E}">
-        <p14:creationId xmlns:p14="http://schemas.microsoft.com/office/powerpoint/2010/main" xmlns="" val="4255224362"/>
+        <p14:creationId xmlns="" xmlns:p14="http://schemas.microsoft.com/office/powerpoint/2010/main" val="4255224362"/>
       </p:ext>
     </p:extLst>
   </p:cSld>
@@ -6576,7 +6554,7 @@
     </p:spTree>
     <p:extLst>
       <p:ext uri="{BB962C8B-B14F-4D97-AF65-F5344CB8AC3E}">
-        <p14:creationId xmlns:p14="http://schemas.microsoft.com/office/powerpoint/2010/main" xmlns="" val="234523478"/>
+        <p14:creationId xmlns="" xmlns:p14="http://schemas.microsoft.com/office/powerpoint/2010/main" val="234523478"/>
       </p:ext>
     </p:extLst>
   </p:cSld>
@@ -6629,7 +6607,7 @@
     </p:spTree>
     <p:extLst>
       <p:ext uri="{BB962C8B-B14F-4D97-AF65-F5344CB8AC3E}">
-        <p14:creationId xmlns:p14="http://schemas.microsoft.com/office/powerpoint/2010/main" xmlns="" val="4170126094"/>
+        <p14:creationId xmlns="" xmlns:p14="http://schemas.microsoft.com/office/powerpoint/2010/main" val="4170126094"/>
       </p:ext>
     </p:extLst>
   </p:cSld>
@@ -6659,7 +6637,7 @@
     </p:spTree>
     <p:extLst>
       <p:ext uri="{BB962C8B-B14F-4D97-AF65-F5344CB8AC3E}">
-        <p14:creationId xmlns:p14="http://schemas.microsoft.com/office/powerpoint/2010/main" xmlns="" val="3131819388"/>
+        <p14:creationId xmlns="" xmlns:p14="http://schemas.microsoft.com/office/powerpoint/2010/main" val="3131819388"/>
       </p:ext>
     </p:extLst>
   </p:cSld>
@@ -6871,7 +6849,7 @@
     </p:spTree>
     <p:extLst>
       <p:ext uri="{BB962C8B-B14F-4D97-AF65-F5344CB8AC3E}">
-        <p14:creationId xmlns:p14="http://schemas.microsoft.com/office/powerpoint/2010/main" xmlns="" val="1266256783"/>
+        <p14:creationId xmlns="" xmlns:p14="http://schemas.microsoft.com/office/powerpoint/2010/main" val="1266256783"/>
       </p:ext>
     </p:extLst>
   </p:cSld>
@@ -7063,7 +7041,7 @@
     </p:spTree>
     <p:extLst>
       <p:ext uri="{BB962C8B-B14F-4D97-AF65-F5344CB8AC3E}">
-        <p14:creationId xmlns:p14="http://schemas.microsoft.com/office/powerpoint/2010/main" xmlns="" val="511494401"/>
+        <p14:creationId xmlns="" xmlns:p14="http://schemas.microsoft.com/office/powerpoint/2010/main" val="511494401"/>
       </p:ext>
     </p:extLst>
   </p:cSld>
@@ -7127,14 +7105,14 @@
           <a:effectLst/>
           <a:extLst>
             <a:ext uri="{909E8E84-426E-40DD-AFC4-6F175D3DCCD1}">
-              <a14:hiddenFill xmlns:a14="http://schemas.microsoft.com/office/drawing/2010/main" xmlns="">
+              <a14:hiddenFill xmlns="" xmlns:a14="http://schemas.microsoft.com/office/drawing/2010/main">
                 <a:solidFill>
                   <a:schemeClr val="accent1"/>
                 </a:solidFill>
               </a14:hiddenFill>
             </a:ext>
             <a:ext uri="{91240B29-F687-4F45-9708-019B960494DF}">
-              <a14:hiddenLine xmlns:a14="http://schemas.microsoft.com/office/drawing/2010/main" xmlns="" w="9525">
+              <a14:hiddenLine xmlns="" xmlns:a14="http://schemas.microsoft.com/office/drawing/2010/main" w="9525">
                 <a:solidFill>
                   <a:schemeClr val="tx1"/>
                 </a:solidFill>
@@ -7144,7 +7122,7 @@
               </a14:hiddenLine>
             </a:ext>
             <a:ext uri="{AF507438-7753-43E0-B8FC-AC1667EBCBE1}">
-              <a14:hiddenEffects xmlns:a14="http://schemas.microsoft.com/office/drawing/2010/main" xmlns="">
+              <a14:hiddenEffects xmlns="" xmlns:a14="http://schemas.microsoft.com/office/drawing/2010/main">
                 <a:effectLst>
                   <a:outerShdw dist="35921" dir="2700000" algn="ctr" rotWithShape="0">
                     <a:schemeClr val="bg2"/>
@@ -7196,14 +7174,14 @@
           <a:effectLst/>
           <a:extLst>
             <a:ext uri="{909E8E84-426E-40DD-AFC4-6F175D3DCCD1}">
-              <a14:hiddenFill xmlns:a14="http://schemas.microsoft.com/office/drawing/2010/main" xmlns="">
+              <a14:hiddenFill xmlns="" xmlns:a14="http://schemas.microsoft.com/office/drawing/2010/main">
                 <a:solidFill>
                   <a:schemeClr val="accent1"/>
                 </a:solidFill>
               </a14:hiddenFill>
             </a:ext>
             <a:ext uri="{91240B29-F687-4F45-9708-019B960494DF}">
-              <a14:hiddenLine xmlns:a14="http://schemas.microsoft.com/office/drawing/2010/main" xmlns="" w="9525">
+              <a14:hiddenLine xmlns="" xmlns:a14="http://schemas.microsoft.com/office/drawing/2010/main" w="9525">
                 <a:solidFill>
                   <a:schemeClr val="tx1"/>
                 </a:solidFill>
@@ -7213,7 +7191,7 @@
               </a14:hiddenLine>
             </a:ext>
             <a:ext uri="{AF507438-7753-43E0-B8FC-AC1667EBCBE1}">
-              <a14:hiddenEffects xmlns:a14="http://schemas.microsoft.com/office/drawing/2010/main" xmlns="">
+              <a14:hiddenEffects xmlns="" xmlns:a14="http://schemas.microsoft.com/office/drawing/2010/main">
                 <a:effectLst>
                   <a:outerShdw dist="35921" dir="2700000" algn="ctr" rotWithShape="0">
                     <a:schemeClr val="bg2"/>
@@ -7679,7 +7657,7 @@
           <p:nvPr>
             <p:extLst>
               <p:ext uri="{D42A27DB-BD31-4B8C-83A1-F6EECF244321}">
-                <p14:modId xmlns:p14="http://schemas.microsoft.com/office/powerpoint/2010/main" xmlns="" val="3019215210"/>
+                <p14:modId xmlns="" xmlns:p14="http://schemas.microsoft.com/office/powerpoint/2010/main" val="3019215210"/>
               </p:ext>
             </p:extLst>
           </p:nvPr>
@@ -8698,14 +8676,14 @@
           <a:effectLst/>
           <a:extLst>
             <a:ext uri="{909E8E84-426E-40DD-AFC4-6F175D3DCCD1}">
-              <a14:hiddenFill xmlns:a14="http://schemas.microsoft.com/office/drawing/2010/main" xmlns="">
+              <a14:hiddenFill xmlns="" xmlns:a14="http://schemas.microsoft.com/office/drawing/2010/main">
                 <a:solidFill>
                   <a:schemeClr val="accent1"/>
                 </a:solidFill>
               </a14:hiddenFill>
             </a:ext>
             <a:ext uri="{91240B29-F687-4F45-9708-019B960494DF}">
-              <a14:hiddenLine xmlns:a14="http://schemas.microsoft.com/office/drawing/2010/main" xmlns="" w="9525">
+              <a14:hiddenLine xmlns="" xmlns:a14="http://schemas.microsoft.com/office/drawing/2010/main" w="9525">
                 <a:solidFill>
                   <a:schemeClr val="tx1"/>
                 </a:solidFill>
@@ -8715,7 +8693,7 @@
               </a14:hiddenLine>
             </a:ext>
             <a:ext uri="{AF507438-7753-43E0-B8FC-AC1667EBCBE1}">
-              <a14:hiddenEffects xmlns:a14="http://schemas.microsoft.com/office/drawing/2010/main" xmlns="">
+              <a14:hiddenEffects xmlns="" xmlns:a14="http://schemas.microsoft.com/office/drawing/2010/main">
                 <a:effectLst>
                   <a:outerShdw dist="35921" dir="2700000" algn="ctr" rotWithShape="0">
                     <a:schemeClr val="bg2"/>
@@ -8856,14 +8834,14 @@
           <a:effectLst/>
           <a:extLst>
             <a:ext uri="{909E8E84-426E-40DD-AFC4-6F175D3DCCD1}">
-              <a14:hiddenFill xmlns:a14="http://schemas.microsoft.com/office/drawing/2010/main" xmlns="">
+              <a14:hiddenFill xmlns="" xmlns:a14="http://schemas.microsoft.com/office/drawing/2010/main">
                 <a:solidFill>
                   <a:schemeClr val="accent1"/>
                 </a:solidFill>
               </a14:hiddenFill>
             </a:ext>
             <a:ext uri="{91240B29-F687-4F45-9708-019B960494DF}">
-              <a14:hiddenLine xmlns:a14="http://schemas.microsoft.com/office/drawing/2010/main" xmlns="" w="9525">
+              <a14:hiddenLine xmlns="" xmlns:a14="http://schemas.microsoft.com/office/drawing/2010/main" w="9525">
                 <a:solidFill>
                   <a:schemeClr val="tx1"/>
                 </a:solidFill>
@@ -8873,7 +8851,7 @@
               </a14:hiddenLine>
             </a:ext>
             <a:ext uri="{AF507438-7753-43E0-B8FC-AC1667EBCBE1}">
-              <a14:hiddenEffects xmlns:a14="http://schemas.microsoft.com/office/drawing/2010/main" xmlns="">
+              <a14:hiddenEffects xmlns="" xmlns:a14="http://schemas.microsoft.com/office/drawing/2010/main">
                 <a:effectLst>
                   <a:outerShdw dist="35921" dir="2700000" algn="ctr" rotWithShape="0">
                     <a:schemeClr val="bg2"/>
@@ -9103,7 +9081,7 @@
     </p:spTree>
     <p:extLst>
       <p:ext uri="{BB962C8B-B14F-4D97-AF65-F5344CB8AC3E}">
-        <p14:creationId xmlns:p14="http://schemas.microsoft.com/office/powerpoint/2010/main" xmlns="" val="2718990012"/>
+        <p14:creationId xmlns="" xmlns:p14="http://schemas.microsoft.com/office/powerpoint/2010/main" val="2718990012"/>
       </p:ext>
     </p:extLst>
   </p:cSld>
@@ -9586,7 +9564,7 @@
           <a:effectLst/>
           <a:extLst>
             <a:ext uri="{AF507438-7753-43E0-B8FC-AC1667EBCBE1}">
-              <a14:hiddenEffects xmlns:a14="http://schemas.microsoft.com/office/drawing/2010/main" xmlns="">
+              <a14:hiddenEffects xmlns="" xmlns:a14="http://schemas.microsoft.com/office/drawing/2010/main">
                 <a:effectLst>
                   <a:outerShdw dist="35921" dir="2700000" algn="ctr" rotWithShape="0">
                     <a:schemeClr val="bg2"/>
@@ -10641,7 +10619,7 @@
           <a:effectLst/>
           <a:extLst>
             <a:ext uri="{91240B29-F687-4F45-9708-019B960494DF}">
-              <a14:hiddenLine xmlns:a14="http://schemas.microsoft.com/office/drawing/2010/main" xmlns="" w="9525" cap="flat" cmpd="sng" algn="ctr">
+              <a14:hiddenLine xmlns="" xmlns:a14="http://schemas.microsoft.com/office/drawing/2010/main" w="9525" cap="flat" cmpd="sng" algn="ctr">
                 <a:solidFill>
                   <a:schemeClr val="tx1"/>
                 </a:solidFill>
@@ -10652,7 +10630,7 @@
               </a14:hiddenLine>
             </a:ext>
             <a:ext uri="{AF507438-7753-43E0-B8FC-AC1667EBCBE1}">
-              <a14:hiddenEffects xmlns:a14="http://schemas.microsoft.com/office/drawing/2010/main" xmlns="">
+              <a14:hiddenEffects xmlns="" xmlns:a14="http://schemas.microsoft.com/office/drawing/2010/main">
                 <a:effectLst>
                   <a:outerShdw dist="35921" dir="2700000" algn="ctr" rotWithShape="0">
                     <a:schemeClr val="bg2"/>
@@ -10706,7 +10684,7 @@
           <a:effectLst/>
           <a:extLst>
             <a:ext uri="{91240B29-F687-4F45-9708-019B960494DF}">
-              <a14:hiddenLine xmlns:a14="http://schemas.microsoft.com/office/drawing/2010/main" xmlns="" w="9525" cap="flat" cmpd="sng" algn="ctr">
+              <a14:hiddenLine xmlns="" xmlns:a14="http://schemas.microsoft.com/office/drawing/2010/main" w="9525" cap="flat" cmpd="sng" algn="ctr">
                 <a:solidFill>
                   <a:schemeClr val="tx1"/>
                 </a:solidFill>
@@ -10717,7 +10695,7 @@
               </a14:hiddenLine>
             </a:ext>
             <a:ext uri="{AF507438-7753-43E0-B8FC-AC1667EBCBE1}">
-              <a14:hiddenEffects xmlns:a14="http://schemas.microsoft.com/office/drawing/2010/main" xmlns="">
+              <a14:hiddenEffects xmlns="" xmlns:a14="http://schemas.microsoft.com/office/drawing/2010/main">
                 <a:effectLst>
                   <a:outerShdw dist="35921" dir="2700000" algn="ctr" rotWithShape="0">
                     <a:schemeClr val="bg2"/>
@@ -10771,7 +10749,7 @@
           <a:effectLst/>
           <a:extLst>
             <a:ext uri="{91240B29-F687-4F45-9708-019B960494DF}">
-              <a14:hiddenLine xmlns:a14="http://schemas.microsoft.com/office/drawing/2010/main" xmlns="" w="9525" cap="flat" cmpd="sng" algn="ctr">
+              <a14:hiddenLine xmlns="" xmlns:a14="http://schemas.microsoft.com/office/drawing/2010/main" w="9525" cap="flat" cmpd="sng" algn="ctr">
                 <a:solidFill>
                   <a:schemeClr val="tx1"/>
                 </a:solidFill>
@@ -10782,7 +10760,7 @@
               </a14:hiddenLine>
             </a:ext>
             <a:ext uri="{AF507438-7753-43E0-B8FC-AC1667EBCBE1}">
-              <a14:hiddenEffects xmlns:a14="http://schemas.microsoft.com/office/drawing/2010/main" xmlns="">
+              <a14:hiddenEffects xmlns="" xmlns:a14="http://schemas.microsoft.com/office/drawing/2010/main">
                 <a:effectLst>
                   <a:outerShdw dist="35921" dir="2700000" algn="ctr" rotWithShape="0">
                     <a:schemeClr val="bg2"/>
@@ -10835,7 +10813,7 @@
           <a:effectLst/>
           <a:extLst>
             <a:ext uri="{91240B29-F687-4F45-9708-019B960494DF}">
-              <a14:hiddenLine xmlns:a14="http://schemas.microsoft.com/office/drawing/2010/main" xmlns="" w="9525" cap="flat" cmpd="sng" algn="ctr">
+              <a14:hiddenLine xmlns="" xmlns:a14="http://schemas.microsoft.com/office/drawing/2010/main" w="9525" cap="flat" cmpd="sng" algn="ctr">
                 <a:solidFill>
                   <a:schemeClr val="tx1"/>
                 </a:solidFill>
@@ -10846,7 +10824,7 @@
               </a14:hiddenLine>
             </a:ext>
             <a:ext uri="{AF507438-7753-43E0-B8FC-AC1667EBCBE1}">
-              <a14:hiddenEffects xmlns:a14="http://schemas.microsoft.com/office/drawing/2010/main" xmlns="">
+              <a14:hiddenEffects xmlns="" xmlns:a14="http://schemas.microsoft.com/office/drawing/2010/main">
                 <a:effectLst>
                   <a:outerShdw dist="35921" dir="2700000" algn="ctr" rotWithShape="0">
                     <a:schemeClr val="bg2"/>
@@ -10898,7 +10876,7 @@
           <a:effectLst/>
           <a:extLst>
             <a:ext uri="{91240B29-F687-4F45-9708-019B960494DF}">
-              <a14:hiddenLine xmlns:a14="http://schemas.microsoft.com/office/drawing/2010/main" xmlns="" w="9525" cap="flat" cmpd="sng" algn="ctr">
+              <a14:hiddenLine xmlns="" xmlns:a14="http://schemas.microsoft.com/office/drawing/2010/main" w="9525" cap="flat" cmpd="sng" algn="ctr">
                 <a:solidFill>
                   <a:schemeClr val="tx1"/>
                 </a:solidFill>
@@ -10909,7 +10887,7 @@
               </a14:hiddenLine>
             </a:ext>
             <a:ext uri="{AF507438-7753-43E0-B8FC-AC1667EBCBE1}">
-              <a14:hiddenEffects xmlns:a14="http://schemas.microsoft.com/office/drawing/2010/main" xmlns="">
+              <a14:hiddenEffects xmlns="" xmlns:a14="http://schemas.microsoft.com/office/drawing/2010/main">
                 <a:effectLst>
                   <a:outerShdw dist="35921" dir="2700000" algn="ctr" rotWithShape="0">
                     <a:schemeClr val="bg2"/>
@@ -10923,7 +10901,7 @@
     </p:spTree>
     <p:extLst>
       <p:ext uri="{BB962C8B-B14F-4D97-AF65-F5344CB8AC3E}">
-        <p14:creationId xmlns:p14="http://schemas.microsoft.com/office/powerpoint/2010/main" xmlns="" val="2718990012"/>
+        <p14:creationId xmlns="" xmlns:p14="http://schemas.microsoft.com/office/powerpoint/2010/main" val="2718990012"/>
       </p:ext>
     </p:extLst>
   </p:cSld>
@@ -11188,7 +11166,7 @@
     </p:spTree>
     <p:extLst>
       <p:ext uri="{BB962C8B-B14F-4D97-AF65-F5344CB8AC3E}">
-        <p14:creationId xmlns:p14="http://schemas.microsoft.com/office/powerpoint/2010/main" xmlns="" val="2718990012"/>
+        <p14:creationId xmlns="" xmlns:p14="http://schemas.microsoft.com/office/powerpoint/2010/main" val="2718990012"/>
       </p:ext>
     </p:extLst>
   </p:cSld>
@@ -11457,7 +11435,7 @@
           <a:effectLst/>
           <a:extLst>
             <a:ext uri="{AF507438-7753-43E0-B8FC-AC1667EBCBE1}">
-              <a14:hiddenEffects xmlns:a14="http://schemas.microsoft.com/office/drawing/2010/main" xmlns="">
+              <a14:hiddenEffects xmlns="" xmlns:a14="http://schemas.microsoft.com/office/drawing/2010/main">
                 <a:effectLst>
                   <a:outerShdw dist="35921" dir="2700000" algn="ctr" rotWithShape="0">
                     <a:schemeClr val="bg2"/>
@@ -11611,7 +11589,7 @@
           <a:effectLst/>
           <a:extLst>
             <a:ext uri="{AF507438-7753-43E0-B8FC-AC1667EBCBE1}">
-              <a14:hiddenEffects xmlns:a14="http://schemas.microsoft.com/office/drawing/2010/main" xmlns="">
+              <a14:hiddenEffects xmlns="" xmlns:a14="http://schemas.microsoft.com/office/drawing/2010/main">
                 <a:effectLst>
                   <a:outerShdw dist="35921" dir="2700000" algn="ctr" rotWithShape="0">
                     <a:schemeClr val="bg2"/>
@@ -11715,14 +11693,14 @@
           <a:effectLst/>
           <a:extLst>
             <a:ext uri="{909E8E84-426E-40DD-AFC4-6F175D3DCCD1}">
-              <a14:hiddenFill xmlns:a14="http://schemas.microsoft.com/office/drawing/2010/main" xmlns="">
+              <a14:hiddenFill xmlns="" xmlns:a14="http://schemas.microsoft.com/office/drawing/2010/main">
                 <a:solidFill>
                   <a:schemeClr val="accent1"/>
                 </a:solidFill>
               </a14:hiddenFill>
             </a:ext>
             <a:ext uri="{91240B29-F687-4F45-9708-019B960494DF}">
-              <a14:hiddenLine xmlns:a14="http://schemas.microsoft.com/office/drawing/2010/main" xmlns="" w="9525">
+              <a14:hiddenLine xmlns="" xmlns:a14="http://schemas.microsoft.com/office/drawing/2010/main" w="9525">
                 <a:solidFill>
                   <a:schemeClr val="tx1"/>
                 </a:solidFill>
@@ -11732,7 +11710,7 @@
               </a14:hiddenLine>
             </a:ext>
             <a:ext uri="{AF507438-7753-43E0-B8FC-AC1667EBCBE1}">
-              <a14:hiddenEffects xmlns:a14="http://schemas.microsoft.com/office/drawing/2010/main" xmlns="">
+              <a14:hiddenEffects xmlns="" xmlns:a14="http://schemas.microsoft.com/office/drawing/2010/main">
                 <a:effectLst>
                   <a:outerShdw dist="35921" dir="2700000" algn="ctr" rotWithShape="0">
                     <a:schemeClr val="bg2"/>
@@ -11870,14 +11848,14 @@
           <a:effectLst/>
           <a:extLst>
             <a:ext uri="{909E8E84-426E-40DD-AFC4-6F175D3DCCD1}">
-              <a14:hiddenFill xmlns:a14="http://schemas.microsoft.com/office/drawing/2010/main" xmlns="">
+              <a14:hiddenFill xmlns="" xmlns:a14="http://schemas.microsoft.com/office/drawing/2010/main">
                 <a:solidFill>
                   <a:schemeClr val="accent1"/>
                 </a:solidFill>
               </a14:hiddenFill>
             </a:ext>
             <a:ext uri="{91240B29-F687-4F45-9708-019B960494DF}">
-              <a14:hiddenLine xmlns:a14="http://schemas.microsoft.com/office/drawing/2010/main" xmlns="" w="9525">
+              <a14:hiddenLine xmlns="" xmlns:a14="http://schemas.microsoft.com/office/drawing/2010/main" w="9525">
                 <a:solidFill>
                   <a:schemeClr val="tx1"/>
                 </a:solidFill>
@@ -11887,7 +11865,7 @@
               </a14:hiddenLine>
             </a:ext>
             <a:ext uri="{AF507438-7753-43E0-B8FC-AC1667EBCBE1}">
-              <a14:hiddenEffects xmlns:a14="http://schemas.microsoft.com/office/drawing/2010/main" xmlns="">
+              <a14:hiddenEffects xmlns="" xmlns:a14="http://schemas.microsoft.com/office/drawing/2010/main">
                 <a:effectLst>
                   <a:outerShdw dist="35921" dir="2700000" algn="ctr" rotWithShape="0">
                     <a:schemeClr val="bg2"/>
@@ -11983,7 +11961,7 @@
     </p:spTree>
     <p:extLst>
       <p:ext uri="{BB962C8B-B14F-4D97-AF65-F5344CB8AC3E}">
-        <p14:creationId xmlns:p14="http://schemas.microsoft.com/office/powerpoint/2010/main" xmlns="" val="2718990012"/>
+        <p14:creationId xmlns="" xmlns:p14="http://schemas.microsoft.com/office/powerpoint/2010/main" val="2718990012"/>
       </p:ext>
     </p:extLst>
   </p:cSld>
@@ -12216,7 +12194,7 @@
     </p:spTree>
     <p:extLst>
       <p:ext uri="{BB962C8B-B14F-4D97-AF65-F5344CB8AC3E}">
-        <p14:creationId xmlns:p14="http://schemas.microsoft.com/office/powerpoint/2010/main" xmlns="" val="2718990012"/>
+        <p14:creationId xmlns="" xmlns:p14="http://schemas.microsoft.com/office/powerpoint/2010/main" val="2718990012"/>
       </p:ext>
     </p:extLst>
   </p:cSld>
@@ -12297,7 +12275,7 @@
           <p:nvPr>
             <p:extLst>
               <p:ext uri="{D42A27DB-BD31-4B8C-83A1-F6EECF244321}">
-                <p14:modId xmlns:p14="http://schemas.microsoft.com/office/powerpoint/2010/main" xmlns="" val="864912804"/>
+                <p14:modId xmlns="" xmlns:p14="http://schemas.microsoft.com/office/powerpoint/2010/main" val="864912804"/>
               </p:ext>
             </p:extLst>
           </p:nvPr>
@@ -12417,7 +12395,7 @@
     </p:spTree>
     <p:extLst>
       <p:ext uri="{BB962C8B-B14F-4D97-AF65-F5344CB8AC3E}">
-        <p14:creationId xmlns:p14="http://schemas.microsoft.com/office/powerpoint/2010/main" xmlns="" val="3723977454"/>
+        <p14:creationId xmlns="" xmlns:p14="http://schemas.microsoft.com/office/powerpoint/2010/main" val="3723977454"/>
       </p:ext>
     </p:extLst>
   </p:cSld>
@@ -12582,7 +12560,7 @@
           <a:blip r:embed="rId3" cstate="print">
             <a:extLst>
               <a:ext uri="{28A0092B-C50C-407E-A947-70E740481C1C}">
-                <a14:useLocalDpi xmlns:a14="http://schemas.microsoft.com/office/drawing/2010/main" xmlns="" val="0"/>
+                <a14:useLocalDpi xmlns="" xmlns:a14="http://schemas.microsoft.com/office/drawing/2010/main" val="0"/>
               </a:ext>
             </a:extLst>
           </a:blip>
@@ -12697,7 +12675,7 @@
           <a:blip r:embed="rId4" cstate="print">
             <a:extLst>
               <a:ext uri="{28A0092B-C50C-407E-A947-70E740481C1C}">
-                <a14:useLocalDpi xmlns:a14="http://schemas.microsoft.com/office/drawing/2010/main" xmlns="" val="0"/>
+                <a14:useLocalDpi xmlns="" xmlns:a14="http://schemas.microsoft.com/office/drawing/2010/main" val="0"/>
               </a:ext>
             </a:extLst>
           </a:blip>
@@ -12717,7 +12695,7 @@
           <a:noFill/>
           <a:extLst>
             <a:ext uri="{909E8E84-426E-40DD-AFC4-6F175D3DCCD1}">
-              <a14:hiddenFill xmlns:a14="http://schemas.microsoft.com/office/drawing/2010/main" xmlns="">
+              <a14:hiddenFill xmlns="" xmlns:a14="http://schemas.microsoft.com/office/drawing/2010/main">
                 <a:solidFill>
                   <a:srgbClr val="FFFFFF"/>
                 </a:solidFill>
@@ -12738,7 +12716,7 @@
           <a:blip r:embed="rId5" cstate="print">
             <a:extLst>
               <a:ext uri="{28A0092B-C50C-407E-A947-70E740481C1C}">
-                <a14:useLocalDpi xmlns:a14="http://schemas.microsoft.com/office/drawing/2010/main" xmlns="" val="0"/>
+                <a14:useLocalDpi xmlns="" xmlns:a14="http://schemas.microsoft.com/office/drawing/2010/main" val="0"/>
               </a:ext>
             </a:extLst>
           </a:blip>
@@ -12758,7 +12736,7 @@
           <a:noFill/>
           <a:extLst>
             <a:ext uri="{909E8E84-426E-40DD-AFC4-6F175D3DCCD1}">
-              <a14:hiddenFill xmlns:a14="http://schemas.microsoft.com/office/drawing/2010/main" xmlns="">
+              <a14:hiddenFill xmlns="" xmlns:a14="http://schemas.microsoft.com/office/drawing/2010/main">
                 <a:solidFill>
                   <a:srgbClr val="FFFFFF"/>
                 </a:solidFill>
@@ -12779,7 +12757,7 @@
           <a:blip r:embed="rId6" cstate="print">
             <a:extLst>
               <a:ext uri="{28A0092B-C50C-407E-A947-70E740481C1C}">
-                <a14:useLocalDpi xmlns:a14="http://schemas.microsoft.com/office/drawing/2010/main" xmlns="" val="0"/>
+                <a14:useLocalDpi xmlns="" xmlns:a14="http://schemas.microsoft.com/office/drawing/2010/main" val="0"/>
               </a:ext>
             </a:extLst>
           </a:blip>
@@ -12799,7 +12777,7 @@
           <a:noFill/>
           <a:extLst>
             <a:ext uri="{909E8E84-426E-40DD-AFC4-6F175D3DCCD1}">
-              <a14:hiddenFill xmlns:a14="http://schemas.microsoft.com/office/drawing/2010/main" xmlns="">
+              <a14:hiddenFill xmlns="" xmlns:a14="http://schemas.microsoft.com/office/drawing/2010/main">
                 <a:solidFill>
                   <a:srgbClr val="FFFFFF"/>
                 </a:solidFill>
@@ -12837,7 +12815,7 @@
     </p:spTree>
     <p:extLst>
       <p:ext uri="{BB962C8B-B14F-4D97-AF65-F5344CB8AC3E}">
-        <p14:creationId xmlns:p14="http://schemas.microsoft.com/office/powerpoint/2010/main" xmlns="" val="26222973"/>
+        <p14:creationId xmlns="" xmlns:p14="http://schemas.microsoft.com/office/powerpoint/2010/main" val="26222973"/>
       </p:ext>
     </p:extLst>
   </p:cSld>
@@ -12934,14 +12912,14 @@
           <a:effectLst/>
           <a:extLst>
             <a:ext uri="{909E8E84-426E-40DD-AFC4-6F175D3DCCD1}">
-              <a14:hiddenFill xmlns:a14="http://schemas.microsoft.com/office/drawing/2010/main" xmlns="">
+              <a14:hiddenFill xmlns="" xmlns:a14="http://schemas.microsoft.com/office/drawing/2010/main">
                 <a:solidFill>
                   <a:schemeClr val="accent1"/>
                 </a:solidFill>
               </a14:hiddenFill>
             </a:ext>
             <a:ext uri="{91240B29-F687-4F45-9708-019B960494DF}">
-              <a14:hiddenLine xmlns:a14="http://schemas.microsoft.com/office/drawing/2010/main" xmlns="" w="9525">
+              <a14:hiddenLine xmlns="" xmlns:a14="http://schemas.microsoft.com/office/drawing/2010/main" w="9525">
                 <a:solidFill>
                   <a:schemeClr val="tx1"/>
                 </a:solidFill>
@@ -12951,7 +12929,7 @@
               </a14:hiddenLine>
             </a:ext>
             <a:ext uri="{AF507438-7753-43E0-B8FC-AC1667EBCBE1}">
-              <a14:hiddenEffects xmlns:a14="http://schemas.microsoft.com/office/drawing/2010/main" xmlns="">
+              <a14:hiddenEffects xmlns="" xmlns:a14="http://schemas.microsoft.com/office/drawing/2010/main">
                 <a:effectLst>
                   <a:outerShdw dist="35921" dir="2700000" algn="ctr" rotWithShape="0">
                     <a:schemeClr val="bg2"/>
@@ -13397,7 +13375,7 @@
     </p:spTree>
     <p:extLst>
       <p:ext uri="{BB962C8B-B14F-4D97-AF65-F5344CB8AC3E}">
-        <p14:creationId xmlns:p14="http://schemas.microsoft.com/office/powerpoint/2010/main" xmlns="" val="2437256557"/>
+        <p14:creationId xmlns="" xmlns:p14="http://schemas.microsoft.com/office/powerpoint/2010/main" val="2437256557"/>
       </p:ext>
     </p:extLst>
   </p:cSld>
@@ -13511,7 +13489,7 @@
           <a:blip r:embed="rId5" cstate="print">
             <a:extLst>
               <a:ext uri="{28A0092B-C50C-407E-A947-70E740481C1C}">
-                <a14:useLocalDpi xmlns:a14="http://schemas.microsoft.com/office/drawing/2010/main" xmlns="" val="0"/>
+                <a14:useLocalDpi xmlns="" xmlns:a14="http://schemas.microsoft.com/office/drawing/2010/main" val="0"/>
               </a:ext>
             </a:extLst>
           </a:blip>
@@ -13531,7 +13509,7 @@
           <a:noFill/>
           <a:extLst>
             <a:ext uri="{909E8E84-426E-40DD-AFC4-6F175D3DCCD1}">
-              <a14:hiddenFill xmlns:a14="http://schemas.microsoft.com/office/drawing/2010/main" xmlns="">
+              <a14:hiddenFill xmlns="" xmlns:a14="http://schemas.microsoft.com/office/drawing/2010/main">
                 <a:solidFill>
                   <a:srgbClr val="FFFFFF"/>
                 </a:solidFill>
@@ -13779,7 +13757,7 @@
             <a:blip r:embed="rId6" cstate="print">
               <a:extLst>
                 <a:ext uri="{28A0092B-C50C-407E-A947-70E740481C1C}">
-                  <a14:useLocalDpi xmlns:a14="http://schemas.microsoft.com/office/drawing/2010/main" xmlns="" val="0"/>
+                  <a14:useLocalDpi xmlns="" xmlns:a14="http://schemas.microsoft.com/office/drawing/2010/main" val="0"/>
                 </a:ext>
               </a:extLst>
             </a:blip>
@@ -13799,7 +13777,7 @@
             <a:noFill/>
             <a:extLst>
               <a:ext uri="{909E8E84-426E-40DD-AFC4-6F175D3DCCD1}">
-                <a14:hiddenFill xmlns:a14="http://schemas.microsoft.com/office/drawing/2010/main" xmlns="">
+                <a14:hiddenFill xmlns="" xmlns:a14="http://schemas.microsoft.com/office/drawing/2010/main">
                   <a:solidFill>
                     <a:srgbClr val="FFFFFF"/>
                   </a:solidFill>
@@ -13886,14 +13864,14 @@
           <a:effectLst/>
           <a:extLst>
             <a:ext uri="{909E8E84-426E-40DD-AFC4-6F175D3DCCD1}">
-              <a14:hiddenFill xmlns:a14="http://schemas.microsoft.com/office/drawing/2010/main" xmlns="">
+              <a14:hiddenFill xmlns="" xmlns:a14="http://schemas.microsoft.com/office/drawing/2010/main">
                 <a:solidFill>
                   <a:schemeClr val="accent1"/>
                 </a:solidFill>
               </a14:hiddenFill>
             </a:ext>
             <a:ext uri="{91240B29-F687-4F45-9708-019B960494DF}">
-              <a14:hiddenLine xmlns:a14="http://schemas.microsoft.com/office/drawing/2010/main" xmlns="" w="9525">
+              <a14:hiddenLine xmlns="" xmlns:a14="http://schemas.microsoft.com/office/drawing/2010/main" w="9525">
                 <a:solidFill>
                   <a:schemeClr val="tx1"/>
                 </a:solidFill>
@@ -13903,7 +13881,7 @@
               </a14:hiddenLine>
             </a:ext>
             <a:ext uri="{AF507438-7753-43E0-B8FC-AC1667EBCBE1}">
-              <a14:hiddenEffects xmlns:a14="http://schemas.microsoft.com/office/drawing/2010/main" xmlns="">
+              <a14:hiddenEffects xmlns="" xmlns:a14="http://schemas.microsoft.com/office/drawing/2010/main">
                 <a:effectLst>
                   <a:outerShdw dist="35921" dir="2700000" algn="ctr" rotWithShape="0">
                     <a:schemeClr val="bg2"/>
@@ -14122,7 +14100,7 @@
           </a:ln>
           <a:extLst>
             <a:ext uri="{91240B29-F687-4F45-9708-019B960494DF}">
-              <a14:hiddenLine xmlns:a14="http://schemas.microsoft.com/office/drawing/2010/main" xmlns="" w="9525" cap="flat" cmpd="sng" algn="ctr">
+              <a14:hiddenLine xmlns="" xmlns:a14="http://schemas.microsoft.com/office/drawing/2010/main" w="9525" cap="flat" cmpd="sng" algn="ctr">
                 <a:solidFill>
                   <a:schemeClr val="tx1"/>
                 </a:solidFill>
@@ -14133,7 +14111,7 @@
               </a14:hiddenLine>
             </a:ext>
             <a:ext uri="{AF507438-7753-43E0-B8FC-AC1667EBCBE1}">
-              <a14:hiddenEffects xmlns:a14="http://schemas.microsoft.com/office/drawing/2010/main" xmlns="">
+              <a14:hiddenEffects xmlns="" xmlns:a14="http://schemas.microsoft.com/office/drawing/2010/main">
                 <a:effectLst>
                   <a:outerShdw dist="35921" dir="2700000" algn="ctr" rotWithShape="0">
                     <a:schemeClr val="bg2"/>
@@ -14161,7 +14139,7 @@
     </p:spTree>
     <p:extLst>
       <p:ext uri="{BB962C8B-B14F-4D97-AF65-F5344CB8AC3E}">
-        <p14:creationId xmlns:p14="http://schemas.microsoft.com/office/powerpoint/2010/main" xmlns="" val="1709874429"/>
+        <p14:creationId xmlns="" xmlns:p14="http://schemas.microsoft.com/office/powerpoint/2010/main" val="1709874429"/>
       </p:ext>
     </p:extLst>
   </p:cSld>
@@ -14738,7 +14716,7 @@
             <a:effectLst/>
             <a:extLst>
               <a:ext uri="{AF507438-7753-43E0-B8FC-AC1667EBCBE1}">
-                <a14:hiddenEffects xmlns:a14="http://schemas.microsoft.com/office/drawing/2010/main" xmlns="">
+                <a14:hiddenEffects xmlns="" xmlns:a14="http://schemas.microsoft.com/office/drawing/2010/main">
                   <a:effectLst>
                     <a:outerShdw dist="35921" dir="2700000" algn="ctr" rotWithShape="0">
                       <a:schemeClr val="bg2"/>
@@ -14788,7 +14766,7 @@
             <a:effectLst/>
             <a:extLst>
               <a:ext uri="{AF507438-7753-43E0-B8FC-AC1667EBCBE1}">
-                <a14:hiddenEffects xmlns:a14="http://schemas.microsoft.com/office/drawing/2010/main" xmlns="">
+                <a14:hiddenEffects xmlns="" xmlns:a14="http://schemas.microsoft.com/office/drawing/2010/main">
                   <a:effectLst>
                     <a:outerShdw dist="35921" dir="2700000" algn="ctr" rotWithShape="0">
                       <a:schemeClr val="bg2"/>
@@ -14838,7 +14816,7 @@
             <a:effectLst/>
             <a:extLst>
               <a:ext uri="{AF507438-7753-43E0-B8FC-AC1667EBCBE1}">
-                <a14:hiddenEffects xmlns:a14="http://schemas.microsoft.com/office/drawing/2010/main" xmlns="">
+                <a14:hiddenEffects xmlns="" xmlns:a14="http://schemas.microsoft.com/office/drawing/2010/main">
                   <a:effectLst>
                     <a:outerShdw dist="35921" dir="2700000" algn="ctr" rotWithShape="0">
                       <a:schemeClr val="bg2"/>
@@ -14888,7 +14866,7 @@
             <a:effectLst/>
             <a:extLst>
               <a:ext uri="{AF507438-7753-43E0-B8FC-AC1667EBCBE1}">
-                <a14:hiddenEffects xmlns:a14="http://schemas.microsoft.com/office/drawing/2010/main" xmlns="">
+                <a14:hiddenEffects xmlns="" xmlns:a14="http://schemas.microsoft.com/office/drawing/2010/main">
                   <a:effectLst>
                     <a:outerShdw dist="35921" dir="2700000" algn="ctr" rotWithShape="0">
                       <a:schemeClr val="bg2"/>
@@ -14938,7 +14916,7 @@
             <a:effectLst/>
             <a:extLst>
               <a:ext uri="{AF507438-7753-43E0-B8FC-AC1667EBCBE1}">
-                <a14:hiddenEffects xmlns:a14="http://schemas.microsoft.com/office/drawing/2010/main" xmlns="">
+                <a14:hiddenEffects xmlns="" xmlns:a14="http://schemas.microsoft.com/office/drawing/2010/main">
                   <a:effectLst>
                     <a:outerShdw dist="35921" dir="2700000" algn="ctr" rotWithShape="0">
                       <a:schemeClr val="bg2"/>
@@ -14988,7 +14966,7 @@
             <a:effectLst/>
             <a:extLst>
               <a:ext uri="{AF507438-7753-43E0-B8FC-AC1667EBCBE1}">
-                <a14:hiddenEffects xmlns:a14="http://schemas.microsoft.com/office/drawing/2010/main" xmlns="">
+                <a14:hiddenEffects xmlns="" xmlns:a14="http://schemas.microsoft.com/office/drawing/2010/main">
                   <a:effectLst>
                     <a:outerShdw dist="35921" dir="2700000" algn="ctr" rotWithShape="0">
                       <a:schemeClr val="bg2"/>
@@ -15003,7 +14981,7 @@
     </p:spTree>
     <p:extLst>
       <p:ext uri="{BB962C8B-B14F-4D97-AF65-F5344CB8AC3E}">
-        <p14:creationId xmlns:p14="http://schemas.microsoft.com/office/powerpoint/2010/main" xmlns="" val="1532431054"/>
+        <p14:creationId xmlns="" xmlns:p14="http://schemas.microsoft.com/office/powerpoint/2010/main" val="1532431054"/>
       </p:ext>
     </p:extLst>
   </p:cSld>
@@ -16280,7 +16258,7 @@
     </p:spTree>
     <p:extLst>
       <p:ext uri="{BB962C8B-B14F-4D97-AF65-F5344CB8AC3E}">
-        <p14:creationId xmlns:p14="http://schemas.microsoft.com/office/powerpoint/2010/main" xmlns="" val="1410092498"/>
+        <p14:creationId xmlns="" xmlns:p14="http://schemas.microsoft.com/office/powerpoint/2010/main" val="1410092498"/>
       </p:ext>
     </p:extLst>
   </p:cSld>
@@ -16428,7 +16406,7 @@
           <a:blip r:embed="rId4" cstate="print">
             <a:extLst>
               <a:ext uri="{28A0092B-C50C-407E-A947-70E740481C1C}">
-                <a14:useLocalDpi xmlns:a14="http://schemas.microsoft.com/office/drawing/2010/main" xmlns="" val="0"/>
+                <a14:useLocalDpi xmlns="" xmlns:a14="http://schemas.microsoft.com/office/drawing/2010/main" val="0"/>
               </a:ext>
             </a:extLst>
           </a:blip>
@@ -16553,7 +16531,7 @@
           <a:blip r:embed="rId5" cstate="print">
             <a:extLst>
               <a:ext uri="{28A0092B-C50C-407E-A947-70E740481C1C}">
-                <a14:useLocalDpi xmlns:a14="http://schemas.microsoft.com/office/drawing/2010/main" xmlns="" val="0"/>
+                <a14:useLocalDpi xmlns="" xmlns:a14="http://schemas.microsoft.com/office/drawing/2010/main" val="0"/>
               </a:ext>
             </a:extLst>
           </a:blip>
@@ -16573,7 +16551,7 @@
           <a:noFill/>
           <a:extLst>
             <a:ext uri="{909E8E84-426E-40DD-AFC4-6F175D3DCCD1}">
-              <a14:hiddenFill xmlns:a14="http://schemas.microsoft.com/office/drawing/2010/main" xmlns="">
+              <a14:hiddenFill xmlns="" xmlns:a14="http://schemas.microsoft.com/office/drawing/2010/main">
                 <a:solidFill>
                   <a:srgbClr val="FFFFFF"/>
                 </a:solidFill>
@@ -16594,7 +16572,7 @@
           <a:blip r:embed="rId6" cstate="print">
             <a:extLst>
               <a:ext uri="{28A0092B-C50C-407E-A947-70E740481C1C}">
-                <a14:useLocalDpi xmlns:a14="http://schemas.microsoft.com/office/drawing/2010/main" xmlns="" val="0"/>
+                <a14:useLocalDpi xmlns="" xmlns:a14="http://schemas.microsoft.com/office/drawing/2010/main" val="0"/>
               </a:ext>
             </a:extLst>
           </a:blip>
@@ -16614,7 +16592,7 @@
           <a:noFill/>
           <a:extLst>
             <a:ext uri="{909E8E84-426E-40DD-AFC4-6F175D3DCCD1}">
-              <a14:hiddenFill xmlns:a14="http://schemas.microsoft.com/office/drawing/2010/main" xmlns="">
+              <a14:hiddenFill xmlns="" xmlns:a14="http://schemas.microsoft.com/office/drawing/2010/main">
                 <a:solidFill>
                   <a:srgbClr val="FFFFFF"/>
                 </a:solidFill>
@@ -16635,7 +16613,7 @@
           <a:blip r:embed="rId5" cstate="print">
             <a:extLst>
               <a:ext uri="{28A0092B-C50C-407E-A947-70E740481C1C}">
-                <a14:useLocalDpi xmlns:a14="http://schemas.microsoft.com/office/drawing/2010/main" xmlns="" val="0"/>
+                <a14:useLocalDpi xmlns="" xmlns:a14="http://schemas.microsoft.com/office/drawing/2010/main" val="0"/>
               </a:ext>
             </a:extLst>
           </a:blip>
@@ -16655,7 +16633,7 @@
           <a:noFill/>
           <a:extLst>
             <a:ext uri="{909E8E84-426E-40DD-AFC4-6F175D3DCCD1}">
-              <a14:hiddenFill xmlns:a14="http://schemas.microsoft.com/office/drawing/2010/main" xmlns="">
+              <a14:hiddenFill xmlns="" xmlns:a14="http://schemas.microsoft.com/office/drawing/2010/main">
                 <a:solidFill>
                   <a:srgbClr val="FFFFFF"/>
                 </a:solidFill>
@@ -16676,7 +16654,7 @@
           <a:blip r:embed="rId6" cstate="print">
             <a:extLst>
               <a:ext uri="{28A0092B-C50C-407E-A947-70E740481C1C}">
-                <a14:useLocalDpi xmlns:a14="http://schemas.microsoft.com/office/drawing/2010/main" xmlns="" val="0"/>
+                <a14:useLocalDpi xmlns="" xmlns:a14="http://schemas.microsoft.com/office/drawing/2010/main" val="0"/>
               </a:ext>
             </a:extLst>
           </a:blip>
@@ -16696,7 +16674,7 @@
           <a:noFill/>
           <a:extLst>
             <a:ext uri="{909E8E84-426E-40DD-AFC4-6F175D3DCCD1}">
-              <a14:hiddenFill xmlns:a14="http://schemas.microsoft.com/office/drawing/2010/main" xmlns="">
+              <a14:hiddenFill xmlns="" xmlns:a14="http://schemas.microsoft.com/office/drawing/2010/main">
                 <a:solidFill>
                   <a:srgbClr val="FFFFFF"/>
                 </a:solidFill>
@@ -16793,7 +16771,7 @@
           <a:blip r:embed="rId7" cstate="print">
             <a:extLst>
               <a:ext uri="{28A0092B-C50C-407E-A947-70E740481C1C}">
-                <a14:useLocalDpi xmlns:a14="http://schemas.microsoft.com/office/drawing/2010/main" xmlns="" val="0"/>
+                <a14:useLocalDpi xmlns="" xmlns:a14="http://schemas.microsoft.com/office/drawing/2010/main" val="0"/>
               </a:ext>
             </a:extLst>
           </a:blip>
@@ -16813,7 +16791,7 @@
           <a:noFill/>
           <a:extLst>
             <a:ext uri="{909E8E84-426E-40DD-AFC4-6F175D3DCCD1}">
-              <a14:hiddenFill xmlns:a14="http://schemas.microsoft.com/office/drawing/2010/main" xmlns="">
+              <a14:hiddenFill xmlns="" xmlns:a14="http://schemas.microsoft.com/office/drawing/2010/main">
                 <a:solidFill>
                   <a:srgbClr val="FFFFFF"/>
                 </a:solidFill>
@@ -16834,7 +16812,7 @@
           <a:blip r:embed="rId8" cstate="print">
             <a:extLst>
               <a:ext uri="{28A0092B-C50C-407E-A947-70E740481C1C}">
-                <a14:useLocalDpi xmlns:a14="http://schemas.microsoft.com/office/drawing/2010/main" xmlns="" val="0"/>
+                <a14:useLocalDpi xmlns="" xmlns:a14="http://schemas.microsoft.com/office/drawing/2010/main" val="0"/>
               </a:ext>
             </a:extLst>
           </a:blip>
@@ -16854,7 +16832,7 @@
           <a:noFill/>
           <a:extLst>
             <a:ext uri="{909E8E84-426E-40DD-AFC4-6F175D3DCCD1}">
-              <a14:hiddenFill xmlns:a14="http://schemas.microsoft.com/office/drawing/2010/main" xmlns="">
+              <a14:hiddenFill xmlns="" xmlns:a14="http://schemas.microsoft.com/office/drawing/2010/main">
                 <a:solidFill>
                   <a:srgbClr val="FFFFFF"/>
                 </a:solidFill>
@@ -16875,7 +16853,7 @@
           <a:blip r:embed="rId9" cstate="print">
             <a:extLst>
               <a:ext uri="{28A0092B-C50C-407E-A947-70E740481C1C}">
-                <a14:useLocalDpi xmlns:a14="http://schemas.microsoft.com/office/drawing/2010/main" xmlns="" val="0"/>
+                <a14:useLocalDpi xmlns="" xmlns:a14="http://schemas.microsoft.com/office/drawing/2010/main" val="0"/>
               </a:ext>
             </a:extLst>
           </a:blip>
@@ -16895,7 +16873,7 @@
           <a:noFill/>
           <a:extLst>
             <a:ext uri="{909E8E84-426E-40DD-AFC4-6F175D3DCCD1}">
-              <a14:hiddenFill xmlns:a14="http://schemas.microsoft.com/office/drawing/2010/main" xmlns="">
+              <a14:hiddenFill xmlns="" xmlns:a14="http://schemas.microsoft.com/office/drawing/2010/main">
                 <a:solidFill>
                   <a:srgbClr val="FFFFFF"/>
                 </a:solidFill>
@@ -16916,7 +16894,7 @@
           <a:blip r:embed="rId10" cstate="print">
             <a:extLst>
               <a:ext uri="{28A0092B-C50C-407E-A947-70E740481C1C}">
-                <a14:useLocalDpi xmlns:a14="http://schemas.microsoft.com/office/drawing/2010/main" xmlns="" val="0"/>
+                <a14:useLocalDpi xmlns="" xmlns:a14="http://schemas.microsoft.com/office/drawing/2010/main" val="0"/>
               </a:ext>
             </a:extLst>
           </a:blip>
@@ -16936,7 +16914,7 @@
           <a:noFill/>
           <a:extLst>
             <a:ext uri="{909E8E84-426E-40DD-AFC4-6F175D3DCCD1}">
-              <a14:hiddenFill xmlns:a14="http://schemas.microsoft.com/office/drawing/2010/main" xmlns="">
+              <a14:hiddenFill xmlns="" xmlns:a14="http://schemas.microsoft.com/office/drawing/2010/main">
                 <a:solidFill>
                   <a:srgbClr val="FFFFFF"/>
                 </a:solidFill>
@@ -16948,7 +16926,7 @@
     </p:spTree>
     <p:extLst>
       <p:ext uri="{BB962C8B-B14F-4D97-AF65-F5344CB8AC3E}">
-        <p14:creationId xmlns:p14="http://schemas.microsoft.com/office/powerpoint/2010/main" xmlns="" val="1407908346"/>
+        <p14:creationId xmlns="" xmlns:p14="http://schemas.microsoft.com/office/powerpoint/2010/main" val="1407908346"/>
       </p:ext>
     </p:extLst>
   </p:cSld>
@@ -17421,7 +17399,7 @@
     </p:spTree>
     <p:extLst>
       <p:ext uri="{BB962C8B-B14F-4D97-AF65-F5344CB8AC3E}">
-        <p14:creationId xmlns:p14="http://schemas.microsoft.com/office/powerpoint/2010/main" xmlns="" val="2718990012"/>
+        <p14:creationId xmlns="" xmlns:p14="http://schemas.microsoft.com/office/powerpoint/2010/main" val="2718990012"/>
       </p:ext>
     </p:extLst>
   </p:cSld>
@@ -17737,7 +17715,7 @@
         <a:effectLst/>
         <a:extLst>
           <a:ext uri="{91240B29-F687-4F45-9708-019B960494DF}">
-            <a14:hiddenLine xmlns:a14="http://schemas.microsoft.com/office/drawing/2010/main" xmlns="" w="9525" cap="flat" cmpd="sng" algn="ctr">
+            <a14:hiddenLine xmlns="" xmlns:a14="http://schemas.microsoft.com/office/drawing/2010/main" w="9525" cap="flat" cmpd="sng" algn="ctr">
               <a:solidFill>
                 <a:schemeClr val="tx1"/>
               </a:solidFill>
@@ -17748,7 +17726,7 @@
             </a14:hiddenLine>
           </a:ext>
           <a:ext uri="{AF507438-7753-43E0-B8FC-AC1667EBCBE1}">
-            <a14:hiddenEffects xmlns:a14="http://schemas.microsoft.com/office/drawing/2010/main" xmlns="">
+            <a14:hiddenEffects xmlns="" xmlns:a14="http://schemas.microsoft.com/office/drawing/2010/main">
               <a:effectLst>
                 <a:outerShdw dist="35921" dir="2700000" algn="ctr" rotWithShape="0">
                   <a:schemeClr val="bg2"/>

</xml_diff>